<commit_message>
Atualização slide e documentação
</commit_message>
<xml_diff>
--- a/Arquivos do Anselmo preencidos - Semestre passado/GPS_2014_Modelo de Apresentação_PI.pptx
+++ b/Arquivos do Anselmo preencidos - Semestre passado/GPS_2014_Modelo de Apresentação_PI.pptx
@@ -5,26 +5,29 @@
     <p:sldMasterId id="2147483648" r:id="rId1"/>
   </p:sldMasterIdLst>
   <p:notesMasterIdLst>
-    <p:notesMasterId r:id="rId19"/>
+    <p:notesMasterId r:id="rId22"/>
   </p:notesMasterIdLst>
   <p:sldIdLst>
     <p:sldId id="259" r:id="rId2"/>
     <p:sldId id="281" r:id="rId3"/>
-    <p:sldId id="283" r:id="rId4"/>
-    <p:sldId id="282" r:id="rId5"/>
-    <p:sldId id="284" r:id="rId6"/>
-    <p:sldId id="289" r:id="rId7"/>
-    <p:sldId id="290" r:id="rId8"/>
-    <p:sldId id="286" r:id="rId9"/>
+    <p:sldId id="282" r:id="rId4"/>
+    <p:sldId id="298" r:id="rId5"/>
+    <p:sldId id="289" r:id="rId6"/>
+    <p:sldId id="290" r:id="rId7"/>
+    <p:sldId id="296" r:id="rId8"/>
+    <p:sldId id="297" r:id="rId9"/>
     <p:sldId id="292" r:id="rId10"/>
     <p:sldId id="294" r:id="rId11"/>
     <p:sldId id="291" r:id="rId12"/>
     <p:sldId id="293" r:id="rId13"/>
     <p:sldId id="295" r:id="rId14"/>
-    <p:sldId id="296" r:id="rId15"/>
-    <p:sldId id="297" r:id="rId16"/>
-    <p:sldId id="288" r:id="rId17"/>
-    <p:sldId id="279" r:id="rId18"/>
+    <p:sldId id="299" r:id="rId15"/>
+    <p:sldId id="300" r:id="rId16"/>
+    <p:sldId id="301" r:id="rId17"/>
+    <p:sldId id="302" r:id="rId18"/>
+    <p:sldId id="303" r:id="rId19"/>
+    <p:sldId id="304" r:id="rId20"/>
+    <p:sldId id="279" r:id="rId21"/>
   </p:sldIdLst>
   <p:sldSz cx="9144000" cy="6858000" type="screen4x3"/>
   <p:notesSz cx="7315200" cy="9601200"/>
@@ -224,7 +227,7 @@
           <a:p>
             <a:fld id="{D77B3AC6-9B44-4B5C-8B25-D3008DB399E3}" type="datetimeFigureOut">
               <a:rPr lang="pt-BR" smtClean="0"/>
-              <a:t>13/11/2014</a:t>
+              <a:t>10/03/2015</a:t>
             </a:fld>
             <a:endParaRPr lang="pt-BR"/>
           </a:p>
@@ -383,7 +386,7 @@
           <a:p>
             <a:fld id="{ECB4F886-580C-4471-933D-84EA2AD852AB}" type="slidenum">
               <a:rPr lang="pt-BR" smtClean="0"/>
-              <a:t>‹nº›</a:t>
+              <a:t>‹#›</a:t>
             </a:fld>
             <a:endParaRPr lang="pt-BR"/>
           </a:p>
@@ -576,6 +579,174 @@
 </p:notes>
 </file>
 
+<file path=ppt/notesSlides/notesSlide10.xml><?xml version="1.0" encoding="utf-8"?>
+<p:notes xmlns:a="http://schemas.openxmlformats.org/drawingml/2006/main" xmlns:r="http://schemas.openxmlformats.org/officeDocument/2006/relationships" xmlns:p="http://schemas.openxmlformats.org/presentationml/2006/main">
+  <p:cSld>
+    <p:spTree>
+      <p:nvGrpSpPr>
+        <p:cNvPr id="1" name=""/>
+        <p:cNvGrpSpPr/>
+        <p:nvPr/>
+      </p:nvGrpSpPr>
+      <p:grpSpPr>
+        <a:xfrm>
+          <a:off x="0" y="0"/>
+          <a:ext cx="0" cy="0"/>
+          <a:chOff x="0" y="0"/>
+          <a:chExt cx="0" cy="0"/>
+        </a:xfrm>
+      </p:grpSpPr>
+      <p:sp>
+        <p:nvSpPr>
+          <p:cNvPr id="2" name="Espaço Reservado para Imagem de Slide 1"/>
+          <p:cNvSpPr>
+            <a:spLocks noGrp="1" noRot="1" noChangeAspect="1"/>
+          </p:cNvSpPr>
+          <p:nvPr>
+            <p:ph type="sldImg"/>
+          </p:nvPr>
+        </p:nvSpPr>
+        <p:spPr/>
+      </p:sp>
+      <p:sp>
+        <p:nvSpPr>
+          <p:cNvPr id="3" name="Espaço Reservado para Anotações 2"/>
+          <p:cNvSpPr>
+            <a:spLocks noGrp="1"/>
+          </p:cNvSpPr>
+          <p:nvPr>
+            <p:ph type="body" idx="1"/>
+          </p:nvPr>
+        </p:nvSpPr>
+        <p:spPr/>
+        <p:txBody>
+          <a:bodyPr/>
+          <a:lstStyle/>
+          <a:p>
+            <a:endParaRPr lang="pt-BR" dirty="0"/>
+          </a:p>
+        </p:txBody>
+      </p:sp>
+      <p:sp>
+        <p:nvSpPr>
+          <p:cNvPr id="4" name="Espaço Reservado para Número de Slide 3"/>
+          <p:cNvSpPr>
+            <a:spLocks noGrp="1"/>
+          </p:cNvSpPr>
+          <p:nvPr>
+            <p:ph type="sldNum" sz="quarter" idx="10"/>
+          </p:nvPr>
+        </p:nvSpPr>
+        <p:spPr/>
+        <p:txBody>
+          <a:bodyPr/>
+          <a:lstStyle/>
+          <a:p>
+            <a:fld id="{ECB4F886-580C-4471-933D-84EA2AD852AB}" type="slidenum">
+              <a:rPr lang="pt-BR" smtClean="0"/>
+              <a:t>18</a:t>
+            </a:fld>
+            <a:endParaRPr lang="pt-BR"/>
+          </a:p>
+        </p:txBody>
+      </p:sp>
+    </p:spTree>
+    <p:extLst>
+      <p:ext uri="{BB962C8B-B14F-4D97-AF65-F5344CB8AC3E}">
+        <p14:creationId xmlns:p14="http://schemas.microsoft.com/office/powerpoint/2010/main" val="990142917"/>
+      </p:ext>
+    </p:extLst>
+  </p:cSld>
+  <p:clrMapOvr>
+    <a:masterClrMapping/>
+  </p:clrMapOvr>
+</p:notes>
+</file>
+
+<file path=ppt/notesSlides/notesSlide11.xml><?xml version="1.0" encoding="utf-8"?>
+<p:notes xmlns:a="http://schemas.openxmlformats.org/drawingml/2006/main" xmlns:r="http://schemas.openxmlformats.org/officeDocument/2006/relationships" xmlns:p="http://schemas.openxmlformats.org/presentationml/2006/main">
+  <p:cSld>
+    <p:spTree>
+      <p:nvGrpSpPr>
+        <p:cNvPr id="1" name=""/>
+        <p:cNvGrpSpPr/>
+        <p:nvPr/>
+      </p:nvGrpSpPr>
+      <p:grpSpPr>
+        <a:xfrm>
+          <a:off x="0" y="0"/>
+          <a:ext cx="0" cy="0"/>
+          <a:chOff x="0" y="0"/>
+          <a:chExt cx="0" cy="0"/>
+        </a:xfrm>
+      </p:grpSpPr>
+      <p:sp>
+        <p:nvSpPr>
+          <p:cNvPr id="2" name="Espaço Reservado para Imagem de Slide 1"/>
+          <p:cNvSpPr>
+            <a:spLocks noGrp="1" noRot="1" noChangeAspect="1"/>
+          </p:cNvSpPr>
+          <p:nvPr>
+            <p:ph type="sldImg"/>
+          </p:nvPr>
+        </p:nvSpPr>
+        <p:spPr/>
+      </p:sp>
+      <p:sp>
+        <p:nvSpPr>
+          <p:cNvPr id="3" name="Espaço Reservado para Anotações 2"/>
+          <p:cNvSpPr>
+            <a:spLocks noGrp="1"/>
+          </p:cNvSpPr>
+          <p:nvPr>
+            <p:ph type="body" idx="1"/>
+          </p:nvPr>
+        </p:nvSpPr>
+        <p:spPr/>
+        <p:txBody>
+          <a:bodyPr/>
+          <a:lstStyle/>
+          <a:p>
+            <a:endParaRPr lang="pt-BR" dirty="0"/>
+          </a:p>
+        </p:txBody>
+      </p:sp>
+      <p:sp>
+        <p:nvSpPr>
+          <p:cNvPr id="4" name="Espaço Reservado para Número de Slide 3"/>
+          <p:cNvSpPr>
+            <a:spLocks noGrp="1"/>
+          </p:cNvSpPr>
+          <p:nvPr>
+            <p:ph type="sldNum" sz="quarter" idx="10"/>
+          </p:nvPr>
+        </p:nvSpPr>
+        <p:spPr/>
+        <p:txBody>
+          <a:bodyPr/>
+          <a:lstStyle/>
+          <a:p>
+            <a:fld id="{ECB4F886-580C-4471-933D-84EA2AD852AB}" type="slidenum">
+              <a:rPr lang="pt-BR" smtClean="0"/>
+              <a:t>19</a:t>
+            </a:fld>
+            <a:endParaRPr lang="pt-BR"/>
+          </a:p>
+        </p:txBody>
+      </p:sp>
+    </p:spTree>
+    <p:extLst>
+      <p:ext uri="{BB962C8B-B14F-4D97-AF65-F5344CB8AC3E}">
+        <p14:creationId xmlns:p14="http://schemas.microsoft.com/office/powerpoint/2010/main" val="1964187018"/>
+      </p:ext>
+    </p:extLst>
+  </p:cSld>
+  <p:clrMapOvr>
+    <a:masterClrMapping/>
+  </p:clrMapOvr>
+</p:notes>
+</file>
+
 <file path=ppt/notesSlides/notesSlide2.xml><?xml version="1.0" encoding="utf-8"?>
 <p:notes xmlns:a="http://schemas.openxmlformats.org/drawingml/2006/main" xmlns:r="http://schemas.openxmlformats.org/officeDocument/2006/relationships" xmlns:p="http://schemas.openxmlformats.org/presentationml/2006/main">
   <p:cSld>
@@ -986,7 +1157,7 @@
     </p:spTree>
     <p:extLst>
       <p:ext uri="{BB962C8B-B14F-4D97-AF65-F5344CB8AC3E}">
-        <p14:creationId xmlns:p14="http://schemas.microsoft.com/office/powerpoint/2010/main" val="1836444808"/>
+        <p14:creationId xmlns:p14="http://schemas.microsoft.com/office/powerpoint/2010/main" val="1801340757"/>
       </p:ext>
     </p:extLst>
   </p:cSld>
@@ -1070,7 +1241,175 @@
     </p:spTree>
     <p:extLst>
       <p:ext uri="{BB962C8B-B14F-4D97-AF65-F5344CB8AC3E}">
-        <p14:creationId xmlns:p14="http://schemas.microsoft.com/office/powerpoint/2010/main" val="1492098522"/>
+        <p14:creationId xmlns:p14="http://schemas.microsoft.com/office/powerpoint/2010/main" val="1656498631"/>
+      </p:ext>
+    </p:extLst>
+  </p:cSld>
+  <p:clrMapOvr>
+    <a:masterClrMapping/>
+  </p:clrMapOvr>
+</p:notes>
+</file>
+
+<file path=ppt/notesSlides/notesSlide8.xml><?xml version="1.0" encoding="utf-8"?>
+<p:notes xmlns:a="http://schemas.openxmlformats.org/drawingml/2006/main" xmlns:r="http://schemas.openxmlformats.org/officeDocument/2006/relationships" xmlns:p="http://schemas.openxmlformats.org/presentationml/2006/main">
+  <p:cSld>
+    <p:spTree>
+      <p:nvGrpSpPr>
+        <p:cNvPr id="1" name=""/>
+        <p:cNvGrpSpPr/>
+        <p:nvPr/>
+      </p:nvGrpSpPr>
+      <p:grpSpPr>
+        <a:xfrm>
+          <a:off x="0" y="0"/>
+          <a:ext cx="0" cy="0"/>
+          <a:chOff x="0" y="0"/>
+          <a:chExt cx="0" cy="0"/>
+        </a:xfrm>
+      </p:grpSpPr>
+      <p:sp>
+        <p:nvSpPr>
+          <p:cNvPr id="2" name="Espaço Reservado para Imagem de Slide 1"/>
+          <p:cNvSpPr>
+            <a:spLocks noGrp="1" noRot="1" noChangeAspect="1"/>
+          </p:cNvSpPr>
+          <p:nvPr>
+            <p:ph type="sldImg"/>
+          </p:nvPr>
+        </p:nvSpPr>
+        <p:spPr/>
+      </p:sp>
+      <p:sp>
+        <p:nvSpPr>
+          <p:cNvPr id="3" name="Espaço Reservado para Anotações 2"/>
+          <p:cNvSpPr>
+            <a:spLocks noGrp="1"/>
+          </p:cNvSpPr>
+          <p:nvPr>
+            <p:ph type="body" idx="1"/>
+          </p:nvPr>
+        </p:nvSpPr>
+        <p:spPr/>
+        <p:txBody>
+          <a:bodyPr/>
+          <a:lstStyle/>
+          <a:p>
+            <a:endParaRPr lang="pt-BR" dirty="0"/>
+          </a:p>
+        </p:txBody>
+      </p:sp>
+      <p:sp>
+        <p:nvSpPr>
+          <p:cNvPr id="4" name="Espaço Reservado para Número de Slide 3"/>
+          <p:cNvSpPr>
+            <a:spLocks noGrp="1"/>
+          </p:cNvSpPr>
+          <p:nvPr>
+            <p:ph type="sldNum" sz="quarter" idx="10"/>
+          </p:nvPr>
+        </p:nvSpPr>
+        <p:spPr/>
+        <p:txBody>
+          <a:bodyPr/>
+          <a:lstStyle/>
+          <a:p>
+            <a:fld id="{ECB4F886-580C-4471-933D-84EA2AD852AB}" type="slidenum">
+              <a:rPr lang="pt-BR" smtClean="0"/>
+              <a:t>16</a:t>
+            </a:fld>
+            <a:endParaRPr lang="pt-BR"/>
+          </a:p>
+        </p:txBody>
+      </p:sp>
+    </p:spTree>
+    <p:extLst>
+      <p:ext uri="{BB962C8B-B14F-4D97-AF65-F5344CB8AC3E}">
+        <p14:creationId xmlns:p14="http://schemas.microsoft.com/office/powerpoint/2010/main" val="3412644822"/>
+      </p:ext>
+    </p:extLst>
+  </p:cSld>
+  <p:clrMapOvr>
+    <a:masterClrMapping/>
+  </p:clrMapOvr>
+</p:notes>
+</file>
+
+<file path=ppt/notesSlides/notesSlide9.xml><?xml version="1.0" encoding="utf-8"?>
+<p:notes xmlns:a="http://schemas.openxmlformats.org/drawingml/2006/main" xmlns:r="http://schemas.openxmlformats.org/officeDocument/2006/relationships" xmlns:p="http://schemas.openxmlformats.org/presentationml/2006/main">
+  <p:cSld>
+    <p:spTree>
+      <p:nvGrpSpPr>
+        <p:cNvPr id="1" name=""/>
+        <p:cNvGrpSpPr/>
+        <p:nvPr/>
+      </p:nvGrpSpPr>
+      <p:grpSpPr>
+        <a:xfrm>
+          <a:off x="0" y="0"/>
+          <a:ext cx="0" cy="0"/>
+          <a:chOff x="0" y="0"/>
+          <a:chExt cx="0" cy="0"/>
+        </a:xfrm>
+      </p:grpSpPr>
+      <p:sp>
+        <p:nvSpPr>
+          <p:cNvPr id="2" name="Espaço Reservado para Imagem de Slide 1"/>
+          <p:cNvSpPr>
+            <a:spLocks noGrp="1" noRot="1" noChangeAspect="1"/>
+          </p:cNvSpPr>
+          <p:nvPr>
+            <p:ph type="sldImg"/>
+          </p:nvPr>
+        </p:nvSpPr>
+        <p:spPr/>
+      </p:sp>
+      <p:sp>
+        <p:nvSpPr>
+          <p:cNvPr id="3" name="Espaço Reservado para Anotações 2"/>
+          <p:cNvSpPr>
+            <a:spLocks noGrp="1"/>
+          </p:cNvSpPr>
+          <p:nvPr>
+            <p:ph type="body" idx="1"/>
+          </p:nvPr>
+        </p:nvSpPr>
+        <p:spPr/>
+        <p:txBody>
+          <a:bodyPr/>
+          <a:lstStyle/>
+          <a:p>
+            <a:endParaRPr lang="pt-BR" dirty="0"/>
+          </a:p>
+        </p:txBody>
+      </p:sp>
+      <p:sp>
+        <p:nvSpPr>
+          <p:cNvPr id="4" name="Espaço Reservado para Número de Slide 3"/>
+          <p:cNvSpPr>
+            <a:spLocks noGrp="1"/>
+          </p:cNvSpPr>
+          <p:nvPr>
+            <p:ph type="sldNum" sz="quarter" idx="10"/>
+          </p:nvPr>
+        </p:nvSpPr>
+        <p:spPr/>
+        <p:txBody>
+          <a:bodyPr/>
+          <a:lstStyle/>
+          <a:p>
+            <a:fld id="{ECB4F886-580C-4471-933D-84EA2AD852AB}" type="slidenum">
+              <a:rPr lang="pt-BR" smtClean="0"/>
+              <a:t>17</a:t>
+            </a:fld>
+            <a:endParaRPr lang="pt-BR"/>
+          </a:p>
+        </p:txBody>
+      </p:sp>
+    </p:spTree>
+    <p:extLst>
+      <p:ext uri="{BB962C8B-B14F-4D97-AF65-F5344CB8AC3E}">
+        <p14:creationId xmlns:p14="http://schemas.microsoft.com/office/powerpoint/2010/main" val="1601746875"/>
       </p:ext>
     </p:extLst>
   </p:cSld>
@@ -1292,7 +1631,7 @@
             <a:fld id="{94CDC042-039A-4E80-A826-4614F83E09D2}" type="datetimeFigureOut">
               <a:rPr lang="pt-BR" smtClean="0"/>
               <a:pPr/>
-              <a:t>13/11/2014</a:t>
+              <a:t>10/03/2015</a:t>
             </a:fld>
             <a:endParaRPr lang="pt-BR"/>
           </a:p>
@@ -1335,7 +1674,7 @@
             <a:fld id="{FD633073-5C0F-4B13-B3E3-2ADA7DBEA4A8}" type="slidenum">
               <a:rPr lang="pt-BR" smtClean="0"/>
               <a:pPr/>
-              <a:t>‹nº›</a:t>
+              <a:t>‹#›</a:t>
             </a:fld>
             <a:endParaRPr lang="pt-BR"/>
           </a:p>
@@ -1464,7 +1803,7 @@
             <a:fld id="{94CDC042-039A-4E80-A826-4614F83E09D2}" type="datetimeFigureOut">
               <a:rPr lang="pt-BR" smtClean="0"/>
               <a:pPr/>
-              <a:t>13/11/2014</a:t>
+              <a:t>10/03/2015</a:t>
             </a:fld>
             <a:endParaRPr lang="pt-BR"/>
           </a:p>
@@ -1507,7 +1846,7 @@
             <a:fld id="{FD633073-5C0F-4B13-B3E3-2ADA7DBEA4A8}" type="slidenum">
               <a:rPr lang="pt-BR" smtClean="0"/>
               <a:pPr/>
-              <a:t>‹nº›</a:t>
+              <a:t>‹#›</a:t>
             </a:fld>
             <a:endParaRPr lang="pt-BR"/>
           </a:p>
@@ -1646,7 +1985,7 @@
             <a:fld id="{94CDC042-039A-4E80-A826-4614F83E09D2}" type="datetimeFigureOut">
               <a:rPr lang="pt-BR" smtClean="0"/>
               <a:pPr/>
-              <a:t>13/11/2014</a:t>
+              <a:t>10/03/2015</a:t>
             </a:fld>
             <a:endParaRPr lang="pt-BR"/>
           </a:p>
@@ -1689,7 +2028,7 @@
             <a:fld id="{FD633073-5C0F-4B13-B3E3-2ADA7DBEA4A8}" type="slidenum">
               <a:rPr lang="pt-BR" smtClean="0"/>
               <a:pPr/>
-              <a:t>‹nº›</a:t>
+              <a:t>‹#›</a:t>
             </a:fld>
             <a:endParaRPr lang="pt-BR"/>
           </a:p>
@@ -1859,7 +2198,7 @@
             <a:fld id="{94CDC042-039A-4E80-A826-4614F83E09D2}" type="datetimeFigureOut">
               <a:rPr lang="pt-BR" smtClean="0"/>
               <a:pPr/>
-              <a:t>13/11/2014</a:t>
+              <a:t>10/03/2015</a:t>
             </a:fld>
             <a:endParaRPr lang="pt-BR"/>
           </a:p>
@@ -1902,7 +2241,7 @@
             <a:fld id="{FD633073-5C0F-4B13-B3E3-2ADA7DBEA4A8}" type="slidenum">
               <a:rPr lang="pt-BR" smtClean="0"/>
               <a:pPr/>
-              <a:t>‹nº›</a:t>
+              <a:t>‹#›</a:t>
             </a:fld>
             <a:endParaRPr lang="pt-BR"/>
           </a:p>
@@ -2107,7 +2446,7 @@
             <a:fld id="{94CDC042-039A-4E80-A826-4614F83E09D2}" type="datetimeFigureOut">
               <a:rPr lang="pt-BR" smtClean="0"/>
               <a:pPr/>
-              <a:t>13/11/2014</a:t>
+              <a:t>10/03/2015</a:t>
             </a:fld>
             <a:endParaRPr lang="pt-BR"/>
           </a:p>
@@ -2150,7 +2489,7 @@
             <a:fld id="{FD633073-5C0F-4B13-B3E3-2ADA7DBEA4A8}" type="slidenum">
               <a:rPr lang="pt-BR" smtClean="0"/>
               <a:pPr/>
-              <a:t>‹nº›</a:t>
+              <a:t>‹#›</a:t>
             </a:fld>
             <a:endParaRPr lang="pt-BR"/>
           </a:p>
@@ -2397,7 +2736,7 @@
             <a:fld id="{94CDC042-039A-4E80-A826-4614F83E09D2}" type="datetimeFigureOut">
               <a:rPr lang="pt-BR" smtClean="0"/>
               <a:pPr/>
-              <a:t>13/11/2014</a:t>
+              <a:t>10/03/2015</a:t>
             </a:fld>
             <a:endParaRPr lang="pt-BR"/>
           </a:p>
@@ -2440,7 +2779,7 @@
             <a:fld id="{FD633073-5C0F-4B13-B3E3-2ADA7DBEA4A8}" type="slidenum">
               <a:rPr lang="pt-BR" smtClean="0"/>
               <a:pPr/>
-              <a:t>‹nº›</a:t>
+              <a:t>‹#›</a:t>
             </a:fld>
             <a:endParaRPr lang="pt-BR"/>
           </a:p>
@@ -2821,7 +3160,7 @@
             <a:fld id="{94CDC042-039A-4E80-A826-4614F83E09D2}" type="datetimeFigureOut">
               <a:rPr lang="pt-BR" smtClean="0"/>
               <a:pPr/>
-              <a:t>13/11/2014</a:t>
+              <a:t>10/03/2015</a:t>
             </a:fld>
             <a:endParaRPr lang="pt-BR"/>
           </a:p>
@@ -2864,7 +3203,7 @@
             <a:fld id="{FD633073-5C0F-4B13-B3E3-2ADA7DBEA4A8}" type="slidenum">
               <a:rPr lang="pt-BR" smtClean="0"/>
               <a:pPr/>
-              <a:t>‹nº›</a:t>
+              <a:t>‹#›</a:t>
             </a:fld>
             <a:endParaRPr lang="pt-BR"/>
           </a:p>
@@ -2941,7 +3280,7 @@
             <a:fld id="{94CDC042-039A-4E80-A826-4614F83E09D2}" type="datetimeFigureOut">
               <a:rPr lang="pt-BR" smtClean="0"/>
               <a:pPr/>
-              <a:t>13/11/2014</a:t>
+              <a:t>10/03/2015</a:t>
             </a:fld>
             <a:endParaRPr lang="pt-BR"/>
           </a:p>
@@ -2984,7 +3323,7 @@
             <a:fld id="{FD633073-5C0F-4B13-B3E3-2ADA7DBEA4A8}" type="slidenum">
               <a:rPr lang="pt-BR" smtClean="0"/>
               <a:pPr/>
-              <a:t>‹nº›</a:t>
+              <a:t>‹#›</a:t>
             </a:fld>
             <a:endParaRPr lang="pt-BR"/>
           </a:p>
@@ -3038,7 +3377,7 @@
             <a:fld id="{94CDC042-039A-4E80-A826-4614F83E09D2}" type="datetimeFigureOut">
               <a:rPr lang="pt-BR" smtClean="0"/>
               <a:pPr/>
-              <a:t>13/11/2014</a:t>
+              <a:t>10/03/2015</a:t>
             </a:fld>
             <a:endParaRPr lang="pt-BR"/>
           </a:p>
@@ -3081,7 +3420,7 @@
             <a:fld id="{FD633073-5C0F-4B13-B3E3-2ADA7DBEA4A8}" type="slidenum">
               <a:rPr lang="pt-BR" smtClean="0"/>
               <a:pPr/>
-              <a:t>‹nº›</a:t>
+              <a:t>‹#›</a:t>
             </a:fld>
             <a:endParaRPr lang="pt-BR"/>
           </a:p>
@@ -3317,7 +3656,7 @@
             <a:fld id="{94CDC042-039A-4E80-A826-4614F83E09D2}" type="datetimeFigureOut">
               <a:rPr lang="pt-BR" smtClean="0"/>
               <a:pPr/>
-              <a:t>13/11/2014</a:t>
+              <a:t>10/03/2015</a:t>
             </a:fld>
             <a:endParaRPr lang="pt-BR"/>
           </a:p>
@@ -3360,7 +3699,7 @@
             <a:fld id="{FD633073-5C0F-4B13-B3E3-2ADA7DBEA4A8}" type="slidenum">
               <a:rPr lang="pt-BR" smtClean="0"/>
               <a:pPr/>
-              <a:t>‹nº›</a:t>
+              <a:t>‹#›</a:t>
             </a:fld>
             <a:endParaRPr lang="pt-BR"/>
           </a:p>
@@ -3572,7 +3911,7 @@
             <a:fld id="{94CDC042-039A-4E80-A826-4614F83E09D2}" type="datetimeFigureOut">
               <a:rPr lang="pt-BR" smtClean="0"/>
               <a:pPr/>
-              <a:t>13/11/2014</a:t>
+              <a:t>10/03/2015</a:t>
             </a:fld>
             <a:endParaRPr lang="pt-BR"/>
           </a:p>
@@ -3615,7 +3954,7 @@
             <a:fld id="{FD633073-5C0F-4B13-B3E3-2ADA7DBEA4A8}" type="slidenum">
               <a:rPr lang="pt-BR" smtClean="0"/>
               <a:pPr/>
-              <a:t>‹nº›</a:t>
+              <a:t>‹#›</a:t>
             </a:fld>
             <a:endParaRPr lang="pt-BR"/>
           </a:p>
@@ -3787,7 +4126,7 @@
             <a:fld id="{94CDC042-039A-4E80-A826-4614F83E09D2}" type="datetimeFigureOut">
               <a:rPr lang="pt-BR" smtClean="0"/>
               <a:pPr/>
-              <a:t>13/11/2014</a:t>
+              <a:t>10/03/2015</a:t>
             </a:fld>
             <a:endParaRPr lang="pt-BR"/>
           </a:p>
@@ -3866,7 +4205,7 @@
             <a:fld id="{FD633073-5C0F-4B13-B3E3-2ADA7DBEA4A8}" type="slidenum">
               <a:rPr lang="pt-BR" smtClean="0"/>
               <a:pPr/>
-              <a:t>‹nº›</a:t>
+              <a:t>‹#›</a:t>
             </a:fld>
             <a:endParaRPr lang="pt-BR"/>
           </a:p>
@@ -4452,13 +4791,13 @@
           <a:lstStyle/>
           <a:p>
             <a:r>
-              <a:rPr lang="pt-BR" sz="3600" dirty="0" smtClean="0">
+              <a:rPr lang="pt-BR" sz="3600" dirty="0">
                 <a:solidFill>
                   <a:srgbClr val="0000CC"/>
                 </a:solidFill>
                 <a:latin typeface="Tahoma" pitchFamily="34" charset="0"/>
               </a:rPr>
-              <a:t>Evidencias da existência do Sistema</a:t>
+              <a:t>Escopo do produto</a:t>
             </a:r>
             <a:endParaRPr lang="pt-BR" sz="3600" dirty="0">
               <a:solidFill>
@@ -4611,13 +4950,13 @@
           <a:lstStyle/>
           <a:p>
             <a:r>
-              <a:rPr lang="pt-BR" sz="3600" dirty="0" smtClean="0">
+              <a:rPr lang="pt-BR" sz="3600" dirty="0">
                 <a:solidFill>
                   <a:srgbClr val="0000CC"/>
                 </a:solidFill>
                 <a:latin typeface="Tahoma" pitchFamily="34" charset="0"/>
               </a:rPr>
-              <a:t>Evidencias da existência do Sistema</a:t>
+              <a:t>Escopo do produto</a:t>
             </a:r>
             <a:endParaRPr lang="pt-BR" sz="3600" dirty="0">
               <a:solidFill>
@@ -4815,13 +5154,13 @@
           <a:lstStyle/>
           <a:p>
             <a:r>
-              <a:rPr lang="pt-BR" sz="3600" dirty="0" smtClean="0">
+              <a:rPr lang="pt-BR" sz="3600" dirty="0">
                 <a:solidFill>
                   <a:srgbClr val="0000CC"/>
                 </a:solidFill>
                 <a:latin typeface="Tahoma" pitchFamily="34" charset="0"/>
               </a:rPr>
-              <a:t>Evidencias da existência do Sistema</a:t>
+              <a:t>Escopo do produto</a:t>
             </a:r>
             <a:endParaRPr lang="pt-BR" sz="3600" dirty="0">
               <a:solidFill>
@@ -5014,13 +5353,13 @@
           <a:lstStyle/>
           <a:p>
             <a:r>
-              <a:rPr lang="pt-BR" sz="3600" dirty="0" smtClean="0">
+              <a:rPr lang="pt-BR" sz="3600" dirty="0">
                 <a:solidFill>
                   <a:srgbClr val="0000CC"/>
                 </a:solidFill>
                 <a:latin typeface="Tahoma" pitchFamily="34" charset="0"/>
               </a:rPr>
-              <a:t>Evidencias da existência do Sistema</a:t>
+              <a:t>Escopo do produto</a:t>
             </a:r>
             <a:endParaRPr lang="pt-BR" sz="3600" dirty="0">
               <a:solidFill>
@@ -5075,7 +5414,7 @@
       </p:sp>
       <p:pic>
         <p:nvPicPr>
-          <p:cNvPr id="2" name="Imagem 1"/>
+          <p:cNvPr id="5" name="Imagem 2"/>
           <p:cNvPicPr>
             <a:picLocks noChangeAspect="1"/>
           </p:cNvPicPr>
@@ -5095,8 +5434,8 @@
         </p:blipFill>
         <p:spPr>
           <a:xfrm>
-            <a:off x="0" y="1470084"/>
-            <a:ext cx="9144000" cy="4691790"/>
+            <a:off x="0" y="1417638"/>
+            <a:ext cx="9144000" cy="4694418"/>
           </a:xfrm>
           <a:prstGeom prst="rect">
             <a:avLst/>
@@ -5179,7 +5518,7 @@
                 </a:solidFill>
                 <a:latin typeface="Tahoma" pitchFamily="34" charset="0"/>
               </a:rPr>
-              <a:t>Evidencias da existência do Sistema</a:t>
+              <a:t>Plano de gerenciamento do projeto</a:t>
             </a:r>
             <a:endParaRPr lang="pt-BR" sz="3600" dirty="0">
               <a:solidFill>
@@ -5199,7 +5538,7 @@
         <p:spPr>
           <a:xfrm>
             <a:off x="-180528" y="834963"/>
-            <a:ext cx="5832648" cy="461665"/>
+            <a:ext cx="9145016" cy="6247864"/>
           </a:xfrm>
           <a:prstGeom prst="rect">
             <a:avLst/>
@@ -5211,61 +5550,197 @@
           </a:bodyPr>
           <a:lstStyle/>
           <a:p>
-            <a:pPr marL="536575" lvl="2" indent="-174625">
-              <a:buSzPct val="80000"/>
-              <a:buFont typeface="Wingdings" pitchFamily="2" charset="2"/>
-              <a:buChar char="§"/>
+            <a:pPr marL="742950" lvl="1" indent="-285750">
+              <a:buFont typeface="Arial" panose="020B0604020202020204" pitchFamily="34" charset="0"/>
+              <a:buChar char="•"/>
             </a:pPr>
             <a:r>
-              <a:rPr lang="pt-BR" sz="2400" dirty="0" smtClean="0">
-                <a:latin typeface="Tahoma" panose="020B0604030504040204" pitchFamily="34" charset="0"/>
-                <a:ea typeface="Tahoma" panose="020B0604030504040204" pitchFamily="34" charset="0"/>
-                <a:cs typeface="Tahoma" panose="020B0604030504040204" pitchFamily="34" charset="0"/>
-              </a:rPr>
-              <a:t>Banco de Dados – Modelo logico</a:t>
-            </a:r>
-            <a:endParaRPr lang="pt-BR" sz="2400" dirty="0">
-              <a:latin typeface="Tahoma" panose="020B0604030504040204" pitchFamily="34" charset="0"/>
-              <a:ea typeface="Tahoma" panose="020B0604030504040204" pitchFamily="34" charset="0"/>
-              <a:cs typeface="Tahoma" panose="020B0604030504040204" pitchFamily="34" charset="0"/>
-            </a:endParaRPr>
-          </a:p>
-        </p:txBody>
-      </p:sp>
-      <p:pic>
-        <p:nvPicPr>
-          <p:cNvPr id="3" name="Imagem 2"/>
-          <p:cNvPicPr>
-            <a:picLocks noChangeAspect="1"/>
-          </p:cNvPicPr>
-          <p:nvPr/>
-        </p:nvPicPr>
-        <p:blipFill>
-          <a:blip r:embed="rId3">
-            <a:extLst>
-              <a:ext uri="{28A0092B-C50C-407E-A947-70E740481C1C}">
-                <a14:useLocalDpi xmlns:a14="http://schemas.microsoft.com/office/drawing/2010/main" val="0"/>
-              </a:ext>
-            </a:extLst>
-          </a:blip>
-          <a:stretch>
-            <a:fillRect/>
-          </a:stretch>
-        </p:blipFill>
-        <p:spPr>
-          <a:xfrm>
-            <a:off x="0" y="1270407"/>
-            <a:ext cx="9144000" cy="4923692"/>
-          </a:xfrm>
-          <a:prstGeom prst="rect">
-            <a:avLst/>
-          </a:prstGeom>
-        </p:spPr>
-      </p:pic>
+              <a:rPr lang="pt-BR" sz="2000" b="1" dirty="0"/>
+              <a:t>PLANO DE GERENCIAMENTO DO </a:t>
+            </a:r>
+            <a:r>
+              <a:rPr lang="pt-BR" sz="2000" b="1" dirty="0" smtClean="0"/>
+              <a:t>ESCOPO</a:t>
+            </a:r>
+          </a:p>
+          <a:p>
+            <a:pPr lvl="1"/>
+            <a:r>
+              <a:rPr lang="pt-BR" dirty="0"/>
+              <a:t> </a:t>
+            </a:r>
+            <a:r>
+              <a:rPr lang="pt-BR" dirty="0" smtClean="0"/>
+              <a:t>    Sera criado um doumento que ira apresentar o plano do projeto.</a:t>
+            </a:r>
+          </a:p>
+          <a:p>
+            <a:pPr lvl="1"/>
+            <a:r>
+              <a:rPr lang="pt-BR" b="1" dirty="0" smtClean="0"/>
+              <a:t>     </a:t>
+            </a:r>
+            <a:r>
+              <a:rPr lang="pt-BR" dirty="0"/>
+              <a:t>Mudanças no escopo devem ser solicitadas apenas pelo cliente onde ira solicitar uma reunião com o gerente do projeto</a:t>
+            </a:r>
+            <a:r>
+              <a:rPr lang="pt-BR" sz="2000" b="1" dirty="0"/>
+              <a:t>	</a:t>
+            </a:r>
+            <a:endParaRPr lang="pt-BR" sz="2000" b="1" dirty="0" smtClean="0"/>
+          </a:p>
+          <a:p>
+            <a:pPr lvl="1"/>
+            <a:endParaRPr lang="pt-BR" b="1" dirty="0"/>
+          </a:p>
+          <a:p>
+            <a:pPr marL="742950" lvl="1" indent="-285750">
+              <a:buFont typeface="Arial" panose="020B0604020202020204" pitchFamily="34" charset="0"/>
+              <a:buChar char="•"/>
+            </a:pPr>
+            <a:r>
+              <a:rPr lang="pt-BR" b="1" dirty="0"/>
+              <a:t>PLANO DE GERENCIAMENTO DO </a:t>
+            </a:r>
+            <a:r>
+              <a:rPr lang="pt-BR" b="1" dirty="0" smtClean="0"/>
+              <a:t>TEMPO</a:t>
+            </a:r>
+          </a:p>
+          <a:p>
+            <a:pPr lvl="1"/>
+            <a:r>
+              <a:rPr lang="pt-BR" b="1" dirty="0"/>
+              <a:t> </a:t>
+            </a:r>
+            <a:r>
+              <a:rPr lang="pt-BR" b="1" dirty="0" smtClean="0"/>
+              <a:t>   </a:t>
+            </a:r>
+            <a:r>
+              <a:rPr lang="pt-BR" dirty="0"/>
+              <a:t>As mudanças que ocorrerem no cronograma serão documentadas pelo gerente do projeto.</a:t>
+            </a:r>
+          </a:p>
+          <a:p>
+            <a:pPr lvl="1"/>
+            <a:r>
+              <a:rPr lang="pt-BR" dirty="0"/>
+              <a:t> </a:t>
+            </a:r>
+            <a:r>
+              <a:rPr lang="pt-BR" dirty="0"/>
+              <a:t>   Tecnicas para superar o problema de falta de tempo para conclusão do projeto:</a:t>
+            </a:r>
+          </a:p>
+          <a:p>
+            <a:r>
+              <a:rPr lang="pt-BR" dirty="0"/>
+              <a:t>	- </a:t>
+            </a:r>
+            <a:r>
+              <a:rPr lang="pt-BR" dirty="0"/>
+              <a:t>Adicionar recursos as atividades(</a:t>
+            </a:r>
+            <a:r>
+              <a:rPr lang="pt-BR" i="1" dirty="0"/>
+              <a:t>Crashing</a:t>
+            </a:r>
+            <a:r>
+              <a:rPr lang="pt-BR" dirty="0"/>
+              <a:t>)</a:t>
+            </a:r>
+          </a:p>
+          <a:p>
+            <a:r>
+              <a:rPr lang="pt-BR" dirty="0"/>
+              <a:t>	- </a:t>
+            </a:r>
+            <a:r>
+              <a:rPr lang="pt-BR" dirty="0"/>
+              <a:t>Aumentar as horas de trabalho</a:t>
+            </a:r>
+          </a:p>
+          <a:p>
+            <a:r>
+              <a:rPr lang="pt-BR" dirty="0"/>
+              <a:t>	- Executa atividades em paralelo(Paralelismo)</a:t>
+            </a:r>
+          </a:p>
+          <a:p>
+            <a:r>
+              <a:rPr lang="pt-BR" dirty="0"/>
+              <a:t> 	- Redução do escopo do projeto(Com acordo do cliente)</a:t>
+            </a:r>
+          </a:p>
+          <a:p>
+            <a:pPr lvl="1"/>
+            <a:endParaRPr lang="pt-BR" dirty="0"/>
+          </a:p>
+          <a:p>
+            <a:pPr marL="742950" lvl="1" indent="-285750">
+              <a:buFont typeface="Arial" panose="020B0604020202020204" pitchFamily="34" charset="0"/>
+              <a:buChar char="•"/>
+            </a:pPr>
+            <a:r>
+              <a:rPr lang="pt-BR" b="1" dirty="0"/>
+              <a:t>PLANO DE GERENCIAMENTO DOS </a:t>
+            </a:r>
+            <a:r>
+              <a:rPr lang="pt-BR" b="1" dirty="0" smtClean="0"/>
+              <a:t>CUSTOS</a:t>
+            </a:r>
+          </a:p>
+          <a:p>
+            <a:pPr lvl="1"/>
+            <a:r>
+              <a:rPr lang="pt-BR" b="1" dirty="0" smtClean="0"/>
+              <a:t>  </a:t>
+            </a:r>
+            <a:r>
+              <a:rPr lang="pt-BR" dirty="0"/>
+              <a:t>Todo custo do projeto sera levantado em uma reunião com toda equipe do projeto.</a:t>
+            </a:r>
+          </a:p>
+          <a:p>
+            <a:pPr lvl="1"/>
+            <a:r>
+              <a:rPr lang="pt-BR" dirty="0"/>
+              <a:t> </a:t>
+            </a:r>
+            <a:r>
+              <a:rPr lang="pt-BR" dirty="0"/>
+              <a:t> Verifica-se com o gerente do projeto se o custo realmente é necessário ou não para o andamento do projeto.</a:t>
+            </a:r>
+          </a:p>
+          <a:p>
+            <a:r>
+              <a:rPr lang="pt-BR" dirty="0"/>
+              <a:t> </a:t>
+            </a:r>
+          </a:p>
+          <a:p>
+            <a:pPr lvl="1"/>
+            <a:endParaRPr lang="pt-BR" b="1" dirty="0" smtClean="0"/>
+          </a:p>
+          <a:p>
+            <a:r>
+              <a:rPr lang="pt-BR" dirty="0"/>
+              <a:t> </a:t>
+            </a:r>
+            <a:endParaRPr lang="pt-BR" b="1" dirty="0"/>
+          </a:p>
+          <a:p>
+            <a:pPr lvl="1"/>
+            <a:endParaRPr lang="pt-BR" b="1" dirty="0"/>
+          </a:p>
+        </p:txBody>
+      </p:sp>
     </p:spTree>
     <p:extLst>
       <p:ext uri="{BB962C8B-B14F-4D97-AF65-F5344CB8AC3E}">
-        <p14:creationId xmlns:p14="http://schemas.microsoft.com/office/powerpoint/2010/main" val="1537271871"/>
+        <p14:creationId xmlns:p14="http://schemas.microsoft.com/office/powerpoint/2010/main" val="542886408"/>
       </p:ext>
     </p:extLst>
   </p:cSld>
@@ -5338,7 +5813,7 @@
                 </a:solidFill>
                 <a:latin typeface="Tahoma" pitchFamily="34" charset="0"/>
               </a:rPr>
-              <a:t>Evidencias da existência do Sistema</a:t>
+              <a:t>Plano de gerenciamento do projeto</a:t>
             </a:r>
             <a:endParaRPr lang="pt-BR" sz="3600" dirty="0">
               <a:solidFill>
@@ -5358,7 +5833,7 @@
         <p:spPr>
           <a:xfrm>
             <a:off x="-180528" y="834963"/>
-            <a:ext cx="5832648" cy="461665"/>
+            <a:ext cx="9324528" cy="4247317"/>
           </a:xfrm>
           <a:prstGeom prst="rect">
             <a:avLst/>
@@ -5370,103 +5845,154 @@
           </a:bodyPr>
           <a:lstStyle/>
           <a:p>
-            <a:pPr marL="536575" lvl="2" indent="-174625">
-              <a:buSzPct val="80000"/>
-              <a:buFont typeface="Wingdings" pitchFamily="2" charset="2"/>
-              <a:buChar char="§"/>
+            <a:pPr marL="742950" lvl="1" indent="-285750">
+              <a:buFont typeface="Arial" panose="020B0604020202020204" pitchFamily="34" charset="0"/>
+              <a:buChar char="•"/>
             </a:pPr>
             <a:r>
-              <a:rPr lang="pt-BR" sz="2400" dirty="0" smtClean="0">
-                <a:latin typeface="Tahoma" panose="020B0604030504040204" pitchFamily="34" charset="0"/>
-                <a:ea typeface="Tahoma" panose="020B0604030504040204" pitchFamily="34" charset="0"/>
-                <a:cs typeface="Tahoma" panose="020B0604030504040204" pitchFamily="34" charset="0"/>
-              </a:rPr>
-              <a:t>Protótipo de Alta Fidelidade</a:t>
-            </a:r>
-            <a:endParaRPr lang="pt-BR" sz="2400" dirty="0">
-              <a:latin typeface="Tahoma" panose="020B0604030504040204" pitchFamily="34" charset="0"/>
-              <a:ea typeface="Tahoma" panose="020B0604030504040204" pitchFamily="34" charset="0"/>
-              <a:cs typeface="Tahoma" panose="020B0604030504040204" pitchFamily="34" charset="0"/>
-            </a:endParaRPr>
-          </a:p>
-        </p:txBody>
-      </p:sp>
-      <p:pic>
-        <p:nvPicPr>
-          <p:cNvPr id="2" name="Imagem 1"/>
-          <p:cNvPicPr>
-            <a:picLocks noChangeAspect="1"/>
-          </p:cNvPicPr>
-          <p:nvPr/>
-        </p:nvPicPr>
-        <p:blipFill>
-          <a:blip r:embed="rId3">
-            <a:extLst>
-              <a:ext uri="{28A0092B-C50C-407E-A947-70E740481C1C}">
-                <a14:useLocalDpi xmlns:a14="http://schemas.microsoft.com/office/drawing/2010/main" val="0"/>
-              </a:ext>
-            </a:extLst>
-          </a:blip>
-          <a:stretch>
-            <a:fillRect/>
-          </a:stretch>
-        </p:blipFill>
-        <p:spPr>
-          <a:xfrm>
-            <a:off x="1453018" y="1296628"/>
-            <a:ext cx="6237964" cy="4819990"/>
-          </a:xfrm>
-          <a:prstGeom prst="rect">
-            <a:avLst/>
-          </a:prstGeom>
-        </p:spPr>
-      </p:pic>
-      <p:sp>
-        <p:nvSpPr>
-          <p:cNvPr id="6" name="Retângulo 5"/>
-          <p:cNvSpPr/>
-          <p:nvPr/>
-        </p:nvSpPr>
-        <p:spPr>
-          <a:xfrm>
-            <a:off x="251520" y="6021288"/>
-            <a:ext cx="8136904" cy="461665"/>
-          </a:xfrm>
-          <a:prstGeom prst="rect">
-            <a:avLst/>
-          </a:prstGeom>
-        </p:spPr>
-        <p:txBody>
-          <a:bodyPr wrap="square">
-            <a:spAutoFit/>
-          </a:bodyPr>
-          <a:lstStyle/>
-          <a:p>
-            <a:pPr>
-              <a:buClr>
-                <a:schemeClr val="bg2"/>
-              </a:buClr>
+              <a:rPr lang="pt-BR" b="1" dirty="0" smtClean="0"/>
+              <a:t>PLANO </a:t>
+            </a:r>
+            <a:r>
+              <a:rPr lang="pt-BR" b="1" dirty="0"/>
+              <a:t>DE GERENCIAMENTO DA </a:t>
+            </a:r>
+            <a:r>
+              <a:rPr lang="pt-BR" b="1" dirty="0" smtClean="0"/>
+              <a:t>QUALIDADE</a:t>
+            </a:r>
+          </a:p>
+          <a:p>
+            <a:pPr lvl="1"/>
+            <a:r>
+              <a:rPr lang="pt-BR" b="1" dirty="0"/>
+              <a:t> </a:t>
+            </a:r>
+            <a:r>
+              <a:rPr lang="pt-BR" b="1" dirty="0" smtClean="0"/>
+              <a:t> </a:t>
+            </a:r>
+            <a:r>
+              <a:rPr lang="pt-BR" dirty="0"/>
+              <a:t>Garantir a qualidade durante toda o desenvolvimento do projeto.</a:t>
+            </a:r>
+          </a:p>
+          <a:p>
+            <a:pPr lvl="1"/>
+            <a:r>
+              <a:rPr lang="pt-BR" dirty="0"/>
+              <a:t> </a:t>
+            </a:r>
+            <a:r>
+              <a:rPr lang="pt-BR" dirty="0"/>
+              <a:t>Padrões de qualidade impostos pela equipe: </a:t>
+            </a:r>
+            <a:r>
+              <a:rPr lang="pt-BR" dirty="0"/>
+              <a:t>Site </a:t>
+            </a:r>
+            <a:r>
+              <a:rPr lang="pt-BR" dirty="0"/>
+              <a:t>responsivo, Site com </a:t>
+            </a:r>
+            <a:r>
+              <a:rPr lang="pt-BR" dirty="0" smtClean="0"/>
+              <a:t>funcionalidades </a:t>
+            </a:r>
+            <a:r>
+              <a:rPr lang="pt-BR" dirty="0"/>
+              <a:t>intuitivas, Boa visibilidade do website, barra de menus em todas paginas do website, verificação de todos os links de acesso</a:t>
+            </a:r>
+            <a:endParaRPr lang="pt-BR" dirty="0"/>
+          </a:p>
+          <a:p>
+            <a:endParaRPr lang="pt-BR" dirty="0"/>
+          </a:p>
+          <a:p>
+            <a:pPr marL="742950" lvl="1" indent="-285750">
+              <a:buFont typeface="Arial" panose="020B0604020202020204" pitchFamily="34" charset="0"/>
+              <a:buChar char="•"/>
             </a:pPr>
             <a:r>
-              <a:rPr lang="pt-BR" sz="2400" dirty="0" smtClean="0">
-                <a:solidFill>
-                  <a:srgbClr val="FF0000"/>
-                </a:solidFill>
-              </a:rPr>
-              <a:t>*O visual final da tela Inicial ainda está sendo desenvolvido</a:t>
-            </a:r>
-            <a:endParaRPr lang="pt-BR" sz="2400" dirty="0">
-              <a:solidFill>
-                <a:srgbClr val="FF0000"/>
-              </a:solidFill>
-            </a:endParaRPr>
+              <a:rPr lang="pt-BR" b="1" dirty="0"/>
+              <a:t>PLANO DE GERENCIAMENTO DOS RECURSOS </a:t>
+            </a:r>
+            <a:r>
+              <a:rPr lang="pt-BR" b="1" dirty="0" smtClean="0"/>
+              <a:t>HUMANOS</a:t>
+            </a:r>
+          </a:p>
+          <a:p>
+            <a:pPr lvl="1"/>
+            <a:r>
+              <a:rPr lang="pt-BR" b="1" dirty="0" smtClean="0"/>
+              <a:t> </a:t>
+            </a:r>
+            <a:r>
+              <a:rPr lang="pt-BR" dirty="0"/>
+              <a:t>Deve-se identificar as funcões de todos os membros da equipe do projeto e também as relações hierarquicas na </a:t>
+            </a:r>
+            <a:r>
+              <a:rPr lang="pt-BR" dirty="0" smtClean="0"/>
+              <a:t>equipe.</a:t>
+            </a:r>
+          </a:p>
+          <a:p>
+            <a:pPr lvl="1"/>
+            <a:r>
+              <a:rPr lang="pt-BR" dirty="0"/>
+              <a:t>O gerente do projeto será o responsável por mobilizar a equipe e por uma melhor interação entre todos </a:t>
+            </a:r>
+            <a:r>
+              <a:rPr lang="pt-BR" dirty="0" smtClean="0"/>
+              <a:t>os </a:t>
+            </a:r>
+            <a:r>
+              <a:rPr lang="pt-BR" dirty="0"/>
+              <a:t>membros da </a:t>
+            </a:r>
+            <a:r>
+              <a:rPr lang="pt-BR" dirty="0" smtClean="0"/>
+              <a:t>equipe.</a:t>
+            </a:r>
+            <a:endParaRPr lang="pt-BR" b="1" dirty="0"/>
+          </a:p>
+          <a:p>
+            <a:pPr lvl="1"/>
+            <a:endParaRPr lang="pt-BR" b="1" dirty="0"/>
+          </a:p>
+          <a:p>
+            <a:pPr marL="742950" lvl="1" indent="-285750">
+              <a:buFont typeface="Arial" panose="020B0604020202020204" pitchFamily="34" charset="0"/>
+              <a:buChar char="•"/>
+            </a:pPr>
+            <a:r>
+              <a:rPr lang="pt-BR" b="1" dirty="0"/>
+              <a:t>PLANO DE GERENCIAMENTO DAS COMUNICAÇÕES</a:t>
+            </a:r>
+          </a:p>
+          <a:p>
+            <a:pPr lvl="1"/>
+            <a:r>
+              <a:rPr lang="pt-BR" dirty="0"/>
+              <a:t>O gerente do projeto deve garantir a comunicação entre todas partes envolventes do projeto</a:t>
+            </a:r>
+            <a:endParaRPr lang="pt-BR" dirty="0"/>
+          </a:p>
+          <a:p>
+            <a:pPr lvl="1"/>
+            <a:r>
+              <a:rPr lang="pt-BR" dirty="0"/>
+              <a:t>Serão realizadas reuniões semanais com o patrocinador e o cliente</a:t>
+            </a:r>
+            <a:endParaRPr lang="pt-BR" dirty="0"/>
           </a:p>
         </p:txBody>
       </p:sp>
     </p:spTree>
     <p:extLst>
       <p:ext uri="{BB962C8B-B14F-4D97-AF65-F5344CB8AC3E}">
-        <p14:creationId xmlns:p14="http://schemas.microsoft.com/office/powerpoint/2010/main" val="76413792"/>
+        <p14:creationId xmlns:p14="http://schemas.microsoft.com/office/powerpoint/2010/main" val="2571946725"/>
       </p:ext>
     </p:extLst>
   </p:cSld>
@@ -5502,107 +6028,7 @@
       </p:grpSpPr>
       <p:sp>
         <p:nvSpPr>
-          <p:cNvPr id="83970" name="Text Box 2"/>
-          <p:cNvSpPr txBox="1">
-            <a:spLocks noChangeArrowheads="1"/>
-          </p:cNvSpPr>
-          <p:nvPr/>
-        </p:nvSpPr>
-        <p:spPr bwMode="auto">
-          <a:xfrm>
-            <a:off x="152400" y="857232"/>
-            <a:ext cx="8812213" cy="2308324"/>
-          </a:xfrm>
-          <a:prstGeom prst="rect">
-            <a:avLst/>
-          </a:prstGeom>
-          <a:noFill/>
-          <a:ln w="9525">
-            <a:noFill/>
-            <a:miter lim="800000"/>
-            <a:headEnd/>
-            <a:tailEnd/>
-          </a:ln>
-        </p:spPr>
-        <p:txBody>
-          <a:bodyPr>
-            <a:spAutoFit/>
-          </a:bodyPr>
-          <a:lstStyle/>
-          <a:p>
-            <a:pPr algn="l">
-              <a:buFont typeface="Wingdings" pitchFamily="2" charset="2"/>
-              <a:buNone/>
-            </a:pPr>
-            <a:endParaRPr lang="pt-BR" sz="2400" dirty="0">
-              <a:latin typeface="Tahoma" panose="020B0604030504040204" pitchFamily="34" charset="0"/>
-              <a:ea typeface="Tahoma" panose="020B0604030504040204" pitchFamily="34" charset="0"/>
-              <a:cs typeface="Tahoma" panose="020B0604030504040204" pitchFamily="34" charset="0"/>
-            </a:endParaRPr>
-          </a:p>
-          <a:p>
-            <a:pPr marL="536575" lvl="2" indent="-174625">
-              <a:buSzPct val="80000"/>
-              <a:buFont typeface="Wingdings" pitchFamily="2" charset="2"/>
-              <a:buChar char="§"/>
-            </a:pPr>
-            <a:r>
-              <a:rPr lang="pt-BR" sz="2400" dirty="0" smtClean="0">
-                <a:latin typeface="Tahoma" panose="020B0604030504040204" pitchFamily="34" charset="0"/>
-                <a:ea typeface="Tahoma" panose="020B0604030504040204" pitchFamily="34" charset="0"/>
-                <a:cs typeface="Tahoma" panose="020B0604030504040204" pitchFamily="34" charset="0"/>
-              </a:rPr>
-              <a:t>O </a:t>
-            </a:r>
-            <a:r>
-              <a:rPr lang="pt-BR" sz="2400" dirty="0">
-                <a:latin typeface="Tahoma" panose="020B0604030504040204" pitchFamily="34" charset="0"/>
-                <a:ea typeface="Tahoma" panose="020B0604030504040204" pitchFamily="34" charset="0"/>
-                <a:cs typeface="Tahoma" panose="020B0604030504040204" pitchFamily="34" charset="0"/>
-              </a:rPr>
-              <a:t>ponto principal do sistema é a possibilidade de controle e gestão que ele oferece para a clínica, além de facilidade para o paciente que for realizar um </a:t>
-            </a:r>
-            <a:r>
-              <a:rPr lang="pt-BR" sz="2400" dirty="0" smtClean="0">
-                <a:latin typeface="Tahoma" panose="020B0604030504040204" pitchFamily="34" charset="0"/>
-                <a:ea typeface="Tahoma" panose="020B0604030504040204" pitchFamily="34" charset="0"/>
-                <a:cs typeface="Tahoma" panose="020B0604030504040204" pitchFamily="34" charset="0"/>
-              </a:rPr>
-              <a:t>exame.</a:t>
-            </a:r>
-          </a:p>
-          <a:p>
-            <a:pPr marL="901700" lvl="2" indent="-279400" algn="l">
-              <a:buSzPct val="80000"/>
-              <a:buFont typeface="Wingdings" pitchFamily="2" charset="2"/>
-              <a:buNone/>
-            </a:pPr>
-            <a:endParaRPr lang="pt-BR" sz="2400" dirty="0">
-              <a:latin typeface="Tahoma" panose="020B0604030504040204" pitchFamily="34" charset="0"/>
-              <a:ea typeface="Tahoma" panose="020B0604030504040204" pitchFamily="34" charset="0"/>
-              <a:cs typeface="Tahoma" panose="020B0604030504040204" pitchFamily="34" charset="0"/>
-            </a:endParaRPr>
-          </a:p>
-          <a:p>
-            <a:pPr marL="536575" lvl="2" indent="-174625">
-              <a:buSzPct val="80000"/>
-              <a:buFont typeface="Wingdings" pitchFamily="2" charset="2"/>
-              <a:buChar char="§"/>
-            </a:pPr>
-            <a:r>
-              <a:rPr lang="pt-BR" sz="2400" dirty="0" smtClean="0">
-                <a:latin typeface="Tahoma" panose="020B0604030504040204" pitchFamily="34" charset="0"/>
-                <a:ea typeface="Tahoma" panose="020B0604030504040204" pitchFamily="34" charset="0"/>
-                <a:cs typeface="Tahoma" panose="020B0604030504040204" pitchFamily="34" charset="0"/>
-              </a:rPr>
-              <a:t>Novas funcionalidades serão implementadas</a:t>
-            </a:r>
-          </a:p>
-        </p:txBody>
-      </p:sp>
-      <p:sp>
-        <p:nvSpPr>
-          <p:cNvPr id="11267" name="Rectangle 3"/>
+          <p:cNvPr id="9219" name="Rectangle 3"/>
           <p:cNvSpPr>
             <a:spLocks noGrp="1" noChangeArrowheads="1"/>
           </p:cNvSpPr>
@@ -5639,7 +6065,7 @@
                 </a:solidFill>
                 <a:latin typeface="Tahoma" pitchFamily="34" charset="0"/>
               </a:rPr>
-              <a:t>Conclusão</a:t>
+              <a:t>Plano de gerenciamento do projeto</a:t>
             </a:r>
             <a:endParaRPr lang="pt-BR" sz="3600" dirty="0">
               <a:solidFill>
@@ -5650,7 +6076,129 @@
           </a:p>
         </p:txBody>
       </p:sp>
+      <p:sp>
+        <p:nvSpPr>
+          <p:cNvPr id="8" name="Retângulo 7"/>
+          <p:cNvSpPr/>
+          <p:nvPr/>
+        </p:nvSpPr>
+        <p:spPr>
+          <a:xfrm>
+            <a:off x="-180528" y="834963"/>
+            <a:ext cx="9324528" cy="2862322"/>
+          </a:xfrm>
+          <a:prstGeom prst="rect">
+            <a:avLst/>
+          </a:prstGeom>
+        </p:spPr>
+        <p:txBody>
+          <a:bodyPr wrap="square">
+            <a:spAutoFit/>
+          </a:bodyPr>
+          <a:lstStyle/>
+          <a:p>
+            <a:pPr marL="742950" lvl="1" indent="-285750">
+              <a:buFont typeface="Arial" panose="020B0604020202020204" pitchFamily="34" charset="0"/>
+              <a:buChar char="•"/>
+            </a:pPr>
+            <a:r>
+              <a:rPr lang="pt-BR" b="1" dirty="0" smtClean="0"/>
+              <a:t>PLANO DE GERENCIAMENTO DOS RISCOS</a:t>
+            </a:r>
+          </a:p>
+          <a:p>
+            <a:pPr lvl="1"/>
+            <a:r>
+              <a:rPr lang="pt-BR" b="1" dirty="0"/>
+              <a:t> </a:t>
+            </a:r>
+            <a:r>
+              <a:rPr lang="pt-BR" b="1" dirty="0" smtClean="0"/>
+              <a:t>   </a:t>
+            </a:r>
+            <a:r>
+              <a:rPr lang="pt-BR" dirty="0"/>
+              <a:t>Possuir um plano de ação para quaisquer riscos que possam surgir.</a:t>
+            </a:r>
+          </a:p>
+          <a:p>
+            <a:pPr lvl="1"/>
+            <a:r>
+              <a:rPr lang="pt-BR" dirty="0"/>
+              <a:t>    Gerente </a:t>
+            </a:r>
+            <a:r>
+              <a:rPr lang="pt-BR" dirty="0" smtClean="0"/>
+              <a:t>do </a:t>
+            </a:r>
+            <a:r>
+              <a:rPr lang="pt-BR" dirty="0"/>
+              <a:t>projeto deve verificar se o risco </a:t>
+            </a:r>
+            <a:r>
+              <a:rPr lang="pt-BR" dirty="0" smtClean="0"/>
+              <a:t>exige </a:t>
+            </a:r>
+            <a:r>
+              <a:rPr lang="pt-BR" dirty="0"/>
+              <a:t>resposta de curto ou longo prazo.</a:t>
+            </a:r>
+          </a:p>
+          <a:p>
+            <a:pPr lvl="1"/>
+            <a:r>
+              <a:rPr lang="pt-BR" dirty="0"/>
+              <a:t> </a:t>
+            </a:r>
+            <a:r>
+              <a:rPr lang="pt-BR" dirty="0"/>
+              <a:t>   Riscos de grande impacto para o projeto devem ser reportados para o cliente.</a:t>
+            </a:r>
+          </a:p>
+          <a:p>
+            <a:r>
+              <a:rPr lang="pt-BR" dirty="0" smtClean="0"/>
+              <a:t> </a:t>
+            </a:r>
+            <a:endParaRPr lang="pt-BR" sz="2000" dirty="0" smtClean="0"/>
+          </a:p>
+          <a:p>
+            <a:pPr marL="742950" lvl="1" indent="-285750">
+              <a:buFont typeface="Arial" panose="020B0604020202020204" pitchFamily="34" charset="0"/>
+              <a:buChar char="•"/>
+            </a:pPr>
+            <a:r>
+              <a:rPr lang="pt-BR" b="1" dirty="0" smtClean="0"/>
+              <a:t>PLANO DE GERENCIAMENTO DAS AQUISIÇÕES</a:t>
+            </a:r>
+          </a:p>
+          <a:p>
+            <a:pPr lvl="1"/>
+            <a:r>
+              <a:rPr lang="pt-BR" dirty="0"/>
+              <a:t> </a:t>
+            </a:r>
+            <a:r>
+              <a:rPr lang="pt-BR" dirty="0"/>
+              <a:t>    Novas necessidades de aquisições devem ser reportadas ao Gerente do projeto pelos membros da equipe</a:t>
+            </a:r>
+          </a:p>
+          <a:p>
+            <a:pPr lvl="1"/>
+            <a:endParaRPr lang="pt-BR" b="1" dirty="0"/>
+          </a:p>
+          <a:p>
+            <a:pPr lvl="1"/>
+            <a:endParaRPr lang="pt-BR" b="1" dirty="0"/>
+          </a:p>
+        </p:txBody>
+      </p:sp>
     </p:spTree>
+    <p:extLst>
+      <p:ext uri="{BB962C8B-B14F-4D97-AF65-F5344CB8AC3E}">
+        <p14:creationId xmlns:p14="http://schemas.microsoft.com/office/powerpoint/2010/main" val="962362231"/>
+      </p:ext>
+    </p:extLst>
   </p:cSld>
   <p:clrMapOvr>
     <a:masterClrMapping/>
@@ -5684,20 +6232,19 @@
       </p:grpSpPr>
       <p:sp>
         <p:nvSpPr>
-          <p:cNvPr id="3" name="Text Box 2"/>
-          <p:cNvSpPr txBox="1">
-            <a:spLocks noChangeArrowheads="1"/>
-          </p:cNvSpPr>
-          <p:nvPr/>
-        </p:nvSpPr>
-        <p:spPr bwMode="auto">
+          <p:cNvPr id="9219" name="Rectangle 3"/>
+          <p:cNvSpPr>
+            <a:spLocks noGrp="1" noChangeArrowheads="1"/>
+          </p:cNvSpPr>
+          <p:nvPr>
+            <p:ph type="title"/>
+          </p:nvPr>
+        </p:nvSpPr>
+        <p:spPr>
           <a:xfrm>
-            <a:off x="2038350" y="2636912"/>
-            <a:ext cx="5105400" cy="914400"/>
+            <a:off x="0" y="58738"/>
+            <a:ext cx="9144000" cy="777875"/>
           </a:xfrm>
-          <a:prstGeom prst="rect">
-            <a:avLst/>
-          </a:prstGeom>
           <a:noFill/>
           <a:ln w="9525">
             <a:noFill/>
@@ -5705,40 +6252,29 @@
             <a:headEnd/>
             <a:tailEnd/>
           </a:ln>
-          <a:effectLst/>
         </p:spPr>
         <p:txBody>
-          <a:bodyPr>
-            <a:spAutoFit/>
+          <a:bodyPr vert="horz" wrap="square" lIns="0" tIns="0" rIns="0" bIns="0" numCol="1" rtlCol="0" anchor="t" anchorCtr="0" compatLnSpc="1">
+            <a:prstTxWarp prst="textNoShape">
+              <a:avLst/>
+            </a:prstTxWarp>
+            <a:normAutofit/>
           </a:bodyPr>
           <a:lstStyle/>
           <a:p>
-            <a:pPr algn="ctr">
-              <a:defRPr/>
-            </a:pPr>
-            <a:r>
-              <a:rPr lang="pt-BR" sz="5400" b="1" dirty="0">
-                <a:solidFill>
-                  <a:srgbClr val="CC0000"/>
-                </a:solidFill>
-                <a:effectLst>
-                  <a:outerShdw blurRad="38100" dist="38100" dir="2700000" algn="tl">
-                    <a:srgbClr val="C0C0C0"/>
-                  </a:outerShdw>
-                </a:effectLst>
+            <a:r>
+              <a:rPr lang="pt-BR" sz="3600" dirty="0" smtClean="0">
+                <a:solidFill>
+                  <a:srgbClr val="0000CC"/>
+                </a:solidFill>
                 <a:latin typeface="Tahoma" pitchFamily="34" charset="0"/>
               </a:rPr>
-              <a:t>Duvidas?</a:t>
-            </a:r>
-            <a:endParaRPr lang="pt-BR" sz="2400" b="1" dirty="0">
+              <a:t>Cronograma</a:t>
+            </a:r>
+            <a:endParaRPr lang="pt-BR" sz="3600" dirty="0">
               <a:solidFill>
-                <a:srgbClr val="008000"/>
+                <a:srgbClr val="0000CC"/>
               </a:solidFill>
-              <a:effectLst>
-                <a:outerShdw blurRad="38100" dist="38100" dir="2700000" algn="tl">
-                  <a:srgbClr val="C0C0C0"/>
-                </a:outerShdw>
-              </a:effectLst>
               <a:latin typeface="Tahoma" pitchFamily="34" charset="0"/>
             </a:endParaRPr>
           </a:p>
@@ -5747,7 +6283,181 @@
     </p:spTree>
     <p:extLst>
       <p:ext uri="{BB962C8B-B14F-4D97-AF65-F5344CB8AC3E}">
-        <p14:creationId xmlns:p14="http://schemas.microsoft.com/office/powerpoint/2010/main" val="2591362696"/>
+        <p14:creationId xmlns:p14="http://schemas.microsoft.com/office/powerpoint/2010/main" val="2176308549"/>
+      </p:ext>
+    </p:extLst>
+  </p:cSld>
+  <p:clrMapOvr>
+    <a:masterClrMapping/>
+  </p:clrMapOvr>
+  <p:timing>
+    <p:tnLst>
+      <p:par>
+        <p:cTn id="1" dur="indefinite" restart="never" nodeType="tmRoot"/>
+      </p:par>
+    </p:tnLst>
+  </p:timing>
+</p:sld>
+</file>
+
+<file path=ppt/slides/slide18.xml><?xml version="1.0" encoding="utf-8"?>
+<p:sld xmlns:a="http://schemas.openxmlformats.org/drawingml/2006/main" xmlns:r="http://schemas.openxmlformats.org/officeDocument/2006/relationships" xmlns:p="http://schemas.openxmlformats.org/presentationml/2006/main">
+  <p:cSld>
+    <p:spTree>
+      <p:nvGrpSpPr>
+        <p:cNvPr id="1" name=""/>
+        <p:cNvGrpSpPr/>
+        <p:nvPr/>
+      </p:nvGrpSpPr>
+      <p:grpSpPr>
+        <a:xfrm>
+          <a:off x="0" y="0"/>
+          <a:ext cx="0" cy="0"/>
+          <a:chOff x="0" y="0"/>
+          <a:chExt cx="0" cy="0"/>
+        </a:xfrm>
+      </p:grpSpPr>
+      <p:sp>
+        <p:nvSpPr>
+          <p:cNvPr id="9219" name="Rectangle 3"/>
+          <p:cNvSpPr>
+            <a:spLocks noGrp="1" noChangeArrowheads="1"/>
+          </p:cNvSpPr>
+          <p:nvPr>
+            <p:ph type="title"/>
+          </p:nvPr>
+        </p:nvSpPr>
+        <p:spPr>
+          <a:xfrm>
+            <a:off x="0" y="58738"/>
+            <a:ext cx="9144000" cy="777875"/>
+          </a:xfrm>
+          <a:noFill/>
+          <a:ln w="9525">
+            <a:noFill/>
+            <a:miter lim="800000"/>
+            <a:headEnd/>
+            <a:tailEnd/>
+          </a:ln>
+        </p:spPr>
+        <p:txBody>
+          <a:bodyPr vert="horz" wrap="square" lIns="0" tIns="0" rIns="0" bIns="0" numCol="1" rtlCol="0" anchor="t" anchorCtr="0" compatLnSpc="1">
+            <a:prstTxWarp prst="textNoShape">
+              <a:avLst/>
+            </a:prstTxWarp>
+            <a:normAutofit/>
+          </a:bodyPr>
+          <a:lstStyle/>
+          <a:p>
+            <a:r>
+              <a:rPr lang="pt-BR" sz="3600" dirty="0">
+                <a:solidFill>
+                  <a:srgbClr val="0000CC"/>
+                </a:solidFill>
+                <a:latin typeface="Tahoma" pitchFamily="34" charset="0"/>
+              </a:rPr>
+              <a:t>Cronograma</a:t>
+            </a:r>
+            <a:endParaRPr lang="pt-BR" sz="3600" dirty="0">
+              <a:solidFill>
+                <a:srgbClr val="0000CC"/>
+              </a:solidFill>
+              <a:latin typeface="Tahoma" pitchFamily="34" charset="0"/>
+            </a:endParaRPr>
+          </a:p>
+        </p:txBody>
+      </p:sp>
+    </p:spTree>
+    <p:extLst>
+      <p:ext uri="{BB962C8B-B14F-4D97-AF65-F5344CB8AC3E}">
+        <p14:creationId xmlns:p14="http://schemas.microsoft.com/office/powerpoint/2010/main" val="3081413353"/>
+      </p:ext>
+    </p:extLst>
+  </p:cSld>
+  <p:clrMapOvr>
+    <a:masterClrMapping/>
+  </p:clrMapOvr>
+  <p:timing>
+    <p:tnLst>
+      <p:par>
+        <p:cTn id="1" dur="indefinite" restart="never" nodeType="tmRoot"/>
+      </p:par>
+    </p:tnLst>
+  </p:timing>
+</p:sld>
+</file>
+
+<file path=ppt/slides/slide19.xml><?xml version="1.0" encoding="utf-8"?>
+<p:sld xmlns:a="http://schemas.openxmlformats.org/drawingml/2006/main" xmlns:r="http://schemas.openxmlformats.org/officeDocument/2006/relationships" xmlns:p="http://schemas.openxmlformats.org/presentationml/2006/main">
+  <p:cSld>
+    <p:spTree>
+      <p:nvGrpSpPr>
+        <p:cNvPr id="1" name=""/>
+        <p:cNvGrpSpPr/>
+        <p:nvPr/>
+      </p:nvGrpSpPr>
+      <p:grpSpPr>
+        <a:xfrm>
+          <a:off x="0" y="0"/>
+          <a:ext cx="0" cy="0"/>
+          <a:chOff x="0" y="0"/>
+          <a:chExt cx="0" cy="0"/>
+        </a:xfrm>
+      </p:grpSpPr>
+      <p:sp>
+        <p:nvSpPr>
+          <p:cNvPr id="9219" name="Rectangle 3"/>
+          <p:cNvSpPr>
+            <a:spLocks noGrp="1" noChangeArrowheads="1"/>
+          </p:cNvSpPr>
+          <p:nvPr>
+            <p:ph type="title"/>
+          </p:nvPr>
+        </p:nvSpPr>
+        <p:spPr>
+          <a:xfrm>
+            <a:off x="0" y="58738"/>
+            <a:ext cx="9144000" cy="777875"/>
+          </a:xfrm>
+          <a:noFill/>
+          <a:ln w="9525">
+            <a:noFill/>
+            <a:miter lim="800000"/>
+            <a:headEnd/>
+            <a:tailEnd/>
+          </a:ln>
+        </p:spPr>
+        <p:txBody>
+          <a:bodyPr vert="horz" wrap="square" lIns="0" tIns="0" rIns="0" bIns="0" numCol="1" rtlCol="0" anchor="t" anchorCtr="0" compatLnSpc="1">
+            <a:prstTxWarp prst="textNoShape">
+              <a:avLst/>
+            </a:prstTxWarp>
+            <a:normAutofit/>
+          </a:bodyPr>
+          <a:lstStyle/>
+          <a:p>
+            <a:r>
+              <a:rPr lang="pt-BR" sz="3600" dirty="0" smtClean="0">
+                <a:solidFill>
+                  <a:srgbClr val="0000CC"/>
+                </a:solidFill>
+                <a:latin typeface="Tahoma" pitchFamily="34" charset="0"/>
+              </a:rPr>
+              <a:t>Planilha dos entregaveis do projeto</a:t>
+            </a:r>
+            <a:endParaRPr lang="pt-BR" sz="3600" dirty="0">
+              <a:solidFill>
+                <a:srgbClr val="0000CC"/>
+              </a:solidFill>
+              <a:latin typeface="Tahoma" pitchFamily="34" charset="0"/>
+            </a:endParaRPr>
+          </a:p>
+        </p:txBody>
+      </p:sp>
+    </p:spTree>
+    <p:extLst>
+      <p:ext uri="{BB962C8B-B14F-4D97-AF65-F5344CB8AC3E}">
+        <p14:creationId xmlns:p14="http://schemas.microsoft.com/office/powerpoint/2010/main" val="2695619365"/>
       </p:ext>
     </p:extLst>
   </p:cSld>
@@ -6058,6 +6768,105 @@
 </p:sld>
 </file>
 
+<file path=ppt/slides/slide20.xml><?xml version="1.0" encoding="utf-8"?>
+<p:sld xmlns:a="http://schemas.openxmlformats.org/drawingml/2006/main" xmlns:r="http://schemas.openxmlformats.org/officeDocument/2006/relationships" xmlns:p="http://schemas.openxmlformats.org/presentationml/2006/main">
+  <p:cSld>
+    <p:spTree>
+      <p:nvGrpSpPr>
+        <p:cNvPr id="1" name=""/>
+        <p:cNvGrpSpPr/>
+        <p:nvPr/>
+      </p:nvGrpSpPr>
+      <p:grpSpPr>
+        <a:xfrm>
+          <a:off x="0" y="0"/>
+          <a:ext cx="0" cy="0"/>
+          <a:chOff x="0" y="0"/>
+          <a:chExt cx="0" cy="0"/>
+        </a:xfrm>
+      </p:grpSpPr>
+      <p:sp>
+        <p:nvSpPr>
+          <p:cNvPr id="3" name="Text Box 2"/>
+          <p:cNvSpPr txBox="1">
+            <a:spLocks noChangeArrowheads="1"/>
+          </p:cNvSpPr>
+          <p:nvPr/>
+        </p:nvSpPr>
+        <p:spPr bwMode="auto">
+          <a:xfrm>
+            <a:off x="2038350" y="2636912"/>
+            <a:ext cx="5105400" cy="914400"/>
+          </a:xfrm>
+          <a:prstGeom prst="rect">
+            <a:avLst/>
+          </a:prstGeom>
+          <a:noFill/>
+          <a:ln w="9525">
+            <a:noFill/>
+            <a:miter lim="800000"/>
+            <a:headEnd/>
+            <a:tailEnd/>
+          </a:ln>
+          <a:effectLst/>
+        </p:spPr>
+        <p:txBody>
+          <a:bodyPr>
+            <a:spAutoFit/>
+          </a:bodyPr>
+          <a:lstStyle/>
+          <a:p>
+            <a:pPr algn="ctr">
+              <a:defRPr/>
+            </a:pPr>
+            <a:r>
+              <a:rPr lang="pt-BR" sz="5400" b="1" dirty="0">
+                <a:solidFill>
+                  <a:srgbClr val="CC0000"/>
+                </a:solidFill>
+                <a:effectLst>
+                  <a:outerShdw blurRad="38100" dist="38100" dir="2700000" algn="tl">
+                    <a:srgbClr val="C0C0C0"/>
+                  </a:outerShdw>
+                </a:effectLst>
+                <a:latin typeface="Tahoma" pitchFamily="34" charset="0"/>
+              </a:rPr>
+              <a:t>Duvidas?</a:t>
+            </a:r>
+            <a:endParaRPr lang="pt-BR" sz="2400" b="1" dirty="0">
+              <a:solidFill>
+                <a:srgbClr val="008000"/>
+              </a:solidFill>
+              <a:effectLst>
+                <a:outerShdw blurRad="38100" dist="38100" dir="2700000" algn="tl">
+                  <a:srgbClr val="C0C0C0"/>
+                </a:outerShdw>
+              </a:effectLst>
+              <a:latin typeface="Tahoma" pitchFamily="34" charset="0"/>
+            </a:endParaRPr>
+          </a:p>
+        </p:txBody>
+      </p:sp>
+    </p:spTree>
+    <p:extLst>
+      <p:ext uri="{BB962C8B-B14F-4D97-AF65-F5344CB8AC3E}">
+        <p14:creationId xmlns:p14="http://schemas.microsoft.com/office/powerpoint/2010/main" val="2591362696"/>
+      </p:ext>
+    </p:extLst>
+  </p:cSld>
+  <p:clrMapOvr>
+    <a:masterClrMapping/>
+  </p:clrMapOvr>
+  <p:timing>
+    <p:tnLst>
+      <p:par>
+        <p:cTn id="1" dur="indefinite" restart="never" nodeType="tmRoot"/>
+      </p:par>
+    </p:tnLst>
+  </p:timing>
+</p:sld>
+</file>
+
 <file path=ppt/slides/slide3.xml><?xml version="1.0" encoding="utf-8"?>
 <p:sld xmlns:a="http://schemas.openxmlformats.org/drawingml/2006/main" xmlns:r="http://schemas.openxmlformats.org/officeDocument/2006/relationships" xmlns:p="http://schemas.openxmlformats.org/presentationml/2006/main">
   <p:cSld>
@@ -6077,7 +6886,7 @@
       </p:grpSpPr>
       <p:sp>
         <p:nvSpPr>
-          <p:cNvPr id="81922" name="Text Box 2"/>
+          <p:cNvPr id="7178" name="Text Box 10"/>
           <p:cNvSpPr txBox="1">
             <a:spLocks noChangeArrowheads="1"/>
           </p:cNvSpPr>
@@ -6085,8 +6894,8 @@
         </p:nvSpPr>
         <p:spPr bwMode="auto">
           <a:xfrm>
-            <a:off x="152400" y="857232"/>
-            <a:ext cx="8812213" cy="3046988"/>
+            <a:off x="165893" y="836613"/>
+            <a:ext cx="8812213" cy="4770537"/>
           </a:xfrm>
           <a:prstGeom prst="rect">
             <a:avLst/>
@@ -6125,37 +6934,121 @@
               <a:buChar char="§"/>
             </a:pPr>
             <a:r>
-              <a:rPr lang="pt-BR" sz="2400" dirty="0">
+              <a:rPr lang="pt-BR" sz="2000" dirty="0" smtClean="0">
                 <a:latin typeface="Tahoma" panose="020B0604030504040204" pitchFamily="34" charset="0"/>
                 <a:ea typeface="Tahoma" panose="020B0604030504040204" pitchFamily="34" charset="0"/>
                 <a:cs typeface="Tahoma" panose="020B0604030504040204" pitchFamily="34" charset="0"/>
               </a:rPr>
-              <a:t>Analisando outros sistemas e interfaces (web) de gerenciamento de exames pudemos constatar que existem muitas falhas e </a:t>
-            </a:r>
-            <a:r>
-              <a:rPr lang="pt-BR" sz="2400" dirty="0" smtClean="0">
+              <a:t>Gabriel </a:t>
+            </a:r>
+            <a:r>
+              <a:rPr lang="pt-BR" sz="2000" dirty="0" smtClean="0">
                 <a:latin typeface="Tahoma" panose="020B0604030504040204" pitchFamily="34" charset="0"/>
                 <a:ea typeface="Tahoma" panose="020B0604030504040204" pitchFamily="34" charset="0"/>
                 <a:cs typeface="Tahoma" panose="020B0604030504040204" pitchFamily="34" charset="0"/>
               </a:rPr>
-              <a:t>com </a:t>
-            </a:r>
-            <a:r>
-              <a:rPr lang="pt-BR" sz="2400" dirty="0">
+              <a:t>Piccolo</a:t>
+            </a:r>
+            <a:endParaRPr lang="pt-BR" sz="2000" dirty="0">
+              <a:latin typeface="Tahoma" panose="020B0604030504040204" pitchFamily="34" charset="0"/>
+              <a:ea typeface="Tahoma" panose="020B0604030504040204" pitchFamily="34" charset="0"/>
+              <a:cs typeface="Tahoma" panose="020B0604030504040204" pitchFamily="34" charset="0"/>
+            </a:endParaRPr>
+          </a:p>
+          <a:p>
+            <a:pPr marL="993775" lvl="3" indent="-174625" defTabSz="630238">
+              <a:buSzPct val="80000"/>
+              <a:buFont typeface="Wingdings" pitchFamily="2" charset="2"/>
+              <a:buChar char="§"/>
+            </a:pPr>
+            <a:r>
+              <a:rPr lang="pt-BR" sz="2000" dirty="0">
+                <a:solidFill>
+                  <a:srgbClr val="0000CC"/>
+                </a:solidFill>
                 <a:latin typeface="Tahoma" panose="020B0604030504040204" pitchFamily="34" charset="0"/>
                 <a:ea typeface="Tahoma" panose="020B0604030504040204" pitchFamily="34" charset="0"/>
                 <a:cs typeface="Tahoma" panose="020B0604030504040204" pitchFamily="34" charset="0"/>
               </a:rPr>
-              <a:t>resolvemos desenvolver um sistema que auxiliasse a resolução dessas falhas. O paciente poderá ter acesso ao sistema via website para verificar o andamento e resultado de exames.</a:t>
-            </a:r>
-          </a:p>
-          <a:p>
-            <a:pPr marL="901700" lvl="2" indent="-279400" algn="l">
+              <a:t>Modulo de Cadastro de paciente no </a:t>
+            </a:r>
+            <a:r>
+              <a:rPr lang="pt-BR" sz="2000" dirty="0" smtClean="0">
+                <a:solidFill>
+                  <a:srgbClr val="0000CC"/>
+                </a:solidFill>
+                <a:latin typeface="Tahoma" panose="020B0604030504040204" pitchFamily="34" charset="0"/>
+                <a:ea typeface="Tahoma" panose="020B0604030504040204" pitchFamily="34" charset="0"/>
+                <a:cs typeface="Tahoma" panose="020B0604030504040204" pitchFamily="34" charset="0"/>
+              </a:rPr>
+              <a:t>sistema</a:t>
+            </a:r>
+          </a:p>
+          <a:p>
+            <a:pPr marL="993775" lvl="3" indent="-174625" defTabSz="630238">
               <a:buSzPct val="80000"/>
               <a:buFont typeface="Wingdings" pitchFamily="2" charset="2"/>
-              <a:buNone/>
+              <a:buChar char="§"/>
             </a:pPr>
-            <a:endParaRPr lang="pt-BR" sz="2400" dirty="0">
+            <a:r>
+              <a:rPr lang="pt-BR" sz="2000" dirty="0">
+                <a:solidFill>
+                  <a:srgbClr val="0000CC"/>
+                </a:solidFill>
+                <a:latin typeface="Tahoma" panose="020B0604030504040204" pitchFamily="34" charset="0"/>
+                <a:ea typeface="Tahoma" panose="020B0604030504040204" pitchFamily="34" charset="0"/>
+                <a:cs typeface="Tahoma" panose="020B0604030504040204" pitchFamily="34" charset="0"/>
+              </a:rPr>
+              <a:t>Módulo cadastro exames da </a:t>
+            </a:r>
+            <a:r>
+              <a:rPr lang="pt-BR" sz="2000" dirty="0" smtClean="0">
+                <a:solidFill>
+                  <a:srgbClr val="0000CC"/>
+                </a:solidFill>
+                <a:latin typeface="Tahoma" panose="020B0604030504040204" pitchFamily="34" charset="0"/>
+                <a:ea typeface="Tahoma" panose="020B0604030504040204" pitchFamily="34" charset="0"/>
+                <a:cs typeface="Tahoma" panose="020B0604030504040204" pitchFamily="34" charset="0"/>
+              </a:rPr>
+              <a:t>clinica</a:t>
+            </a:r>
+          </a:p>
+          <a:p>
+            <a:pPr marL="993775" lvl="3" indent="-174625" defTabSz="630238">
+              <a:buSzPct val="80000"/>
+              <a:buFont typeface="Wingdings" pitchFamily="2" charset="2"/>
+              <a:buChar char="§"/>
+            </a:pPr>
+            <a:r>
+              <a:rPr lang="pt-BR" sz="2000" dirty="0">
+                <a:solidFill>
+                  <a:srgbClr val="FF0000"/>
+                </a:solidFill>
+                <a:latin typeface="Tahoma" panose="020B0604030504040204" pitchFamily="34" charset="0"/>
+                <a:ea typeface="Tahoma" panose="020B0604030504040204" pitchFamily="34" charset="0"/>
+                <a:cs typeface="Tahoma" panose="020B0604030504040204" pitchFamily="34" charset="0"/>
+              </a:rPr>
+              <a:t>Módulo Geração relatório de fluxo de </a:t>
+            </a:r>
+            <a:r>
+              <a:rPr lang="pt-BR" sz="2000" dirty="0" smtClean="0">
+                <a:solidFill>
+                  <a:srgbClr val="FF0000"/>
+                </a:solidFill>
+                <a:latin typeface="Tahoma" panose="020B0604030504040204" pitchFamily="34" charset="0"/>
+                <a:ea typeface="Tahoma" panose="020B0604030504040204" pitchFamily="34" charset="0"/>
+                <a:cs typeface="Tahoma" panose="020B0604030504040204" pitchFamily="34" charset="0"/>
+              </a:rPr>
+              <a:t>exames (será feito)</a:t>
+            </a:r>
+          </a:p>
+          <a:p>
+            <a:pPr marL="993775" lvl="3" indent="-174625" defTabSz="630238">
+              <a:buSzPct val="80000"/>
+              <a:buFont typeface="Wingdings" pitchFamily="2" charset="2"/>
+              <a:buChar char="§"/>
+            </a:pPr>
+            <a:endParaRPr lang="pt-BR" sz="2000" dirty="0">
               <a:solidFill>
                 <a:srgbClr val="0000CC"/>
               </a:solidFill>
@@ -6164,11 +7057,303 @@
               <a:cs typeface="Tahoma" panose="020B0604030504040204" pitchFamily="34" charset="0"/>
             </a:endParaRPr>
           </a:p>
-        </p:txBody>
-      </p:sp>
-      <p:sp>
-        <p:nvSpPr>
-          <p:cNvPr id="5" name="Rectangle 13"/>
+          <a:p>
+            <a:pPr marL="536575" lvl="2" indent="-174625" defTabSz="630238">
+              <a:buSzPct val="80000"/>
+              <a:buFont typeface="Wingdings" pitchFamily="2" charset="2"/>
+              <a:buChar char="§"/>
+            </a:pPr>
+            <a:r>
+              <a:rPr lang="pt-BR" sz="2000" dirty="0">
+                <a:latin typeface="Tahoma" panose="020B0604030504040204" pitchFamily="34" charset="0"/>
+                <a:ea typeface="Tahoma" panose="020B0604030504040204" pitchFamily="34" charset="0"/>
+                <a:cs typeface="Tahoma" panose="020B0604030504040204" pitchFamily="34" charset="0"/>
+              </a:rPr>
+              <a:t>Pedro Gimenes </a:t>
+            </a:r>
+            <a:endParaRPr lang="pt-BR" sz="2000" dirty="0" smtClean="0">
+              <a:latin typeface="Tahoma" panose="020B0604030504040204" pitchFamily="34" charset="0"/>
+              <a:ea typeface="Tahoma" panose="020B0604030504040204" pitchFamily="34" charset="0"/>
+              <a:cs typeface="Tahoma" panose="020B0604030504040204" pitchFamily="34" charset="0"/>
+            </a:endParaRPr>
+          </a:p>
+          <a:p>
+            <a:pPr marL="993775" lvl="3" indent="-174625" defTabSz="630238">
+              <a:buSzPct val="80000"/>
+              <a:buFont typeface="Wingdings" pitchFamily="2" charset="2"/>
+              <a:buChar char="§"/>
+            </a:pPr>
+            <a:r>
+              <a:rPr lang="pt-BR" sz="2000" dirty="0">
+                <a:solidFill>
+                  <a:srgbClr val="0000CC"/>
+                </a:solidFill>
+                <a:latin typeface="Tahoma" panose="020B0604030504040204" pitchFamily="34" charset="0"/>
+                <a:ea typeface="Tahoma" panose="020B0604030504040204" pitchFamily="34" charset="0"/>
+                <a:cs typeface="Tahoma" panose="020B0604030504040204" pitchFamily="34" charset="0"/>
+              </a:rPr>
+              <a:t>Módulo de geração de código de </a:t>
+            </a:r>
+            <a:r>
+              <a:rPr lang="pt-BR" sz="2000" dirty="0" smtClean="0">
+                <a:solidFill>
+                  <a:srgbClr val="0000CC"/>
+                </a:solidFill>
+                <a:latin typeface="Tahoma" panose="020B0604030504040204" pitchFamily="34" charset="0"/>
+                <a:ea typeface="Tahoma" panose="020B0604030504040204" pitchFamily="34" charset="0"/>
+                <a:cs typeface="Tahoma" panose="020B0604030504040204" pitchFamily="34" charset="0"/>
+              </a:rPr>
+              <a:t>acompanhamento</a:t>
+            </a:r>
+          </a:p>
+          <a:p>
+            <a:pPr marL="993775" lvl="3" indent="-174625" defTabSz="630238">
+              <a:buSzPct val="80000"/>
+              <a:buFont typeface="Wingdings" pitchFamily="2" charset="2"/>
+              <a:buChar char="§"/>
+            </a:pPr>
+            <a:r>
+              <a:rPr lang="pt-BR" sz="2000" dirty="0">
+                <a:solidFill>
+                  <a:srgbClr val="0000CC"/>
+                </a:solidFill>
+                <a:latin typeface="Tahoma" panose="020B0604030504040204" pitchFamily="34" charset="0"/>
+                <a:ea typeface="Tahoma" panose="020B0604030504040204" pitchFamily="34" charset="0"/>
+                <a:cs typeface="Tahoma" panose="020B0604030504040204" pitchFamily="34" charset="0"/>
+              </a:rPr>
+              <a:t>Módulo cadastro de resultado de </a:t>
+            </a:r>
+            <a:r>
+              <a:rPr lang="pt-BR" sz="2000" dirty="0" smtClean="0">
+                <a:solidFill>
+                  <a:srgbClr val="0000CC"/>
+                </a:solidFill>
+                <a:latin typeface="Tahoma" panose="020B0604030504040204" pitchFamily="34" charset="0"/>
+                <a:ea typeface="Tahoma" panose="020B0604030504040204" pitchFamily="34" charset="0"/>
+                <a:cs typeface="Tahoma" panose="020B0604030504040204" pitchFamily="34" charset="0"/>
+              </a:rPr>
+              <a:t>exames </a:t>
+            </a:r>
+          </a:p>
+          <a:p>
+            <a:pPr marL="993775" lvl="3" indent="-174625" defTabSz="630238">
+              <a:buSzPct val="80000"/>
+              <a:buFont typeface="Wingdings" pitchFamily="2" charset="2"/>
+              <a:buChar char="§"/>
+            </a:pPr>
+            <a:r>
+              <a:rPr lang="pt-BR" sz="2000" dirty="0">
+                <a:solidFill>
+                  <a:srgbClr val="0000CC"/>
+                </a:solidFill>
+                <a:latin typeface="Tahoma" panose="020B0604030504040204" pitchFamily="34" charset="0"/>
+                <a:ea typeface="Tahoma" panose="020B0604030504040204" pitchFamily="34" charset="0"/>
+                <a:cs typeface="Tahoma" panose="020B0604030504040204" pitchFamily="34" charset="0"/>
+              </a:rPr>
+              <a:t>Módulo de contato </a:t>
+            </a:r>
+            <a:endParaRPr lang="pt-BR" sz="2000" dirty="0" smtClean="0">
+              <a:solidFill>
+                <a:srgbClr val="0000CC"/>
+              </a:solidFill>
+              <a:latin typeface="Tahoma" panose="020B0604030504040204" pitchFamily="34" charset="0"/>
+              <a:ea typeface="Tahoma" panose="020B0604030504040204" pitchFamily="34" charset="0"/>
+              <a:cs typeface="Tahoma" panose="020B0604030504040204" pitchFamily="34" charset="0"/>
+            </a:endParaRPr>
+          </a:p>
+          <a:p>
+            <a:pPr marL="993775" lvl="3" indent="-174625" defTabSz="630238">
+              <a:buSzPct val="80000"/>
+              <a:buFont typeface="Wingdings" pitchFamily="2" charset="2"/>
+              <a:buChar char="§"/>
+            </a:pPr>
+            <a:endParaRPr lang="pt-BR" sz="2000" dirty="0" smtClean="0">
+              <a:solidFill>
+                <a:srgbClr val="0000CC"/>
+              </a:solidFill>
+              <a:latin typeface="Tahoma" panose="020B0604030504040204" pitchFamily="34" charset="0"/>
+              <a:ea typeface="Tahoma" panose="020B0604030504040204" pitchFamily="34" charset="0"/>
+              <a:cs typeface="Tahoma" panose="020B0604030504040204" pitchFamily="34" charset="0"/>
+            </a:endParaRPr>
+          </a:p>
+          <a:p>
+            <a:pPr marL="536575" lvl="2" indent="-174625" defTabSz="630238">
+              <a:buSzPct val="80000"/>
+              <a:buFont typeface="Wingdings" pitchFamily="2" charset="2"/>
+              <a:buChar char="§"/>
+            </a:pPr>
+            <a:r>
+              <a:rPr lang="pt-BR" sz="2000" dirty="0">
+                <a:latin typeface="Tahoma" panose="020B0604030504040204" pitchFamily="34" charset="0"/>
+                <a:ea typeface="Tahoma" panose="020B0604030504040204" pitchFamily="34" charset="0"/>
+                <a:cs typeface="Tahoma" panose="020B0604030504040204" pitchFamily="34" charset="0"/>
+              </a:rPr>
+              <a:t>Vinícius </a:t>
+            </a:r>
+            <a:r>
+              <a:rPr lang="pt-BR" sz="2000" dirty="0" smtClean="0">
+                <a:latin typeface="Tahoma" panose="020B0604030504040204" pitchFamily="34" charset="0"/>
+                <a:ea typeface="Tahoma" panose="020B0604030504040204" pitchFamily="34" charset="0"/>
+                <a:cs typeface="Tahoma" panose="020B0604030504040204" pitchFamily="34" charset="0"/>
+              </a:rPr>
+              <a:t>Romão</a:t>
+            </a:r>
+          </a:p>
+          <a:p>
+            <a:pPr marL="993775" lvl="3" indent="-174625" defTabSz="630238">
+              <a:buSzPct val="80000"/>
+              <a:buFont typeface="Wingdings" pitchFamily="2" charset="2"/>
+              <a:buChar char="§"/>
+            </a:pPr>
+            <a:r>
+              <a:rPr lang="pt-BR" sz="2000" dirty="0" smtClean="0">
+                <a:solidFill>
+                  <a:srgbClr val="0000CC"/>
+                </a:solidFill>
+                <a:latin typeface="Tahoma" panose="020B0604030504040204" pitchFamily="34" charset="0"/>
+                <a:ea typeface="Tahoma" panose="020B0604030504040204" pitchFamily="34" charset="0"/>
+                <a:cs typeface="Tahoma" panose="020B0604030504040204" pitchFamily="34" charset="0"/>
+              </a:rPr>
+              <a:t>Modulo </a:t>
+            </a:r>
+            <a:r>
+              <a:rPr lang="pt-BR" sz="2000" dirty="0">
+                <a:solidFill>
+                  <a:srgbClr val="0000CC"/>
+                </a:solidFill>
+                <a:latin typeface="Tahoma" panose="020B0604030504040204" pitchFamily="34" charset="0"/>
+                <a:ea typeface="Tahoma" panose="020B0604030504040204" pitchFamily="34" charset="0"/>
+                <a:cs typeface="Tahoma" panose="020B0604030504040204" pitchFamily="34" charset="0"/>
+              </a:rPr>
+              <a:t>de Cadastro de gestores no </a:t>
+            </a:r>
+            <a:r>
+              <a:rPr lang="pt-BR" sz="2000" dirty="0" smtClean="0">
+                <a:solidFill>
+                  <a:srgbClr val="0000CC"/>
+                </a:solidFill>
+                <a:latin typeface="Tahoma" panose="020B0604030504040204" pitchFamily="34" charset="0"/>
+                <a:ea typeface="Tahoma" panose="020B0604030504040204" pitchFamily="34" charset="0"/>
+                <a:cs typeface="Tahoma" panose="020B0604030504040204" pitchFamily="34" charset="0"/>
+              </a:rPr>
+              <a:t>sistema</a:t>
+            </a:r>
+          </a:p>
+          <a:p>
+            <a:pPr marL="993775" lvl="3" indent="-174625" defTabSz="630238">
+              <a:buSzPct val="80000"/>
+              <a:buFont typeface="Wingdings" pitchFamily="2" charset="2"/>
+              <a:buChar char="§"/>
+            </a:pPr>
+            <a:r>
+              <a:rPr lang="pt-BR" sz="2000" dirty="0">
+                <a:solidFill>
+                  <a:srgbClr val="FF0000"/>
+                </a:solidFill>
+                <a:latin typeface="Tahoma" panose="020B0604030504040204" pitchFamily="34" charset="0"/>
+                <a:ea typeface="Tahoma" panose="020B0604030504040204" pitchFamily="34" charset="0"/>
+                <a:cs typeface="Tahoma" panose="020B0604030504040204" pitchFamily="34" charset="0"/>
+              </a:rPr>
+              <a:t>Módulo Documentação histórico dos </a:t>
+            </a:r>
+            <a:r>
+              <a:rPr lang="pt-BR" sz="2000" dirty="0" smtClean="0">
+                <a:solidFill>
+                  <a:srgbClr val="FF0000"/>
+                </a:solidFill>
+                <a:latin typeface="Tahoma" panose="020B0604030504040204" pitchFamily="34" charset="0"/>
+                <a:ea typeface="Tahoma" panose="020B0604030504040204" pitchFamily="34" charset="0"/>
+                <a:cs typeface="Tahoma" panose="020B0604030504040204" pitchFamily="34" charset="0"/>
+              </a:rPr>
+              <a:t>pacientes </a:t>
+            </a:r>
+            <a:r>
+              <a:rPr lang="pt-BR" sz="2000" dirty="0">
+                <a:solidFill>
+                  <a:srgbClr val="FF0000"/>
+                </a:solidFill>
+                <a:latin typeface="Tahoma" panose="020B0604030504040204" pitchFamily="34" charset="0"/>
+                <a:ea typeface="Tahoma" panose="020B0604030504040204" pitchFamily="34" charset="0"/>
+                <a:cs typeface="Tahoma" panose="020B0604030504040204" pitchFamily="34" charset="0"/>
+              </a:rPr>
+              <a:t>(será feito</a:t>
+            </a:r>
+            <a:r>
+              <a:rPr lang="pt-BR" sz="2000" dirty="0" smtClean="0">
+                <a:solidFill>
+                  <a:srgbClr val="FF0000"/>
+                </a:solidFill>
+                <a:latin typeface="Tahoma" panose="020B0604030504040204" pitchFamily="34" charset="0"/>
+                <a:ea typeface="Tahoma" panose="020B0604030504040204" pitchFamily="34" charset="0"/>
+                <a:cs typeface="Tahoma" panose="020B0604030504040204" pitchFamily="34" charset="0"/>
+              </a:rPr>
+              <a:t>)</a:t>
+            </a:r>
+          </a:p>
+          <a:p>
+            <a:pPr marL="993775" lvl="3" indent="-174625" defTabSz="630238">
+              <a:buSzPct val="80000"/>
+              <a:buFont typeface="Wingdings" pitchFamily="2" charset="2"/>
+              <a:buChar char="§"/>
+            </a:pPr>
+            <a:r>
+              <a:rPr lang="pt-BR" sz="2000" dirty="0">
+                <a:solidFill>
+                  <a:srgbClr val="FF0000"/>
+                </a:solidFill>
+                <a:latin typeface="Tahoma" panose="020B0604030504040204" pitchFamily="34" charset="0"/>
+                <a:ea typeface="Tahoma" panose="020B0604030504040204" pitchFamily="34" charset="0"/>
+                <a:cs typeface="Tahoma" panose="020B0604030504040204" pitchFamily="34" charset="0"/>
+              </a:rPr>
+              <a:t>Módulo Geração prontuário digital para o </a:t>
+            </a:r>
+            <a:r>
+              <a:rPr lang="pt-BR" sz="2000" dirty="0" smtClean="0">
+                <a:solidFill>
+                  <a:srgbClr val="FF0000"/>
+                </a:solidFill>
+                <a:latin typeface="Tahoma" panose="020B0604030504040204" pitchFamily="34" charset="0"/>
+                <a:ea typeface="Tahoma" panose="020B0604030504040204" pitchFamily="34" charset="0"/>
+                <a:cs typeface="Tahoma" panose="020B0604030504040204" pitchFamily="34" charset="0"/>
+              </a:rPr>
+              <a:t>paciente </a:t>
+            </a:r>
+            <a:r>
+              <a:rPr lang="pt-BR" sz="2000" dirty="0">
+                <a:solidFill>
+                  <a:srgbClr val="FF0000"/>
+                </a:solidFill>
+                <a:latin typeface="Tahoma" panose="020B0604030504040204" pitchFamily="34" charset="0"/>
+                <a:ea typeface="Tahoma" panose="020B0604030504040204" pitchFamily="34" charset="0"/>
+                <a:cs typeface="Tahoma" panose="020B0604030504040204" pitchFamily="34" charset="0"/>
+              </a:rPr>
+              <a:t>(será feito</a:t>
+            </a:r>
+            <a:r>
+              <a:rPr lang="pt-BR" sz="2000" dirty="0" smtClean="0">
+                <a:solidFill>
+                  <a:srgbClr val="FF0000"/>
+                </a:solidFill>
+                <a:latin typeface="Tahoma" panose="020B0604030504040204" pitchFamily="34" charset="0"/>
+                <a:ea typeface="Tahoma" panose="020B0604030504040204" pitchFamily="34" charset="0"/>
+                <a:cs typeface="Tahoma" panose="020B0604030504040204" pitchFamily="34" charset="0"/>
+              </a:rPr>
+              <a:t>)</a:t>
+            </a:r>
+            <a:endParaRPr lang="pt-BR" sz="2000" dirty="0">
+              <a:solidFill>
+                <a:srgbClr val="FF0000"/>
+              </a:solidFill>
+              <a:latin typeface="Tahoma" panose="020B0604030504040204" pitchFamily="34" charset="0"/>
+              <a:ea typeface="Tahoma" panose="020B0604030504040204" pitchFamily="34" charset="0"/>
+              <a:cs typeface="Tahoma" panose="020B0604030504040204" pitchFamily="34" charset="0"/>
+            </a:endParaRPr>
+          </a:p>
+        </p:txBody>
+      </p:sp>
+      <p:sp>
+        <p:nvSpPr>
+          <p:cNvPr id="5123" name="Rectangle 13"/>
           <p:cNvSpPr>
             <a:spLocks noGrp="1" noChangeArrowheads="1"/>
           </p:cNvSpPr>
@@ -6199,14 +7384,20 @@
           <a:lstStyle/>
           <a:p>
             <a:r>
-              <a:rPr lang="pt-BR" sz="3600" dirty="0">
+              <a:rPr lang="pt-BR" sz="3600" dirty="0" smtClean="0">
                 <a:solidFill>
                   <a:srgbClr val="0000CC"/>
                 </a:solidFill>
                 <a:latin typeface="Tahoma" pitchFamily="34" charset="0"/>
               </a:rPr>
-              <a:t>Motivações do Projeto</a:t>
-            </a:r>
+              <a:t>Equipe e divisão do trabalho</a:t>
+            </a:r>
+            <a:endParaRPr lang="pt-BR" sz="3600" dirty="0">
+              <a:solidFill>
+                <a:srgbClr val="0000CC"/>
+              </a:solidFill>
+              <a:latin typeface="Tahoma" pitchFamily="34" charset="0"/>
+            </a:endParaRPr>
           </a:p>
         </p:txBody>
       </p:sp>
@@ -6244,468 +7435,6 @@
       </p:grpSpPr>
       <p:sp>
         <p:nvSpPr>
-          <p:cNvPr id="7178" name="Text Box 10"/>
-          <p:cNvSpPr txBox="1">
-            <a:spLocks noChangeArrowheads="1"/>
-          </p:cNvSpPr>
-          <p:nvPr/>
-        </p:nvSpPr>
-        <p:spPr bwMode="auto">
-          <a:xfrm>
-            <a:off x="165893" y="836613"/>
-            <a:ext cx="8812213" cy="4770537"/>
-          </a:xfrm>
-          <a:prstGeom prst="rect">
-            <a:avLst/>
-          </a:prstGeom>
-          <a:noFill/>
-          <a:ln w="9525">
-            <a:noFill/>
-            <a:miter lim="800000"/>
-            <a:headEnd/>
-            <a:tailEnd/>
-          </a:ln>
-        </p:spPr>
-        <p:txBody>
-          <a:bodyPr>
-            <a:spAutoFit/>
-          </a:bodyPr>
-          <a:lstStyle/>
-          <a:p>
-            <a:pPr algn="l">
-              <a:buFont typeface="Wingdings" pitchFamily="2" charset="2"/>
-              <a:buNone/>
-            </a:pPr>
-            <a:endParaRPr lang="pt-BR" sz="2400" dirty="0">
-              <a:solidFill>
-                <a:srgbClr val="008000"/>
-              </a:solidFill>
-              <a:latin typeface="Tahoma" panose="020B0604030504040204" pitchFamily="34" charset="0"/>
-              <a:ea typeface="Tahoma" panose="020B0604030504040204" pitchFamily="34" charset="0"/>
-              <a:cs typeface="Tahoma" panose="020B0604030504040204" pitchFamily="34" charset="0"/>
-            </a:endParaRPr>
-          </a:p>
-          <a:p>
-            <a:pPr marL="536575" lvl="2" indent="-174625" defTabSz="630238">
-              <a:buSzPct val="80000"/>
-              <a:buFont typeface="Wingdings" pitchFamily="2" charset="2"/>
-              <a:buChar char="§"/>
-            </a:pPr>
-            <a:r>
-              <a:rPr lang="pt-BR" sz="2000" dirty="0" smtClean="0">
-                <a:latin typeface="Tahoma" panose="020B0604030504040204" pitchFamily="34" charset="0"/>
-                <a:ea typeface="Tahoma" panose="020B0604030504040204" pitchFamily="34" charset="0"/>
-                <a:cs typeface="Tahoma" panose="020B0604030504040204" pitchFamily="34" charset="0"/>
-              </a:rPr>
-              <a:t>Gabriel </a:t>
-            </a:r>
-            <a:r>
-              <a:rPr lang="pt-BR" sz="2000" dirty="0">
-                <a:latin typeface="Tahoma" panose="020B0604030504040204" pitchFamily="34" charset="0"/>
-                <a:ea typeface="Tahoma" panose="020B0604030504040204" pitchFamily="34" charset="0"/>
-                <a:cs typeface="Tahoma" panose="020B0604030504040204" pitchFamily="34" charset="0"/>
-              </a:rPr>
-              <a:t>Piccolo </a:t>
-            </a:r>
-          </a:p>
-          <a:p>
-            <a:pPr marL="993775" lvl="3" indent="-174625" defTabSz="630238">
-              <a:buSzPct val="80000"/>
-              <a:buFont typeface="Wingdings" pitchFamily="2" charset="2"/>
-              <a:buChar char="§"/>
-            </a:pPr>
-            <a:r>
-              <a:rPr lang="pt-BR" sz="2000" dirty="0">
-                <a:solidFill>
-                  <a:srgbClr val="0000CC"/>
-                </a:solidFill>
-                <a:latin typeface="Tahoma" panose="020B0604030504040204" pitchFamily="34" charset="0"/>
-                <a:ea typeface="Tahoma" panose="020B0604030504040204" pitchFamily="34" charset="0"/>
-                <a:cs typeface="Tahoma" panose="020B0604030504040204" pitchFamily="34" charset="0"/>
-              </a:rPr>
-              <a:t>Modulo de Cadastro de paciente no </a:t>
-            </a:r>
-            <a:r>
-              <a:rPr lang="pt-BR" sz="2000" dirty="0" smtClean="0">
-                <a:solidFill>
-                  <a:srgbClr val="0000CC"/>
-                </a:solidFill>
-                <a:latin typeface="Tahoma" panose="020B0604030504040204" pitchFamily="34" charset="0"/>
-                <a:ea typeface="Tahoma" panose="020B0604030504040204" pitchFamily="34" charset="0"/>
-                <a:cs typeface="Tahoma" panose="020B0604030504040204" pitchFamily="34" charset="0"/>
-              </a:rPr>
-              <a:t>sistema</a:t>
-            </a:r>
-          </a:p>
-          <a:p>
-            <a:pPr marL="993775" lvl="3" indent="-174625" defTabSz="630238">
-              <a:buSzPct val="80000"/>
-              <a:buFont typeface="Wingdings" pitchFamily="2" charset="2"/>
-              <a:buChar char="§"/>
-            </a:pPr>
-            <a:r>
-              <a:rPr lang="pt-BR" sz="2000" dirty="0">
-                <a:solidFill>
-                  <a:srgbClr val="0000CC"/>
-                </a:solidFill>
-                <a:latin typeface="Tahoma" panose="020B0604030504040204" pitchFamily="34" charset="0"/>
-                <a:ea typeface="Tahoma" panose="020B0604030504040204" pitchFamily="34" charset="0"/>
-                <a:cs typeface="Tahoma" panose="020B0604030504040204" pitchFamily="34" charset="0"/>
-              </a:rPr>
-              <a:t>Módulo cadastro exames da </a:t>
-            </a:r>
-            <a:r>
-              <a:rPr lang="pt-BR" sz="2000" dirty="0" smtClean="0">
-                <a:solidFill>
-                  <a:srgbClr val="0000CC"/>
-                </a:solidFill>
-                <a:latin typeface="Tahoma" panose="020B0604030504040204" pitchFamily="34" charset="0"/>
-                <a:ea typeface="Tahoma" panose="020B0604030504040204" pitchFamily="34" charset="0"/>
-                <a:cs typeface="Tahoma" panose="020B0604030504040204" pitchFamily="34" charset="0"/>
-              </a:rPr>
-              <a:t>clinica</a:t>
-            </a:r>
-          </a:p>
-          <a:p>
-            <a:pPr marL="993775" lvl="3" indent="-174625" defTabSz="630238">
-              <a:buSzPct val="80000"/>
-              <a:buFont typeface="Wingdings" pitchFamily="2" charset="2"/>
-              <a:buChar char="§"/>
-            </a:pPr>
-            <a:r>
-              <a:rPr lang="pt-BR" sz="2000" dirty="0">
-                <a:solidFill>
-                  <a:srgbClr val="0000CC"/>
-                </a:solidFill>
-                <a:latin typeface="Tahoma" panose="020B0604030504040204" pitchFamily="34" charset="0"/>
-                <a:ea typeface="Tahoma" panose="020B0604030504040204" pitchFamily="34" charset="0"/>
-                <a:cs typeface="Tahoma" panose="020B0604030504040204" pitchFamily="34" charset="0"/>
-              </a:rPr>
-              <a:t>Módulo Geração relatório de fluxo de </a:t>
-            </a:r>
-            <a:r>
-              <a:rPr lang="pt-BR" sz="2000" dirty="0" smtClean="0">
-                <a:solidFill>
-                  <a:srgbClr val="0000CC"/>
-                </a:solidFill>
-                <a:latin typeface="Tahoma" panose="020B0604030504040204" pitchFamily="34" charset="0"/>
-                <a:ea typeface="Tahoma" panose="020B0604030504040204" pitchFamily="34" charset="0"/>
-                <a:cs typeface="Tahoma" panose="020B0604030504040204" pitchFamily="34" charset="0"/>
-              </a:rPr>
-              <a:t>exames (será feito)</a:t>
-            </a:r>
-          </a:p>
-          <a:p>
-            <a:pPr marL="993775" lvl="3" indent="-174625" defTabSz="630238">
-              <a:buSzPct val="80000"/>
-              <a:buFont typeface="Wingdings" pitchFamily="2" charset="2"/>
-              <a:buChar char="§"/>
-            </a:pPr>
-            <a:endParaRPr lang="pt-BR" sz="2000" dirty="0">
-              <a:solidFill>
-                <a:srgbClr val="0000CC"/>
-              </a:solidFill>
-              <a:latin typeface="Tahoma" panose="020B0604030504040204" pitchFamily="34" charset="0"/>
-              <a:ea typeface="Tahoma" panose="020B0604030504040204" pitchFamily="34" charset="0"/>
-              <a:cs typeface="Tahoma" panose="020B0604030504040204" pitchFamily="34" charset="0"/>
-            </a:endParaRPr>
-          </a:p>
-          <a:p>
-            <a:pPr marL="536575" lvl="2" indent="-174625" defTabSz="630238">
-              <a:buSzPct val="80000"/>
-              <a:buFont typeface="Wingdings" pitchFamily="2" charset="2"/>
-              <a:buChar char="§"/>
-            </a:pPr>
-            <a:r>
-              <a:rPr lang="pt-BR" sz="2000" dirty="0">
-                <a:latin typeface="Tahoma" panose="020B0604030504040204" pitchFamily="34" charset="0"/>
-                <a:ea typeface="Tahoma" panose="020B0604030504040204" pitchFamily="34" charset="0"/>
-                <a:cs typeface="Tahoma" panose="020B0604030504040204" pitchFamily="34" charset="0"/>
-              </a:rPr>
-              <a:t>Pedro Gimenes </a:t>
-            </a:r>
-            <a:endParaRPr lang="pt-BR" sz="2000" dirty="0" smtClean="0">
-              <a:latin typeface="Tahoma" panose="020B0604030504040204" pitchFamily="34" charset="0"/>
-              <a:ea typeface="Tahoma" panose="020B0604030504040204" pitchFamily="34" charset="0"/>
-              <a:cs typeface="Tahoma" panose="020B0604030504040204" pitchFamily="34" charset="0"/>
-            </a:endParaRPr>
-          </a:p>
-          <a:p>
-            <a:pPr marL="993775" lvl="3" indent="-174625" defTabSz="630238">
-              <a:buSzPct val="80000"/>
-              <a:buFont typeface="Wingdings" pitchFamily="2" charset="2"/>
-              <a:buChar char="§"/>
-            </a:pPr>
-            <a:r>
-              <a:rPr lang="pt-BR" sz="2000" dirty="0">
-                <a:solidFill>
-                  <a:srgbClr val="0000CC"/>
-                </a:solidFill>
-                <a:latin typeface="Tahoma" panose="020B0604030504040204" pitchFamily="34" charset="0"/>
-                <a:ea typeface="Tahoma" panose="020B0604030504040204" pitchFamily="34" charset="0"/>
-                <a:cs typeface="Tahoma" panose="020B0604030504040204" pitchFamily="34" charset="0"/>
-              </a:rPr>
-              <a:t>Módulo de geração de código de </a:t>
-            </a:r>
-            <a:r>
-              <a:rPr lang="pt-BR" sz="2000" dirty="0" smtClean="0">
-                <a:solidFill>
-                  <a:srgbClr val="0000CC"/>
-                </a:solidFill>
-                <a:latin typeface="Tahoma" panose="020B0604030504040204" pitchFamily="34" charset="0"/>
-                <a:ea typeface="Tahoma" panose="020B0604030504040204" pitchFamily="34" charset="0"/>
-                <a:cs typeface="Tahoma" panose="020B0604030504040204" pitchFamily="34" charset="0"/>
-              </a:rPr>
-              <a:t>acompanhamento</a:t>
-            </a:r>
-          </a:p>
-          <a:p>
-            <a:pPr marL="993775" lvl="3" indent="-174625" defTabSz="630238">
-              <a:buSzPct val="80000"/>
-              <a:buFont typeface="Wingdings" pitchFamily="2" charset="2"/>
-              <a:buChar char="§"/>
-            </a:pPr>
-            <a:r>
-              <a:rPr lang="pt-BR" sz="2000" dirty="0">
-                <a:solidFill>
-                  <a:srgbClr val="0000CC"/>
-                </a:solidFill>
-                <a:latin typeface="Tahoma" panose="020B0604030504040204" pitchFamily="34" charset="0"/>
-                <a:ea typeface="Tahoma" panose="020B0604030504040204" pitchFamily="34" charset="0"/>
-                <a:cs typeface="Tahoma" panose="020B0604030504040204" pitchFamily="34" charset="0"/>
-              </a:rPr>
-              <a:t>Módulo cadastro de resultado de </a:t>
-            </a:r>
-            <a:r>
-              <a:rPr lang="pt-BR" sz="2000" dirty="0" smtClean="0">
-                <a:solidFill>
-                  <a:srgbClr val="0000CC"/>
-                </a:solidFill>
-                <a:latin typeface="Tahoma" panose="020B0604030504040204" pitchFamily="34" charset="0"/>
-                <a:ea typeface="Tahoma" panose="020B0604030504040204" pitchFamily="34" charset="0"/>
-                <a:cs typeface="Tahoma" panose="020B0604030504040204" pitchFamily="34" charset="0"/>
-              </a:rPr>
-              <a:t>exames </a:t>
-            </a:r>
-          </a:p>
-          <a:p>
-            <a:pPr marL="993775" lvl="3" indent="-174625" defTabSz="630238">
-              <a:buSzPct val="80000"/>
-              <a:buFont typeface="Wingdings" pitchFamily="2" charset="2"/>
-              <a:buChar char="§"/>
-            </a:pPr>
-            <a:r>
-              <a:rPr lang="pt-BR" sz="2000" dirty="0">
-                <a:solidFill>
-                  <a:srgbClr val="0000CC"/>
-                </a:solidFill>
-                <a:latin typeface="Tahoma" panose="020B0604030504040204" pitchFamily="34" charset="0"/>
-                <a:ea typeface="Tahoma" panose="020B0604030504040204" pitchFamily="34" charset="0"/>
-                <a:cs typeface="Tahoma" panose="020B0604030504040204" pitchFamily="34" charset="0"/>
-              </a:rPr>
-              <a:t>Módulo de contato </a:t>
-            </a:r>
-            <a:endParaRPr lang="pt-BR" sz="2000" dirty="0" smtClean="0">
-              <a:solidFill>
-                <a:srgbClr val="0000CC"/>
-              </a:solidFill>
-              <a:latin typeface="Tahoma" panose="020B0604030504040204" pitchFamily="34" charset="0"/>
-              <a:ea typeface="Tahoma" panose="020B0604030504040204" pitchFamily="34" charset="0"/>
-              <a:cs typeface="Tahoma" panose="020B0604030504040204" pitchFamily="34" charset="0"/>
-            </a:endParaRPr>
-          </a:p>
-          <a:p>
-            <a:pPr marL="993775" lvl="3" indent="-174625" defTabSz="630238">
-              <a:buSzPct val="80000"/>
-              <a:buFont typeface="Wingdings" pitchFamily="2" charset="2"/>
-              <a:buChar char="§"/>
-            </a:pPr>
-            <a:endParaRPr lang="pt-BR" sz="2000" dirty="0" smtClean="0">
-              <a:solidFill>
-                <a:srgbClr val="0000CC"/>
-              </a:solidFill>
-              <a:latin typeface="Tahoma" panose="020B0604030504040204" pitchFamily="34" charset="0"/>
-              <a:ea typeface="Tahoma" panose="020B0604030504040204" pitchFamily="34" charset="0"/>
-              <a:cs typeface="Tahoma" panose="020B0604030504040204" pitchFamily="34" charset="0"/>
-            </a:endParaRPr>
-          </a:p>
-          <a:p>
-            <a:pPr marL="536575" lvl="2" indent="-174625" defTabSz="630238">
-              <a:buSzPct val="80000"/>
-              <a:buFont typeface="Wingdings" pitchFamily="2" charset="2"/>
-              <a:buChar char="§"/>
-            </a:pPr>
-            <a:r>
-              <a:rPr lang="pt-BR" sz="2000" dirty="0">
-                <a:latin typeface="Tahoma" panose="020B0604030504040204" pitchFamily="34" charset="0"/>
-                <a:ea typeface="Tahoma" panose="020B0604030504040204" pitchFamily="34" charset="0"/>
-                <a:cs typeface="Tahoma" panose="020B0604030504040204" pitchFamily="34" charset="0"/>
-              </a:rPr>
-              <a:t>Vinícius </a:t>
-            </a:r>
-            <a:r>
-              <a:rPr lang="pt-BR" sz="2000" dirty="0" smtClean="0">
-                <a:latin typeface="Tahoma" panose="020B0604030504040204" pitchFamily="34" charset="0"/>
-                <a:ea typeface="Tahoma" panose="020B0604030504040204" pitchFamily="34" charset="0"/>
-                <a:cs typeface="Tahoma" panose="020B0604030504040204" pitchFamily="34" charset="0"/>
-              </a:rPr>
-              <a:t>Romão</a:t>
-            </a:r>
-          </a:p>
-          <a:p>
-            <a:pPr marL="993775" lvl="3" indent="-174625" defTabSz="630238">
-              <a:buSzPct val="80000"/>
-              <a:buFont typeface="Wingdings" pitchFamily="2" charset="2"/>
-              <a:buChar char="§"/>
-            </a:pPr>
-            <a:r>
-              <a:rPr lang="pt-BR" sz="2000" dirty="0" smtClean="0">
-                <a:solidFill>
-                  <a:srgbClr val="0000CC"/>
-                </a:solidFill>
-                <a:latin typeface="Tahoma" panose="020B0604030504040204" pitchFamily="34" charset="0"/>
-                <a:ea typeface="Tahoma" panose="020B0604030504040204" pitchFamily="34" charset="0"/>
-                <a:cs typeface="Tahoma" panose="020B0604030504040204" pitchFamily="34" charset="0"/>
-              </a:rPr>
-              <a:t>Modulo </a:t>
-            </a:r>
-            <a:r>
-              <a:rPr lang="pt-BR" sz="2000" dirty="0">
-                <a:solidFill>
-                  <a:srgbClr val="0000CC"/>
-                </a:solidFill>
-                <a:latin typeface="Tahoma" panose="020B0604030504040204" pitchFamily="34" charset="0"/>
-                <a:ea typeface="Tahoma" panose="020B0604030504040204" pitchFamily="34" charset="0"/>
-                <a:cs typeface="Tahoma" panose="020B0604030504040204" pitchFamily="34" charset="0"/>
-              </a:rPr>
-              <a:t>de Cadastro de gestores no </a:t>
-            </a:r>
-            <a:r>
-              <a:rPr lang="pt-BR" sz="2000" dirty="0" smtClean="0">
-                <a:solidFill>
-                  <a:srgbClr val="0000CC"/>
-                </a:solidFill>
-                <a:latin typeface="Tahoma" panose="020B0604030504040204" pitchFamily="34" charset="0"/>
-                <a:ea typeface="Tahoma" panose="020B0604030504040204" pitchFamily="34" charset="0"/>
-                <a:cs typeface="Tahoma" panose="020B0604030504040204" pitchFamily="34" charset="0"/>
-              </a:rPr>
-              <a:t>sistema</a:t>
-            </a:r>
-          </a:p>
-          <a:p>
-            <a:pPr marL="993775" lvl="3" indent="-174625" defTabSz="630238">
-              <a:buSzPct val="80000"/>
-              <a:buFont typeface="Wingdings" pitchFamily="2" charset="2"/>
-              <a:buChar char="§"/>
-            </a:pPr>
-            <a:r>
-              <a:rPr lang="pt-BR" sz="2000" dirty="0">
-                <a:solidFill>
-                  <a:srgbClr val="0000CC"/>
-                </a:solidFill>
-                <a:latin typeface="Tahoma" panose="020B0604030504040204" pitchFamily="34" charset="0"/>
-                <a:ea typeface="Tahoma" panose="020B0604030504040204" pitchFamily="34" charset="0"/>
-                <a:cs typeface="Tahoma" panose="020B0604030504040204" pitchFamily="34" charset="0"/>
-              </a:rPr>
-              <a:t>Módulo Documentação histórico dos </a:t>
-            </a:r>
-            <a:r>
-              <a:rPr lang="pt-BR" sz="2000" dirty="0" smtClean="0">
-                <a:solidFill>
-                  <a:srgbClr val="0000CC"/>
-                </a:solidFill>
-                <a:latin typeface="Tahoma" panose="020B0604030504040204" pitchFamily="34" charset="0"/>
-                <a:ea typeface="Tahoma" panose="020B0604030504040204" pitchFamily="34" charset="0"/>
-                <a:cs typeface="Tahoma" panose="020B0604030504040204" pitchFamily="34" charset="0"/>
-              </a:rPr>
-              <a:t>pacientes </a:t>
-            </a:r>
-            <a:r>
-              <a:rPr lang="pt-BR" sz="2000" dirty="0">
-                <a:solidFill>
-                  <a:srgbClr val="0000CC"/>
-                </a:solidFill>
-                <a:latin typeface="Tahoma" panose="020B0604030504040204" pitchFamily="34" charset="0"/>
-                <a:ea typeface="Tahoma" panose="020B0604030504040204" pitchFamily="34" charset="0"/>
-                <a:cs typeface="Tahoma" panose="020B0604030504040204" pitchFamily="34" charset="0"/>
-              </a:rPr>
-              <a:t>(será feito</a:t>
-            </a:r>
-            <a:r>
-              <a:rPr lang="pt-BR" sz="2000" dirty="0" smtClean="0">
-                <a:solidFill>
-                  <a:srgbClr val="0000CC"/>
-                </a:solidFill>
-                <a:latin typeface="Tahoma" panose="020B0604030504040204" pitchFamily="34" charset="0"/>
-                <a:ea typeface="Tahoma" panose="020B0604030504040204" pitchFamily="34" charset="0"/>
-                <a:cs typeface="Tahoma" panose="020B0604030504040204" pitchFamily="34" charset="0"/>
-              </a:rPr>
-              <a:t>)</a:t>
-            </a:r>
-          </a:p>
-          <a:p>
-            <a:pPr marL="993775" lvl="3" indent="-174625" defTabSz="630238">
-              <a:buSzPct val="80000"/>
-              <a:buFont typeface="Wingdings" pitchFamily="2" charset="2"/>
-              <a:buChar char="§"/>
-            </a:pPr>
-            <a:r>
-              <a:rPr lang="pt-BR" sz="2000" dirty="0">
-                <a:solidFill>
-                  <a:srgbClr val="0000CC"/>
-                </a:solidFill>
-                <a:latin typeface="Tahoma" panose="020B0604030504040204" pitchFamily="34" charset="0"/>
-                <a:ea typeface="Tahoma" panose="020B0604030504040204" pitchFamily="34" charset="0"/>
-                <a:cs typeface="Tahoma" panose="020B0604030504040204" pitchFamily="34" charset="0"/>
-              </a:rPr>
-              <a:t>Módulo Geração prontuário digital para o </a:t>
-            </a:r>
-            <a:r>
-              <a:rPr lang="pt-BR" sz="2000" dirty="0" smtClean="0">
-                <a:solidFill>
-                  <a:srgbClr val="0000CC"/>
-                </a:solidFill>
-                <a:latin typeface="Tahoma" panose="020B0604030504040204" pitchFamily="34" charset="0"/>
-                <a:ea typeface="Tahoma" panose="020B0604030504040204" pitchFamily="34" charset="0"/>
-                <a:cs typeface="Tahoma" panose="020B0604030504040204" pitchFamily="34" charset="0"/>
-              </a:rPr>
-              <a:t>paciente </a:t>
-            </a:r>
-            <a:r>
-              <a:rPr lang="pt-BR" sz="2000" dirty="0">
-                <a:solidFill>
-                  <a:srgbClr val="0000CC"/>
-                </a:solidFill>
-                <a:latin typeface="Tahoma" panose="020B0604030504040204" pitchFamily="34" charset="0"/>
-                <a:ea typeface="Tahoma" panose="020B0604030504040204" pitchFamily="34" charset="0"/>
-                <a:cs typeface="Tahoma" panose="020B0604030504040204" pitchFamily="34" charset="0"/>
-              </a:rPr>
-              <a:t>(será feito</a:t>
-            </a:r>
-            <a:r>
-              <a:rPr lang="pt-BR" sz="2000" dirty="0" smtClean="0">
-                <a:solidFill>
-                  <a:srgbClr val="0000CC"/>
-                </a:solidFill>
-                <a:latin typeface="Tahoma" panose="020B0604030504040204" pitchFamily="34" charset="0"/>
-                <a:ea typeface="Tahoma" panose="020B0604030504040204" pitchFamily="34" charset="0"/>
-                <a:cs typeface="Tahoma" panose="020B0604030504040204" pitchFamily="34" charset="0"/>
-              </a:rPr>
-              <a:t>)</a:t>
-            </a:r>
-            <a:endParaRPr lang="pt-BR" sz="2000" dirty="0">
-              <a:solidFill>
-                <a:srgbClr val="0000CC"/>
-              </a:solidFill>
-              <a:latin typeface="Tahoma" panose="020B0604030504040204" pitchFamily="34" charset="0"/>
-              <a:ea typeface="Tahoma" panose="020B0604030504040204" pitchFamily="34" charset="0"/>
-              <a:cs typeface="Tahoma" panose="020B0604030504040204" pitchFamily="34" charset="0"/>
-            </a:endParaRPr>
-          </a:p>
-        </p:txBody>
-      </p:sp>
-      <p:sp>
-        <p:nvSpPr>
           <p:cNvPr id="5123" name="Rectangle 13"/>
           <p:cNvSpPr>
             <a:spLocks noGrp="1" noChangeArrowheads="1"/>
@@ -6743,7 +7472,7 @@
                 </a:solidFill>
                 <a:latin typeface="Tahoma" pitchFamily="34" charset="0"/>
               </a:rPr>
-              <a:t>Equipe e divisão do trabalho</a:t>
+              <a:t>Escopo do projeto</a:t>
             </a:r>
             <a:endParaRPr lang="pt-BR" sz="3600" dirty="0">
               <a:solidFill>
@@ -6755,6 +7484,11 @@
         </p:txBody>
       </p:sp>
     </p:spTree>
+    <p:extLst>
+      <p:ext uri="{BB962C8B-B14F-4D97-AF65-F5344CB8AC3E}">
+        <p14:creationId xmlns:p14="http://schemas.microsoft.com/office/powerpoint/2010/main" val="1876772912"/>
+      </p:ext>
+    </p:extLst>
   </p:cSld>
   <p:clrMapOvr>
     <a:masterClrMapping/>
@@ -6788,7 +7522,7 @@
       </p:grpSpPr>
       <p:sp>
         <p:nvSpPr>
-          <p:cNvPr id="81922" name="Text Box 2"/>
+          <p:cNvPr id="82946" name="Text Box 2"/>
           <p:cNvSpPr txBox="1">
             <a:spLocks noChangeArrowheads="1"/>
           </p:cNvSpPr>
@@ -6797,7 +7531,7 @@
         <p:spPr bwMode="auto">
           <a:xfrm>
             <a:off x="152400" y="857232"/>
-            <a:ext cx="8812213" cy="830997"/>
+            <a:ext cx="8812213" cy="4893647"/>
           </a:xfrm>
           <a:prstGeom prst="rect">
             <a:avLst/>
@@ -6816,7 +7550,30 @@
           </a:bodyPr>
           <a:lstStyle/>
           <a:p>
-            <a:pPr marL="993775" lvl="3" indent="-190500">
+            <a:pPr marL="79375" lvl="1" indent="-174625">
+              <a:buSzPct val="80000"/>
+            </a:pPr>
+            <a:r>
+              <a:rPr lang="pt-BR" sz="2400" b="1" dirty="0" smtClean="0">
+                <a:latin typeface="Tahoma" panose="020B0604030504040204" pitchFamily="34" charset="0"/>
+                <a:ea typeface="Tahoma" panose="020B0604030504040204" pitchFamily="34" charset="0"/>
+                <a:cs typeface="Tahoma" panose="020B0604030504040204" pitchFamily="34" charset="0"/>
+              </a:rPr>
+              <a:t>Requisitos Funcionais</a:t>
+            </a:r>
+          </a:p>
+          <a:p>
+            <a:pPr marL="79375" lvl="1" indent="-174625">
+              <a:buSzPct val="80000"/>
+            </a:pPr>
+            <a:endParaRPr lang="pt-BR" sz="2400" b="1" dirty="0" smtClean="0">
+              <a:latin typeface="Tahoma" panose="020B0604030504040204" pitchFamily="34" charset="0"/>
+              <a:ea typeface="Tahoma" panose="020B0604030504040204" pitchFamily="34" charset="0"/>
+              <a:cs typeface="Tahoma" panose="020B0604030504040204" pitchFamily="34" charset="0"/>
+            </a:endParaRPr>
+          </a:p>
+          <a:p>
+            <a:pPr marL="536575" lvl="2" indent="-174625" algn="l">
               <a:buSzPct val="80000"/>
               <a:buFont typeface="Wingdings" pitchFamily="2" charset="2"/>
               <a:buChar char="§"/>
@@ -6827,34 +7584,306 @@
                 <a:ea typeface="Tahoma" panose="020B0604030504040204" pitchFamily="34" charset="0"/>
                 <a:cs typeface="Tahoma" panose="020B0604030504040204" pitchFamily="34" charset="0"/>
               </a:rPr>
-              <a:t>Ideia do projeto foi criada no Projeto Integrador</a:t>
+              <a:t>Funcionalidades que já estão implementadas</a:t>
+            </a:r>
+          </a:p>
+          <a:p>
+            <a:pPr marL="993775" lvl="3" indent="-174625">
+              <a:buSzPct val="80000"/>
+              <a:buFont typeface="Wingdings" pitchFamily="2" charset="2"/>
+              <a:buChar char="§"/>
+            </a:pPr>
+            <a:r>
+              <a:rPr lang="pt-BR" sz="2400" dirty="0" smtClean="0">
+                <a:solidFill>
+                  <a:srgbClr val="0000CC"/>
+                </a:solidFill>
+                <a:latin typeface="Tahoma" panose="020B0604030504040204" pitchFamily="34" charset="0"/>
+                <a:ea typeface="Tahoma" panose="020B0604030504040204" pitchFamily="34" charset="0"/>
+                <a:cs typeface="Tahoma" panose="020B0604030504040204" pitchFamily="34" charset="0"/>
+              </a:rPr>
+              <a:t> Verificar </a:t>
+            </a:r>
+            <a:r>
+              <a:rPr lang="pt-BR" sz="2400" dirty="0">
+                <a:solidFill>
+                  <a:srgbClr val="0000CC"/>
+                </a:solidFill>
+                <a:latin typeface="Tahoma" panose="020B0604030504040204" pitchFamily="34" charset="0"/>
+                <a:ea typeface="Tahoma" panose="020B0604030504040204" pitchFamily="34" charset="0"/>
+                <a:cs typeface="Tahoma" panose="020B0604030504040204" pitchFamily="34" charset="0"/>
+              </a:rPr>
+              <a:t>resultado do exame online </a:t>
+            </a:r>
+          </a:p>
+          <a:p>
+            <a:pPr marL="993775" lvl="3" indent="-174625">
+              <a:buSzPct val="80000"/>
+              <a:buFont typeface="Wingdings" pitchFamily="2" charset="2"/>
+              <a:buChar char="§"/>
+            </a:pPr>
+            <a:r>
+              <a:rPr lang="pt-BR" sz="2400" dirty="0" smtClean="0">
+                <a:solidFill>
+                  <a:srgbClr val="0000CC"/>
+                </a:solidFill>
+                <a:latin typeface="Tahoma" panose="020B0604030504040204" pitchFamily="34" charset="0"/>
+                <a:ea typeface="Tahoma" panose="020B0604030504040204" pitchFamily="34" charset="0"/>
+                <a:cs typeface="Tahoma" panose="020B0604030504040204" pitchFamily="34" charset="0"/>
+              </a:rPr>
+              <a:t> Cadastrar </a:t>
+            </a:r>
+            <a:r>
+              <a:rPr lang="pt-BR" sz="2400" dirty="0">
+                <a:solidFill>
+                  <a:srgbClr val="0000CC"/>
+                </a:solidFill>
+                <a:latin typeface="Tahoma" panose="020B0604030504040204" pitchFamily="34" charset="0"/>
+                <a:ea typeface="Tahoma" panose="020B0604030504040204" pitchFamily="34" charset="0"/>
+                <a:cs typeface="Tahoma" panose="020B0604030504040204" pitchFamily="34" charset="0"/>
+              </a:rPr>
+              <a:t>pacientes no sistema</a:t>
+            </a:r>
+          </a:p>
+          <a:p>
+            <a:pPr marL="993775" lvl="3" indent="-174625">
+              <a:buSzPct val="80000"/>
+              <a:buFont typeface="Wingdings" pitchFamily="2" charset="2"/>
+              <a:buChar char="§"/>
+            </a:pPr>
+            <a:r>
+              <a:rPr lang="pt-BR" sz="2400" dirty="0" smtClean="0">
+                <a:solidFill>
+                  <a:srgbClr val="0000CC"/>
+                </a:solidFill>
+                <a:latin typeface="Tahoma" panose="020B0604030504040204" pitchFamily="34" charset="0"/>
+                <a:ea typeface="Tahoma" panose="020B0604030504040204" pitchFamily="34" charset="0"/>
+                <a:cs typeface="Tahoma" panose="020B0604030504040204" pitchFamily="34" charset="0"/>
+              </a:rPr>
+              <a:t> Cadastrar </a:t>
+            </a:r>
+            <a:r>
+              <a:rPr lang="pt-BR" sz="2400" dirty="0">
+                <a:solidFill>
+                  <a:srgbClr val="0000CC"/>
+                </a:solidFill>
+                <a:latin typeface="Tahoma" panose="020B0604030504040204" pitchFamily="34" charset="0"/>
+                <a:ea typeface="Tahoma" panose="020B0604030504040204" pitchFamily="34" charset="0"/>
+                <a:cs typeface="Tahoma" panose="020B0604030504040204" pitchFamily="34" charset="0"/>
+              </a:rPr>
+              <a:t>Gestores</a:t>
+            </a:r>
+          </a:p>
+          <a:p>
+            <a:pPr marL="993775" lvl="3" indent="-174625">
+              <a:buSzPct val="80000"/>
+              <a:buFont typeface="Wingdings" pitchFamily="2" charset="2"/>
+              <a:buChar char="§"/>
+            </a:pPr>
+            <a:r>
+              <a:rPr lang="pt-BR" sz="2400" dirty="0" smtClean="0">
+                <a:solidFill>
+                  <a:srgbClr val="0000CC"/>
+                </a:solidFill>
+                <a:latin typeface="Tahoma" panose="020B0604030504040204" pitchFamily="34" charset="0"/>
+                <a:ea typeface="Tahoma" panose="020B0604030504040204" pitchFamily="34" charset="0"/>
+                <a:cs typeface="Tahoma" panose="020B0604030504040204" pitchFamily="34" charset="0"/>
+              </a:rPr>
+              <a:t> Tirar </a:t>
+            </a:r>
+            <a:r>
+              <a:rPr lang="pt-BR" sz="2400" dirty="0">
+                <a:solidFill>
+                  <a:srgbClr val="0000CC"/>
+                </a:solidFill>
+                <a:latin typeface="Tahoma" panose="020B0604030504040204" pitchFamily="34" charset="0"/>
+                <a:ea typeface="Tahoma" panose="020B0604030504040204" pitchFamily="34" charset="0"/>
+                <a:cs typeface="Tahoma" panose="020B0604030504040204" pitchFamily="34" charset="0"/>
+              </a:rPr>
+              <a:t>duvidas</a:t>
+            </a:r>
+          </a:p>
+          <a:p>
+            <a:pPr marL="993775" lvl="3" indent="-174625">
+              <a:buSzPct val="80000"/>
+              <a:buFont typeface="Wingdings" pitchFamily="2" charset="2"/>
+              <a:buChar char="§"/>
+            </a:pPr>
+            <a:r>
+              <a:rPr lang="pt-BR" sz="2400" dirty="0" smtClean="0">
+                <a:solidFill>
+                  <a:srgbClr val="0000CC"/>
+                </a:solidFill>
+                <a:latin typeface="Tahoma" panose="020B0604030504040204" pitchFamily="34" charset="0"/>
+                <a:ea typeface="Tahoma" panose="020B0604030504040204" pitchFamily="34" charset="0"/>
+                <a:cs typeface="Tahoma" panose="020B0604030504040204" pitchFamily="34" charset="0"/>
+              </a:rPr>
+              <a:t> Responder </a:t>
+            </a:r>
+            <a:r>
+              <a:rPr lang="pt-BR" sz="2400" dirty="0">
+                <a:solidFill>
+                  <a:srgbClr val="0000CC"/>
+                </a:solidFill>
+                <a:latin typeface="Tahoma" panose="020B0604030504040204" pitchFamily="34" charset="0"/>
+                <a:ea typeface="Tahoma" panose="020B0604030504040204" pitchFamily="34" charset="0"/>
+                <a:cs typeface="Tahoma" panose="020B0604030504040204" pitchFamily="34" charset="0"/>
+              </a:rPr>
+              <a:t>Duvidas</a:t>
+            </a:r>
+          </a:p>
+          <a:p>
+            <a:pPr marL="993775" lvl="3" indent="-174625">
+              <a:buSzPct val="80000"/>
+              <a:buFont typeface="Wingdings" pitchFamily="2" charset="2"/>
+              <a:buChar char="§"/>
+            </a:pPr>
+            <a:r>
+              <a:rPr lang="pt-BR" sz="2400" dirty="0" smtClean="0">
+                <a:solidFill>
+                  <a:srgbClr val="0000CC"/>
+                </a:solidFill>
+                <a:latin typeface="Tahoma" panose="020B0604030504040204" pitchFamily="34" charset="0"/>
+                <a:ea typeface="Tahoma" panose="020B0604030504040204" pitchFamily="34" charset="0"/>
+                <a:cs typeface="Tahoma" panose="020B0604030504040204" pitchFamily="34" charset="0"/>
+              </a:rPr>
+              <a:t> </a:t>
+            </a:r>
+            <a:r>
+              <a:rPr lang="pt-BR" sz="2400" dirty="0" err="1" smtClean="0">
+                <a:solidFill>
+                  <a:srgbClr val="0000CC"/>
+                </a:solidFill>
+                <a:latin typeface="Tahoma" panose="020B0604030504040204" pitchFamily="34" charset="0"/>
+                <a:ea typeface="Tahoma" panose="020B0604030504040204" pitchFamily="34" charset="0"/>
+                <a:cs typeface="Tahoma" panose="020B0604030504040204" pitchFamily="34" charset="0"/>
+              </a:rPr>
+              <a:t>Login</a:t>
             </a:r>
             <a:endParaRPr lang="pt-BR" sz="2400" dirty="0">
+              <a:solidFill>
+                <a:srgbClr val="0000CC"/>
+              </a:solidFill>
               <a:latin typeface="Tahoma" panose="020B0604030504040204" pitchFamily="34" charset="0"/>
               <a:ea typeface="Tahoma" panose="020B0604030504040204" pitchFamily="34" charset="0"/>
               <a:cs typeface="Tahoma" panose="020B0604030504040204" pitchFamily="34" charset="0"/>
             </a:endParaRPr>
           </a:p>
           <a:p>
-            <a:pPr marL="993775" lvl="3" indent="-190500">
+            <a:pPr marL="993775" lvl="3" indent="-174625">
               <a:buSzPct val="80000"/>
               <a:buFont typeface="Wingdings" pitchFamily="2" charset="2"/>
               <a:buChar char="§"/>
             </a:pPr>
             <a:r>
               <a:rPr lang="pt-BR" sz="2400" dirty="0" smtClean="0">
+                <a:solidFill>
+                  <a:srgbClr val="0000CC"/>
+                </a:solidFill>
                 <a:latin typeface="Tahoma" panose="020B0604030504040204" pitchFamily="34" charset="0"/>
                 <a:ea typeface="Tahoma" panose="020B0604030504040204" pitchFamily="34" charset="0"/>
                 <a:cs typeface="Tahoma" panose="020B0604030504040204" pitchFamily="34" charset="0"/>
               </a:rPr>
-              <a:t>Sucesso na criação e implementação de novas ideias</a:t>
-            </a:r>
-          </a:p>
-        </p:txBody>
-      </p:sp>
-      <p:sp>
-        <p:nvSpPr>
-          <p:cNvPr id="5" name="Rectangle 13"/>
+              <a:t> </a:t>
+            </a:r>
+            <a:r>
+              <a:rPr lang="pt-BR" sz="2400" dirty="0" err="1" smtClean="0">
+                <a:solidFill>
+                  <a:srgbClr val="0000CC"/>
+                </a:solidFill>
+                <a:latin typeface="Tahoma" panose="020B0604030504040204" pitchFamily="34" charset="0"/>
+                <a:ea typeface="Tahoma" panose="020B0604030504040204" pitchFamily="34" charset="0"/>
+                <a:cs typeface="Tahoma" panose="020B0604030504040204" pitchFamily="34" charset="0"/>
+              </a:rPr>
+              <a:t>Logout</a:t>
+            </a:r>
+            <a:endParaRPr lang="pt-BR" sz="2400" dirty="0">
+              <a:solidFill>
+                <a:srgbClr val="0000CC"/>
+              </a:solidFill>
+              <a:latin typeface="Tahoma" panose="020B0604030504040204" pitchFamily="34" charset="0"/>
+              <a:ea typeface="Tahoma" panose="020B0604030504040204" pitchFamily="34" charset="0"/>
+              <a:cs typeface="Tahoma" panose="020B0604030504040204" pitchFamily="34" charset="0"/>
+            </a:endParaRPr>
+          </a:p>
+          <a:p>
+            <a:pPr marL="993775" lvl="3" indent="-174625">
+              <a:buSzPct val="80000"/>
+              <a:buFont typeface="Wingdings" pitchFamily="2" charset="2"/>
+              <a:buChar char="§"/>
+            </a:pPr>
+            <a:r>
+              <a:rPr lang="pt-BR" sz="2400" dirty="0" smtClean="0">
+                <a:solidFill>
+                  <a:srgbClr val="0000CC"/>
+                </a:solidFill>
+                <a:latin typeface="Tahoma" panose="020B0604030504040204" pitchFamily="34" charset="0"/>
+                <a:ea typeface="Tahoma" panose="020B0604030504040204" pitchFamily="34" charset="0"/>
+                <a:cs typeface="Tahoma" panose="020B0604030504040204" pitchFamily="34" charset="0"/>
+              </a:rPr>
+              <a:t> Cadastrar </a:t>
+            </a:r>
+            <a:r>
+              <a:rPr lang="pt-BR" sz="2400" dirty="0">
+                <a:solidFill>
+                  <a:srgbClr val="0000CC"/>
+                </a:solidFill>
+                <a:latin typeface="Tahoma" panose="020B0604030504040204" pitchFamily="34" charset="0"/>
+                <a:ea typeface="Tahoma" panose="020B0604030504040204" pitchFamily="34" charset="0"/>
+                <a:cs typeface="Tahoma" panose="020B0604030504040204" pitchFamily="34" charset="0"/>
+              </a:rPr>
+              <a:t>exames</a:t>
+            </a:r>
+          </a:p>
+          <a:p>
+            <a:pPr marL="993775" lvl="3" indent="-174625">
+              <a:buSzPct val="80000"/>
+              <a:buFont typeface="Wingdings" pitchFamily="2" charset="2"/>
+              <a:buChar char="§"/>
+            </a:pPr>
+            <a:r>
+              <a:rPr lang="pt-BR" sz="2400" dirty="0" smtClean="0">
+                <a:solidFill>
+                  <a:srgbClr val="0000CC"/>
+                </a:solidFill>
+                <a:latin typeface="Tahoma" panose="020B0604030504040204" pitchFamily="34" charset="0"/>
+                <a:ea typeface="Tahoma" panose="020B0604030504040204" pitchFamily="34" charset="0"/>
+                <a:cs typeface="Tahoma" panose="020B0604030504040204" pitchFamily="34" charset="0"/>
+              </a:rPr>
+              <a:t> Cadastrar </a:t>
+            </a:r>
+            <a:r>
+              <a:rPr lang="pt-BR" sz="2400" dirty="0">
+                <a:solidFill>
+                  <a:srgbClr val="0000CC"/>
+                </a:solidFill>
+                <a:latin typeface="Tahoma" panose="020B0604030504040204" pitchFamily="34" charset="0"/>
+                <a:ea typeface="Tahoma" panose="020B0604030504040204" pitchFamily="34" charset="0"/>
+                <a:cs typeface="Tahoma" panose="020B0604030504040204" pitchFamily="34" charset="0"/>
+              </a:rPr>
+              <a:t>resultado de exames realizados</a:t>
+            </a:r>
+          </a:p>
+          <a:p>
+            <a:pPr marL="993775" lvl="3" indent="-174625">
+              <a:buSzPct val="80000"/>
+              <a:buFont typeface="Wingdings" pitchFamily="2" charset="2"/>
+              <a:buChar char="§"/>
+            </a:pPr>
+            <a:endParaRPr lang="pt-BR" sz="2400" dirty="0" smtClean="0">
+              <a:solidFill>
+                <a:srgbClr val="0000CC"/>
+              </a:solidFill>
+              <a:latin typeface="Tahoma" panose="020B0604030504040204" pitchFamily="34" charset="0"/>
+              <a:ea typeface="Tahoma" panose="020B0604030504040204" pitchFamily="34" charset="0"/>
+              <a:cs typeface="Tahoma" panose="020B0604030504040204" pitchFamily="34" charset="0"/>
+            </a:endParaRPr>
+          </a:p>
+        </p:txBody>
+      </p:sp>
+      <p:sp>
+        <p:nvSpPr>
+          <p:cNvPr id="7171" name="Rectangle 3"/>
           <p:cNvSpPr>
             <a:spLocks noGrp="1" noChangeArrowheads="1"/>
           </p:cNvSpPr>
@@ -6891,7 +7920,7 @@
                 </a:solidFill>
                 <a:latin typeface="Tahoma" pitchFamily="34" charset="0"/>
               </a:rPr>
-              <a:t>Histórico do Projeto</a:t>
+              <a:t>Escopo do produto</a:t>
             </a:r>
             <a:endParaRPr lang="pt-BR" sz="3600" dirty="0">
               <a:solidFill>
@@ -6905,7 +7934,7 @@
     </p:spTree>
     <p:extLst>
       <p:ext uri="{BB962C8B-B14F-4D97-AF65-F5344CB8AC3E}">
-        <p14:creationId xmlns:p14="http://schemas.microsoft.com/office/powerpoint/2010/main" val="2957975353"/>
+        <p14:creationId xmlns:p14="http://schemas.microsoft.com/office/powerpoint/2010/main" val="1862423078"/>
       </p:ext>
     </p:extLst>
   </p:cSld>
@@ -6941,412 +7970,6 @@
       </p:grpSpPr>
       <p:sp>
         <p:nvSpPr>
-          <p:cNvPr id="82946" name="Text Box 2"/>
-          <p:cNvSpPr txBox="1">
-            <a:spLocks noChangeArrowheads="1"/>
-          </p:cNvSpPr>
-          <p:nvPr/>
-        </p:nvSpPr>
-        <p:spPr bwMode="auto">
-          <a:xfrm>
-            <a:off x="152400" y="857232"/>
-            <a:ext cx="8812213" cy="5632311"/>
-          </a:xfrm>
-          <a:prstGeom prst="rect">
-            <a:avLst/>
-          </a:prstGeom>
-          <a:noFill/>
-          <a:ln w="9525">
-            <a:noFill/>
-            <a:miter lim="800000"/>
-            <a:headEnd/>
-            <a:tailEnd/>
-          </a:ln>
-        </p:spPr>
-        <p:txBody>
-          <a:bodyPr>
-            <a:spAutoFit/>
-          </a:bodyPr>
-          <a:lstStyle/>
-          <a:p>
-            <a:pPr algn="l">
-              <a:buFont typeface="Webdings" pitchFamily="18" charset="2"/>
-              <a:buNone/>
-            </a:pPr>
-            <a:endParaRPr lang="pt-BR" sz="2400" dirty="0">
-              <a:solidFill>
-                <a:srgbClr val="008000"/>
-              </a:solidFill>
-              <a:latin typeface="Tahoma" panose="020B0604030504040204" pitchFamily="34" charset="0"/>
-              <a:ea typeface="Tahoma" panose="020B0604030504040204" pitchFamily="34" charset="0"/>
-              <a:cs typeface="Tahoma" panose="020B0604030504040204" pitchFamily="34" charset="0"/>
-            </a:endParaRPr>
-          </a:p>
-          <a:p>
-            <a:pPr marL="536575" lvl="2" indent="-174625">
-              <a:buSzPct val="80000"/>
-              <a:buFont typeface="Wingdings" pitchFamily="2" charset="2"/>
-              <a:buChar char="§"/>
-            </a:pPr>
-            <a:r>
-              <a:rPr lang="pt-BR" sz="2400" dirty="0" smtClean="0">
-                <a:latin typeface="Tahoma" panose="020B0604030504040204" pitchFamily="34" charset="0"/>
-                <a:ea typeface="Tahoma" panose="020B0604030504040204" pitchFamily="34" charset="0"/>
-                <a:cs typeface="Tahoma" panose="020B0604030504040204" pitchFamily="34" charset="0"/>
-              </a:rPr>
-              <a:t>Aplicabilidade</a:t>
-            </a:r>
-          </a:p>
-          <a:p>
-            <a:pPr marL="993775" lvl="3" indent="-174625">
-              <a:buSzPct val="80000"/>
-              <a:buFont typeface="Wingdings" pitchFamily="2" charset="2"/>
-              <a:buChar char="§"/>
-            </a:pPr>
-            <a:r>
-              <a:rPr lang="pt-BR" sz="2400" dirty="0" smtClean="0">
-                <a:solidFill>
-                  <a:srgbClr val="0000CC"/>
-                </a:solidFill>
-                <a:latin typeface="Tahoma" panose="020B0604030504040204" pitchFamily="34" charset="0"/>
-                <a:ea typeface="Tahoma" panose="020B0604030504040204" pitchFamily="34" charset="0"/>
-                <a:cs typeface="Tahoma" panose="020B0604030504040204" pitchFamily="34" charset="0"/>
-              </a:rPr>
-              <a:t> Produto voltado a clinica de exames </a:t>
-            </a:r>
-            <a:endParaRPr lang="pt-BR" sz="2400" dirty="0">
-              <a:solidFill>
-                <a:srgbClr val="0000CC"/>
-              </a:solidFill>
-              <a:latin typeface="Tahoma" panose="020B0604030504040204" pitchFamily="34" charset="0"/>
-              <a:ea typeface="Tahoma" panose="020B0604030504040204" pitchFamily="34" charset="0"/>
-              <a:cs typeface="Tahoma" panose="020B0604030504040204" pitchFamily="34" charset="0"/>
-            </a:endParaRPr>
-          </a:p>
-          <a:p>
-            <a:pPr marL="536575" lvl="2" indent="-174625" algn="l">
-              <a:buSzPct val="80000"/>
-            </a:pPr>
-            <a:endParaRPr lang="pt-BR" sz="2400" dirty="0" smtClean="0">
-              <a:solidFill>
-                <a:srgbClr val="0000CC"/>
-              </a:solidFill>
-              <a:latin typeface="Tahoma" panose="020B0604030504040204" pitchFamily="34" charset="0"/>
-              <a:ea typeface="Tahoma" panose="020B0604030504040204" pitchFamily="34" charset="0"/>
-              <a:cs typeface="Tahoma" panose="020B0604030504040204" pitchFamily="34" charset="0"/>
-            </a:endParaRPr>
-          </a:p>
-          <a:p>
-            <a:pPr marL="536575" lvl="2" indent="-174625" algn="l">
-              <a:buSzPct val="80000"/>
-              <a:buFont typeface="Wingdings" pitchFamily="2" charset="2"/>
-              <a:buChar char="§"/>
-            </a:pPr>
-            <a:r>
-              <a:rPr lang="pt-BR" sz="2400" dirty="0" smtClean="0">
-                <a:latin typeface="Tahoma" panose="020B0604030504040204" pitchFamily="34" charset="0"/>
-                <a:ea typeface="Tahoma" panose="020B0604030504040204" pitchFamily="34" charset="0"/>
-                <a:cs typeface="Tahoma" panose="020B0604030504040204" pitchFamily="34" charset="0"/>
-              </a:rPr>
-              <a:t>Funcionalidades que já estão implementadas</a:t>
-            </a:r>
-          </a:p>
-          <a:p>
-            <a:pPr marL="993775" lvl="3" indent="-174625">
-              <a:buSzPct val="80000"/>
-              <a:buFont typeface="Wingdings" pitchFamily="2" charset="2"/>
-              <a:buChar char="§"/>
-            </a:pPr>
-            <a:r>
-              <a:rPr lang="pt-BR" sz="2400" dirty="0" smtClean="0">
-                <a:solidFill>
-                  <a:srgbClr val="0000CC"/>
-                </a:solidFill>
-                <a:latin typeface="Tahoma" panose="020B0604030504040204" pitchFamily="34" charset="0"/>
-                <a:ea typeface="Tahoma" panose="020B0604030504040204" pitchFamily="34" charset="0"/>
-                <a:cs typeface="Tahoma" panose="020B0604030504040204" pitchFamily="34" charset="0"/>
-              </a:rPr>
-              <a:t> Verificar </a:t>
-            </a:r>
-            <a:r>
-              <a:rPr lang="pt-BR" sz="2400" dirty="0">
-                <a:solidFill>
-                  <a:srgbClr val="0000CC"/>
-                </a:solidFill>
-                <a:latin typeface="Tahoma" panose="020B0604030504040204" pitchFamily="34" charset="0"/>
-                <a:ea typeface="Tahoma" panose="020B0604030504040204" pitchFamily="34" charset="0"/>
-                <a:cs typeface="Tahoma" panose="020B0604030504040204" pitchFamily="34" charset="0"/>
-              </a:rPr>
-              <a:t>resultado do exame online </a:t>
-            </a:r>
-          </a:p>
-          <a:p>
-            <a:pPr marL="993775" lvl="3" indent="-174625">
-              <a:buSzPct val="80000"/>
-              <a:buFont typeface="Wingdings" pitchFamily="2" charset="2"/>
-              <a:buChar char="§"/>
-            </a:pPr>
-            <a:r>
-              <a:rPr lang="pt-BR" sz="2400" dirty="0" smtClean="0">
-                <a:solidFill>
-                  <a:srgbClr val="0000CC"/>
-                </a:solidFill>
-                <a:latin typeface="Tahoma" panose="020B0604030504040204" pitchFamily="34" charset="0"/>
-                <a:ea typeface="Tahoma" panose="020B0604030504040204" pitchFamily="34" charset="0"/>
-                <a:cs typeface="Tahoma" panose="020B0604030504040204" pitchFamily="34" charset="0"/>
-              </a:rPr>
-              <a:t> Cadastrar </a:t>
-            </a:r>
-            <a:r>
-              <a:rPr lang="pt-BR" sz="2400" dirty="0">
-                <a:solidFill>
-                  <a:srgbClr val="0000CC"/>
-                </a:solidFill>
-                <a:latin typeface="Tahoma" panose="020B0604030504040204" pitchFamily="34" charset="0"/>
-                <a:ea typeface="Tahoma" panose="020B0604030504040204" pitchFamily="34" charset="0"/>
-                <a:cs typeface="Tahoma" panose="020B0604030504040204" pitchFamily="34" charset="0"/>
-              </a:rPr>
-              <a:t>pacientes no sistema</a:t>
-            </a:r>
-          </a:p>
-          <a:p>
-            <a:pPr marL="993775" lvl="3" indent="-174625">
-              <a:buSzPct val="80000"/>
-              <a:buFont typeface="Wingdings" pitchFamily="2" charset="2"/>
-              <a:buChar char="§"/>
-            </a:pPr>
-            <a:r>
-              <a:rPr lang="pt-BR" sz="2400" dirty="0" smtClean="0">
-                <a:solidFill>
-                  <a:srgbClr val="0000CC"/>
-                </a:solidFill>
-                <a:latin typeface="Tahoma" panose="020B0604030504040204" pitchFamily="34" charset="0"/>
-                <a:ea typeface="Tahoma" panose="020B0604030504040204" pitchFamily="34" charset="0"/>
-                <a:cs typeface="Tahoma" panose="020B0604030504040204" pitchFamily="34" charset="0"/>
-              </a:rPr>
-              <a:t> Cadastrar </a:t>
-            </a:r>
-            <a:r>
-              <a:rPr lang="pt-BR" sz="2400" dirty="0">
-                <a:solidFill>
-                  <a:srgbClr val="0000CC"/>
-                </a:solidFill>
-                <a:latin typeface="Tahoma" panose="020B0604030504040204" pitchFamily="34" charset="0"/>
-                <a:ea typeface="Tahoma" panose="020B0604030504040204" pitchFamily="34" charset="0"/>
-                <a:cs typeface="Tahoma" panose="020B0604030504040204" pitchFamily="34" charset="0"/>
-              </a:rPr>
-              <a:t>Gestores</a:t>
-            </a:r>
-          </a:p>
-          <a:p>
-            <a:pPr marL="993775" lvl="3" indent="-174625">
-              <a:buSzPct val="80000"/>
-              <a:buFont typeface="Wingdings" pitchFamily="2" charset="2"/>
-              <a:buChar char="§"/>
-            </a:pPr>
-            <a:r>
-              <a:rPr lang="pt-BR" sz="2400" dirty="0" smtClean="0">
-                <a:solidFill>
-                  <a:srgbClr val="0000CC"/>
-                </a:solidFill>
-                <a:latin typeface="Tahoma" panose="020B0604030504040204" pitchFamily="34" charset="0"/>
-                <a:ea typeface="Tahoma" panose="020B0604030504040204" pitchFamily="34" charset="0"/>
-                <a:cs typeface="Tahoma" panose="020B0604030504040204" pitchFamily="34" charset="0"/>
-              </a:rPr>
-              <a:t> Tirar </a:t>
-            </a:r>
-            <a:r>
-              <a:rPr lang="pt-BR" sz="2400" dirty="0">
-                <a:solidFill>
-                  <a:srgbClr val="0000CC"/>
-                </a:solidFill>
-                <a:latin typeface="Tahoma" panose="020B0604030504040204" pitchFamily="34" charset="0"/>
-                <a:ea typeface="Tahoma" panose="020B0604030504040204" pitchFamily="34" charset="0"/>
-                <a:cs typeface="Tahoma" panose="020B0604030504040204" pitchFamily="34" charset="0"/>
-              </a:rPr>
-              <a:t>duvidas</a:t>
-            </a:r>
-          </a:p>
-          <a:p>
-            <a:pPr marL="993775" lvl="3" indent="-174625">
-              <a:buSzPct val="80000"/>
-              <a:buFont typeface="Wingdings" pitchFamily="2" charset="2"/>
-              <a:buChar char="§"/>
-            </a:pPr>
-            <a:r>
-              <a:rPr lang="pt-BR" sz="2400" dirty="0" smtClean="0">
-                <a:solidFill>
-                  <a:srgbClr val="0000CC"/>
-                </a:solidFill>
-                <a:latin typeface="Tahoma" panose="020B0604030504040204" pitchFamily="34" charset="0"/>
-                <a:ea typeface="Tahoma" panose="020B0604030504040204" pitchFamily="34" charset="0"/>
-                <a:cs typeface="Tahoma" panose="020B0604030504040204" pitchFamily="34" charset="0"/>
-              </a:rPr>
-              <a:t> Responder </a:t>
-            </a:r>
-            <a:r>
-              <a:rPr lang="pt-BR" sz="2400" dirty="0">
-                <a:solidFill>
-                  <a:srgbClr val="0000CC"/>
-                </a:solidFill>
-                <a:latin typeface="Tahoma" panose="020B0604030504040204" pitchFamily="34" charset="0"/>
-                <a:ea typeface="Tahoma" panose="020B0604030504040204" pitchFamily="34" charset="0"/>
-                <a:cs typeface="Tahoma" panose="020B0604030504040204" pitchFamily="34" charset="0"/>
-              </a:rPr>
-              <a:t>Duvidas</a:t>
-            </a:r>
-          </a:p>
-          <a:p>
-            <a:pPr marL="993775" lvl="3" indent="-174625">
-              <a:buSzPct val="80000"/>
-              <a:buFont typeface="Wingdings" pitchFamily="2" charset="2"/>
-              <a:buChar char="§"/>
-            </a:pPr>
-            <a:r>
-              <a:rPr lang="pt-BR" sz="2400" dirty="0" smtClean="0">
-                <a:solidFill>
-                  <a:srgbClr val="0000CC"/>
-                </a:solidFill>
-                <a:latin typeface="Tahoma" panose="020B0604030504040204" pitchFamily="34" charset="0"/>
-                <a:ea typeface="Tahoma" panose="020B0604030504040204" pitchFamily="34" charset="0"/>
-                <a:cs typeface="Tahoma" panose="020B0604030504040204" pitchFamily="34" charset="0"/>
-              </a:rPr>
-              <a:t> </a:t>
-            </a:r>
-            <a:r>
-              <a:rPr lang="pt-BR" sz="2400" dirty="0" err="1" smtClean="0">
-                <a:solidFill>
-                  <a:srgbClr val="0000CC"/>
-                </a:solidFill>
-                <a:latin typeface="Tahoma" panose="020B0604030504040204" pitchFamily="34" charset="0"/>
-                <a:ea typeface="Tahoma" panose="020B0604030504040204" pitchFamily="34" charset="0"/>
-                <a:cs typeface="Tahoma" panose="020B0604030504040204" pitchFamily="34" charset="0"/>
-              </a:rPr>
-              <a:t>Login</a:t>
-            </a:r>
-            <a:endParaRPr lang="pt-BR" sz="2400" dirty="0">
-              <a:solidFill>
-                <a:srgbClr val="0000CC"/>
-              </a:solidFill>
-              <a:latin typeface="Tahoma" panose="020B0604030504040204" pitchFamily="34" charset="0"/>
-              <a:ea typeface="Tahoma" panose="020B0604030504040204" pitchFamily="34" charset="0"/>
-              <a:cs typeface="Tahoma" panose="020B0604030504040204" pitchFamily="34" charset="0"/>
-            </a:endParaRPr>
-          </a:p>
-          <a:p>
-            <a:pPr marL="993775" lvl="3" indent="-174625">
-              <a:buSzPct val="80000"/>
-              <a:buFont typeface="Wingdings" pitchFamily="2" charset="2"/>
-              <a:buChar char="§"/>
-            </a:pPr>
-            <a:r>
-              <a:rPr lang="pt-BR" sz="2400" dirty="0" smtClean="0">
-                <a:solidFill>
-                  <a:srgbClr val="0000CC"/>
-                </a:solidFill>
-                <a:latin typeface="Tahoma" panose="020B0604030504040204" pitchFamily="34" charset="0"/>
-                <a:ea typeface="Tahoma" panose="020B0604030504040204" pitchFamily="34" charset="0"/>
-                <a:cs typeface="Tahoma" panose="020B0604030504040204" pitchFamily="34" charset="0"/>
-              </a:rPr>
-              <a:t> </a:t>
-            </a:r>
-            <a:r>
-              <a:rPr lang="pt-BR" sz="2400" dirty="0" err="1" smtClean="0">
-                <a:solidFill>
-                  <a:srgbClr val="0000CC"/>
-                </a:solidFill>
-                <a:latin typeface="Tahoma" panose="020B0604030504040204" pitchFamily="34" charset="0"/>
-                <a:ea typeface="Tahoma" panose="020B0604030504040204" pitchFamily="34" charset="0"/>
-                <a:cs typeface="Tahoma" panose="020B0604030504040204" pitchFamily="34" charset="0"/>
-              </a:rPr>
-              <a:t>Logout</a:t>
-            </a:r>
-            <a:endParaRPr lang="pt-BR" sz="2400" dirty="0">
-              <a:solidFill>
-                <a:srgbClr val="0000CC"/>
-              </a:solidFill>
-              <a:latin typeface="Tahoma" panose="020B0604030504040204" pitchFamily="34" charset="0"/>
-              <a:ea typeface="Tahoma" panose="020B0604030504040204" pitchFamily="34" charset="0"/>
-              <a:cs typeface="Tahoma" panose="020B0604030504040204" pitchFamily="34" charset="0"/>
-            </a:endParaRPr>
-          </a:p>
-          <a:p>
-            <a:pPr marL="993775" lvl="3" indent="-174625">
-              <a:buSzPct val="80000"/>
-              <a:buFont typeface="Wingdings" pitchFamily="2" charset="2"/>
-              <a:buChar char="§"/>
-            </a:pPr>
-            <a:r>
-              <a:rPr lang="pt-BR" sz="2400" dirty="0" smtClean="0">
-                <a:solidFill>
-                  <a:srgbClr val="0000CC"/>
-                </a:solidFill>
-                <a:latin typeface="Tahoma" panose="020B0604030504040204" pitchFamily="34" charset="0"/>
-                <a:ea typeface="Tahoma" panose="020B0604030504040204" pitchFamily="34" charset="0"/>
-                <a:cs typeface="Tahoma" panose="020B0604030504040204" pitchFamily="34" charset="0"/>
-              </a:rPr>
-              <a:t> Cadastrar </a:t>
-            </a:r>
-            <a:r>
-              <a:rPr lang="pt-BR" sz="2400" dirty="0">
-                <a:solidFill>
-                  <a:srgbClr val="0000CC"/>
-                </a:solidFill>
-                <a:latin typeface="Tahoma" panose="020B0604030504040204" pitchFamily="34" charset="0"/>
-                <a:ea typeface="Tahoma" panose="020B0604030504040204" pitchFamily="34" charset="0"/>
-                <a:cs typeface="Tahoma" panose="020B0604030504040204" pitchFamily="34" charset="0"/>
-              </a:rPr>
-              <a:t>exames</a:t>
-            </a:r>
-          </a:p>
-          <a:p>
-            <a:pPr marL="993775" lvl="3" indent="-174625">
-              <a:buSzPct val="80000"/>
-              <a:buFont typeface="Wingdings" pitchFamily="2" charset="2"/>
-              <a:buChar char="§"/>
-            </a:pPr>
-            <a:r>
-              <a:rPr lang="pt-BR" sz="2400" dirty="0" smtClean="0">
-                <a:solidFill>
-                  <a:srgbClr val="0000CC"/>
-                </a:solidFill>
-                <a:latin typeface="Tahoma" panose="020B0604030504040204" pitchFamily="34" charset="0"/>
-                <a:ea typeface="Tahoma" panose="020B0604030504040204" pitchFamily="34" charset="0"/>
-                <a:cs typeface="Tahoma" panose="020B0604030504040204" pitchFamily="34" charset="0"/>
-              </a:rPr>
-              <a:t> Cadastrar </a:t>
-            </a:r>
-            <a:r>
-              <a:rPr lang="pt-BR" sz="2400" dirty="0">
-                <a:solidFill>
-                  <a:srgbClr val="0000CC"/>
-                </a:solidFill>
-                <a:latin typeface="Tahoma" panose="020B0604030504040204" pitchFamily="34" charset="0"/>
-                <a:ea typeface="Tahoma" panose="020B0604030504040204" pitchFamily="34" charset="0"/>
-                <a:cs typeface="Tahoma" panose="020B0604030504040204" pitchFamily="34" charset="0"/>
-              </a:rPr>
-              <a:t>resultado de exames realizados</a:t>
-            </a:r>
-          </a:p>
-          <a:p>
-            <a:pPr marL="993775" lvl="3" indent="-174625">
-              <a:buSzPct val="80000"/>
-              <a:buFont typeface="Wingdings" pitchFamily="2" charset="2"/>
-              <a:buChar char="§"/>
-            </a:pPr>
-            <a:endParaRPr lang="pt-BR" sz="2400" dirty="0" smtClean="0">
-              <a:solidFill>
-                <a:srgbClr val="0000CC"/>
-              </a:solidFill>
-              <a:latin typeface="Tahoma" panose="020B0604030504040204" pitchFamily="34" charset="0"/>
-              <a:ea typeface="Tahoma" panose="020B0604030504040204" pitchFamily="34" charset="0"/>
-              <a:cs typeface="Tahoma" panose="020B0604030504040204" pitchFamily="34" charset="0"/>
-            </a:endParaRPr>
-          </a:p>
-        </p:txBody>
-      </p:sp>
-      <p:sp>
-        <p:nvSpPr>
           <p:cNvPr id="7171" name="Rectangle 3"/>
           <p:cNvSpPr>
             <a:spLocks noGrp="1" noChangeArrowheads="1"/>
@@ -7378,13 +8001,13 @@
           <a:lstStyle/>
           <a:p>
             <a:r>
-              <a:rPr lang="pt-BR" sz="3600" smtClean="0">
+              <a:rPr lang="pt-BR" sz="3600" dirty="0">
                 <a:solidFill>
                   <a:srgbClr val="0000CC"/>
                 </a:solidFill>
                 <a:latin typeface="Tahoma" pitchFamily="34" charset="0"/>
               </a:rPr>
-              <a:t>Detalhamento do Sistema</a:t>
+              <a:t>Escopo do produto</a:t>
             </a:r>
             <a:endParaRPr lang="pt-BR" sz="3600" dirty="0">
               <a:solidFill>
@@ -7395,10 +8018,217 @@
           </a:p>
         </p:txBody>
       </p:sp>
+      <p:sp>
+        <p:nvSpPr>
+          <p:cNvPr id="3" name="Retângulo 2"/>
+          <p:cNvSpPr/>
+          <p:nvPr/>
+        </p:nvSpPr>
+        <p:spPr>
+          <a:xfrm>
+            <a:off x="107504" y="836613"/>
+            <a:ext cx="9144000" cy="3046988"/>
+          </a:xfrm>
+          <a:prstGeom prst="rect">
+            <a:avLst/>
+          </a:prstGeom>
+        </p:spPr>
+        <p:txBody>
+          <a:bodyPr wrap="square">
+            <a:spAutoFit/>
+          </a:bodyPr>
+          <a:lstStyle/>
+          <a:p>
+            <a:pPr marL="79375" lvl="1" indent="-174625">
+              <a:buSzPct val="80000"/>
+            </a:pPr>
+            <a:r>
+              <a:rPr lang="pt-BR" sz="2400" b="1" dirty="0">
+                <a:latin typeface="Tahoma" panose="020B0604030504040204" pitchFamily="34" charset="0"/>
+                <a:ea typeface="Tahoma" panose="020B0604030504040204" pitchFamily="34" charset="0"/>
+                <a:cs typeface="Tahoma" panose="020B0604030504040204" pitchFamily="34" charset="0"/>
+              </a:rPr>
+              <a:t>Requisitos Funcionais</a:t>
+            </a:r>
+          </a:p>
+          <a:p>
+            <a:pPr marL="536575" lvl="2" indent="-174625">
+              <a:buSzPct val="80000"/>
+            </a:pPr>
+            <a:endParaRPr lang="pt-BR" sz="2400" dirty="0">
+              <a:solidFill>
+                <a:srgbClr val="0000CC"/>
+              </a:solidFill>
+              <a:latin typeface="Tahoma" panose="020B0604030504040204" pitchFamily="34" charset="0"/>
+              <a:ea typeface="Tahoma" panose="020B0604030504040204" pitchFamily="34" charset="0"/>
+              <a:cs typeface="Tahoma" panose="020B0604030504040204" pitchFamily="34" charset="0"/>
+            </a:endParaRPr>
+          </a:p>
+          <a:p>
+            <a:pPr marL="536575" lvl="2" indent="-174625">
+              <a:buSzPct val="80000"/>
+              <a:buFont typeface="Wingdings" pitchFamily="2" charset="2"/>
+              <a:buChar char="§"/>
+            </a:pPr>
+            <a:r>
+              <a:rPr lang="pt-BR" sz="2400" dirty="0" smtClean="0">
+                <a:latin typeface="Tahoma" panose="020B0604030504040204" pitchFamily="34" charset="0"/>
+                <a:ea typeface="Tahoma" panose="020B0604030504040204" pitchFamily="34" charset="0"/>
+                <a:cs typeface="Tahoma" panose="020B0604030504040204" pitchFamily="34" charset="0"/>
+              </a:rPr>
+              <a:t>Funcionalidades que serão implementadas</a:t>
+            </a:r>
+          </a:p>
+          <a:p>
+            <a:pPr marL="993775" lvl="3" indent="-174625">
+              <a:buSzPct val="80000"/>
+              <a:buFont typeface="Wingdings" pitchFamily="2" charset="2"/>
+              <a:buChar char="§"/>
+            </a:pPr>
+            <a:r>
+              <a:rPr lang="pt-BR" sz="2400" dirty="0" smtClean="0">
+                <a:solidFill>
+                  <a:srgbClr val="0000CC"/>
+                </a:solidFill>
+                <a:latin typeface="Tahoma" panose="020B0604030504040204" pitchFamily="34" charset="0"/>
+                <a:ea typeface="Tahoma" panose="020B0604030504040204" pitchFamily="34" charset="0"/>
+                <a:cs typeface="Tahoma" panose="020B0604030504040204" pitchFamily="34" charset="0"/>
+              </a:rPr>
+              <a:t> Gerar </a:t>
+            </a:r>
+            <a:r>
+              <a:rPr lang="pt-BR" sz="2400" dirty="0">
+                <a:solidFill>
+                  <a:srgbClr val="0000CC"/>
+                </a:solidFill>
+                <a:latin typeface="Tahoma" panose="020B0604030504040204" pitchFamily="34" charset="0"/>
+                <a:ea typeface="Tahoma" panose="020B0604030504040204" pitchFamily="34" charset="0"/>
+                <a:cs typeface="Tahoma" panose="020B0604030504040204" pitchFamily="34" charset="0"/>
+              </a:rPr>
+              <a:t>prontuário digital para o </a:t>
+            </a:r>
+            <a:r>
+              <a:rPr lang="pt-BR" sz="2400" dirty="0" smtClean="0">
+                <a:solidFill>
+                  <a:srgbClr val="0000CC"/>
+                </a:solidFill>
+                <a:latin typeface="Tahoma" panose="020B0604030504040204" pitchFamily="34" charset="0"/>
+                <a:ea typeface="Tahoma" panose="020B0604030504040204" pitchFamily="34" charset="0"/>
+                <a:cs typeface="Tahoma" panose="020B0604030504040204" pitchFamily="34" charset="0"/>
+              </a:rPr>
+              <a:t>paciente</a:t>
+            </a:r>
+          </a:p>
+          <a:p>
+            <a:pPr marL="993775" lvl="3" indent="-174625">
+              <a:buSzPct val="80000"/>
+              <a:buFont typeface="Wingdings" pitchFamily="2" charset="2"/>
+              <a:buChar char="§"/>
+            </a:pPr>
+            <a:r>
+              <a:rPr lang="pt-BR" sz="2400" dirty="0">
+                <a:solidFill>
+                  <a:srgbClr val="0000CC"/>
+                </a:solidFill>
+                <a:latin typeface="Tahoma" panose="020B0604030504040204" pitchFamily="34" charset="0"/>
+                <a:ea typeface="Tahoma" panose="020B0604030504040204" pitchFamily="34" charset="0"/>
+                <a:cs typeface="Tahoma" panose="020B0604030504040204" pitchFamily="34" charset="0"/>
+              </a:rPr>
+              <a:t> </a:t>
+            </a:r>
+            <a:r>
+              <a:rPr lang="pt-BR" sz="2400" dirty="0" smtClean="0">
+                <a:solidFill>
+                  <a:srgbClr val="0000CC"/>
+                </a:solidFill>
+                <a:latin typeface="Tahoma" panose="020B0604030504040204" pitchFamily="34" charset="0"/>
+                <a:ea typeface="Tahoma" panose="020B0604030504040204" pitchFamily="34" charset="0"/>
+                <a:cs typeface="Tahoma" panose="020B0604030504040204" pitchFamily="34" charset="0"/>
+              </a:rPr>
+              <a:t>Gerar </a:t>
+            </a:r>
+            <a:r>
+              <a:rPr lang="pt-BR" sz="2400" dirty="0">
+                <a:solidFill>
+                  <a:srgbClr val="0000CC"/>
+                </a:solidFill>
+                <a:latin typeface="Tahoma" panose="020B0604030504040204" pitchFamily="34" charset="0"/>
+                <a:ea typeface="Tahoma" panose="020B0604030504040204" pitchFamily="34" charset="0"/>
+                <a:cs typeface="Tahoma" panose="020B0604030504040204" pitchFamily="34" charset="0"/>
+              </a:rPr>
+              <a:t>relatórios diários, semanais ou mensais do fluxo de </a:t>
+            </a:r>
+            <a:r>
+              <a:rPr lang="pt-BR" sz="2400" dirty="0" smtClean="0">
+                <a:solidFill>
+                  <a:srgbClr val="0000CC"/>
+                </a:solidFill>
+                <a:latin typeface="Tahoma" panose="020B0604030504040204" pitchFamily="34" charset="0"/>
+                <a:ea typeface="Tahoma" panose="020B0604030504040204" pitchFamily="34" charset="0"/>
+                <a:cs typeface="Tahoma" panose="020B0604030504040204" pitchFamily="34" charset="0"/>
+              </a:rPr>
+              <a:t>exames</a:t>
+            </a:r>
+          </a:p>
+          <a:p>
+            <a:pPr marL="993775" lvl="3" indent="-174625">
+              <a:buSzPct val="80000"/>
+              <a:buFont typeface="Wingdings" pitchFamily="2" charset="2"/>
+              <a:buChar char="§"/>
+            </a:pPr>
+            <a:r>
+              <a:rPr lang="pt-BR" sz="2400" dirty="0">
+                <a:solidFill>
+                  <a:srgbClr val="0000CC"/>
+                </a:solidFill>
+                <a:latin typeface="Tahoma" panose="020B0604030504040204" pitchFamily="34" charset="0"/>
+                <a:ea typeface="Tahoma" panose="020B0604030504040204" pitchFamily="34" charset="0"/>
+                <a:cs typeface="Tahoma" panose="020B0604030504040204" pitchFamily="34" charset="0"/>
+              </a:rPr>
+              <a:t> </a:t>
+            </a:r>
+            <a:r>
+              <a:rPr lang="pt-BR" sz="2400" dirty="0" smtClean="0">
+                <a:solidFill>
+                  <a:srgbClr val="0000CC"/>
+                </a:solidFill>
+                <a:latin typeface="Tahoma" panose="020B0604030504040204" pitchFamily="34" charset="0"/>
+                <a:ea typeface="Tahoma" panose="020B0604030504040204" pitchFamily="34" charset="0"/>
+                <a:cs typeface="Tahoma" panose="020B0604030504040204" pitchFamily="34" charset="0"/>
+              </a:rPr>
+              <a:t>Documentar </a:t>
+            </a:r>
+            <a:r>
+              <a:rPr lang="pt-BR" sz="2400" dirty="0">
+                <a:solidFill>
+                  <a:srgbClr val="0000CC"/>
+                </a:solidFill>
+                <a:latin typeface="Tahoma" panose="020B0604030504040204" pitchFamily="34" charset="0"/>
+                <a:ea typeface="Tahoma" panose="020B0604030504040204" pitchFamily="34" charset="0"/>
+                <a:cs typeface="Tahoma" panose="020B0604030504040204" pitchFamily="34" charset="0"/>
+              </a:rPr>
+              <a:t>histórico dos pacientes na clínica</a:t>
+            </a:r>
+          </a:p>
+          <a:p>
+            <a:pPr marL="361950" lvl="2">
+              <a:buSzPct val="80000"/>
+            </a:pPr>
+            <a:endParaRPr lang="pt-BR" sz="2400" dirty="0" smtClean="0">
+              <a:solidFill>
+                <a:srgbClr val="0000CC"/>
+              </a:solidFill>
+              <a:latin typeface="Tahoma" panose="020B0604030504040204" pitchFamily="34" charset="0"/>
+              <a:ea typeface="Tahoma" panose="020B0604030504040204" pitchFamily="34" charset="0"/>
+              <a:cs typeface="Tahoma" panose="020B0604030504040204" pitchFamily="34" charset="0"/>
+            </a:endParaRPr>
+          </a:p>
+        </p:txBody>
+      </p:sp>
     </p:spTree>
     <p:extLst>
       <p:ext uri="{BB962C8B-B14F-4D97-AF65-F5344CB8AC3E}">
-        <p14:creationId xmlns:p14="http://schemas.microsoft.com/office/powerpoint/2010/main" val="1862423078"/>
+        <p14:creationId xmlns:p14="http://schemas.microsoft.com/office/powerpoint/2010/main" val="2745216667"/>
       </p:ext>
     </p:extLst>
   </p:cSld>
@@ -7465,13 +8295,13 @@
           <a:lstStyle/>
           <a:p>
             <a:r>
-              <a:rPr lang="pt-BR" sz="3600" dirty="0" smtClean="0">
+              <a:rPr lang="pt-BR" sz="3600" dirty="0">
                 <a:solidFill>
                   <a:srgbClr val="0000CC"/>
                 </a:solidFill>
                 <a:latin typeface="Tahoma" pitchFamily="34" charset="0"/>
               </a:rPr>
-              <a:t>Detalhamento do Sistema</a:t>
+              <a:t>Escopo do produto</a:t>
             </a:r>
             <a:endParaRPr lang="pt-BR" sz="3600" dirty="0">
               <a:solidFill>
@@ -7491,7 +8321,7 @@
         <p:spPr>
           <a:xfrm>
             <a:off x="107504" y="836613"/>
-            <a:ext cx="9144000" cy="4154984"/>
+            <a:ext cx="9144000" cy="5632311"/>
           </a:xfrm>
           <a:prstGeom prst="rect">
             <a:avLst/>
@@ -7503,169 +8333,34 @@
           </a:bodyPr>
           <a:lstStyle/>
           <a:p>
-            <a:pPr marL="536575" lvl="2" indent="-174625">
+            <a:pPr marL="79375" lvl="1" indent="-174625">
               <a:buSzPct val="80000"/>
             </a:pPr>
-            <a:endParaRPr lang="pt-BR" sz="2400" dirty="0">
-              <a:solidFill>
-                <a:srgbClr val="0000CC"/>
-              </a:solidFill>
+            <a:r>
+              <a:rPr lang="pt-BR" sz="2400" b="1" dirty="0">
+                <a:latin typeface="Tahoma" panose="020B0604030504040204" pitchFamily="34" charset="0"/>
+                <a:ea typeface="Tahoma" panose="020B0604030504040204" pitchFamily="34" charset="0"/>
+                <a:cs typeface="Tahoma" panose="020B0604030504040204" pitchFamily="34" charset="0"/>
+              </a:rPr>
+              <a:t>Requisitos </a:t>
+            </a:r>
+            <a:r>
+              <a:rPr lang="pt-BR" sz="2400" b="1" dirty="0" smtClean="0">
+                <a:latin typeface="Tahoma" panose="020B0604030504040204" pitchFamily="34" charset="0"/>
+                <a:ea typeface="Tahoma" panose="020B0604030504040204" pitchFamily="34" charset="0"/>
+                <a:cs typeface="Tahoma" panose="020B0604030504040204" pitchFamily="34" charset="0"/>
+              </a:rPr>
+              <a:t>Não Funcionais</a:t>
+            </a:r>
+            <a:endParaRPr lang="pt-BR" sz="2400" b="1" dirty="0">
               <a:latin typeface="Tahoma" panose="020B0604030504040204" pitchFamily="34" charset="0"/>
               <a:ea typeface="Tahoma" panose="020B0604030504040204" pitchFamily="34" charset="0"/>
               <a:cs typeface="Tahoma" panose="020B0604030504040204" pitchFamily="34" charset="0"/>
             </a:endParaRPr>
           </a:p>
           <a:p>
-            <a:pPr marL="536575" lvl="2" indent="-174625">
+            <a:pPr marL="361950" lvl="2">
               <a:buSzPct val="80000"/>
-              <a:buFont typeface="Wingdings" pitchFamily="2" charset="2"/>
-              <a:buChar char="§"/>
-            </a:pPr>
-            <a:r>
-              <a:rPr lang="pt-BR" sz="2400" dirty="0" smtClean="0">
-                <a:latin typeface="Tahoma" panose="020B0604030504040204" pitchFamily="34" charset="0"/>
-                <a:ea typeface="Tahoma" panose="020B0604030504040204" pitchFamily="34" charset="0"/>
-                <a:cs typeface="Tahoma" panose="020B0604030504040204" pitchFamily="34" charset="0"/>
-              </a:rPr>
-              <a:t>Funcionalidades que serão implementadas</a:t>
-            </a:r>
-          </a:p>
-          <a:p>
-            <a:pPr marL="993775" lvl="3" indent="-174625">
-              <a:buSzPct val="80000"/>
-              <a:buFont typeface="Wingdings" pitchFamily="2" charset="2"/>
-              <a:buChar char="§"/>
-            </a:pPr>
-            <a:r>
-              <a:rPr lang="pt-BR" sz="2400" dirty="0" smtClean="0">
-                <a:solidFill>
-                  <a:srgbClr val="0000CC"/>
-                </a:solidFill>
-                <a:latin typeface="Tahoma" panose="020B0604030504040204" pitchFamily="34" charset="0"/>
-                <a:ea typeface="Tahoma" panose="020B0604030504040204" pitchFamily="34" charset="0"/>
-                <a:cs typeface="Tahoma" panose="020B0604030504040204" pitchFamily="34" charset="0"/>
-              </a:rPr>
-              <a:t> Gerar </a:t>
-            </a:r>
-            <a:r>
-              <a:rPr lang="pt-BR" sz="2400" dirty="0">
-                <a:solidFill>
-                  <a:srgbClr val="0000CC"/>
-                </a:solidFill>
-                <a:latin typeface="Tahoma" panose="020B0604030504040204" pitchFamily="34" charset="0"/>
-                <a:ea typeface="Tahoma" panose="020B0604030504040204" pitchFamily="34" charset="0"/>
-                <a:cs typeface="Tahoma" panose="020B0604030504040204" pitchFamily="34" charset="0"/>
-              </a:rPr>
-              <a:t>prontuário digital para o </a:t>
-            </a:r>
-            <a:r>
-              <a:rPr lang="pt-BR" sz="2400" dirty="0" smtClean="0">
-                <a:solidFill>
-                  <a:srgbClr val="0000CC"/>
-                </a:solidFill>
-                <a:latin typeface="Tahoma" panose="020B0604030504040204" pitchFamily="34" charset="0"/>
-                <a:ea typeface="Tahoma" panose="020B0604030504040204" pitchFamily="34" charset="0"/>
-                <a:cs typeface="Tahoma" panose="020B0604030504040204" pitchFamily="34" charset="0"/>
-              </a:rPr>
-              <a:t>paciente</a:t>
-            </a:r>
-          </a:p>
-          <a:p>
-            <a:pPr marL="993775" lvl="3" indent="-174625">
-              <a:buSzPct val="80000"/>
-              <a:buFont typeface="Wingdings" pitchFamily="2" charset="2"/>
-              <a:buChar char="§"/>
-            </a:pPr>
-            <a:r>
-              <a:rPr lang="pt-BR" sz="2400" dirty="0">
-                <a:solidFill>
-                  <a:srgbClr val="0000CC"/>
-                </a:solidFill>
-                <a:latin typeface="Tahoma" panose="020B0604030504040204" pitchFamily="34" charset="0"/>
-                <a:ea typeface="Tahoma" panose="020B0604030504040204" pitchFamily="34" charset="0"/>
-                <a:cs typeface="Tahoma" panose="020B0604030504040204" pitchFamily="34" charset="0"/>
-              </a:rPr>
-              <a:t> </a:t>
-            </a:r>
-            <a:r>
-              <a:rPr lang="pt-BR" sz="2400" dirty="0" smtClean="0">
-                <a:solidFill>
-                  <a:srgbClr val="0000CC"/>
-                </a:solidFill>
-                <a:latin typeface="Tahoma" panose="020B0604030504040204" pitchFamily="34" charset="0"/>
-                <a:ea typeface="Tahoma" panose="020B0604030504040204" pitchFamily="34" charset="0"/>
-                <a:cs typeface="Tahoma" panose="020B0604030504040204" pitchFamily="34" charset="0"/>
-              </a:rPr>
-              <a:t>Gerar </a:t>
-            </a:r>
-            <a:r>
-              <a:rPr lang="pt-BR" sz="2400" dirty="0">
-                <a:solidFill>
-                  <a:srgbClr val="0000CC"/>
-                </a:solidFill>
-                <a:latin typeface="Tahoma" panose="020B0604030504040204" pitchFamily="34" charset="0"/>
-                <a:ea typeface="Tahoma" panose="020B0604030504040204" pitchFamily="34" charset="0"/>
-                <a:cs typeface="Tahoma" panose="020B0604030504040204" pitchFamily="34" charset="0"/>
-              </a:rPr>
-              <a:t>relatórios diários, semanais ou mensais do fluxo de </a:t>
-            </a:r>
-            <a:r>
-              <a:rPr lang="pt-BR" sz="2400" dirty="0" smtClean="0">
-                <a:solidFill>
-                  <a:srgbClr val="0000CC"/>
-                </a:solidFill>
-                <a:latin typeface="Tahoma" panose="020B0604030504040204" pitchFamily="34" charset="0"/>
-                <a:ea typeface="Tahoma" panose="020B0604030504040204" pitchFamily="34" charset="0"/>
-                <a:cs typeface="Tahoma" panose="020B0604030504040204" pitchFamily="34" charset="0"/>
-              </a:rPr>
-              <a:t>exames</a:t>
-            </a:r>
-          </a:p>
-          <a:p>
-            <a:pPr marL="993775" lvl="3" indent="-174625">
-              <a:buSzPct val="80000"/>
-              <a:buFont typeface="Wingdings" pitchFamily="2" charset="2"/>
-              <a:buChar char="§"/>
-            </a:pPr>
-            <a:r>
-              <a:rPr lang="pt-BR" sz="2400" dirty="0">
-                <a:solidFill>
-                  <a:srgbClr val="0000CC"/>
-                </a:solidFill>
-                <a:latin typeface="Tahoma" panose="020B0604030504040204" pitchFamily="34" charset="0"/>
-                <a:ea typeface="Tahoma" panose="020B0604030504040204" pitchFamily="34" charset="0"/>
-                <a:cs typeface="Tahoma" panose="020B0604030504040204" pitchFamily="34" charset="0"/>
-              </a:rPr>
-              <a:t> </a:t>
-            </a:r>
-            <a:r>
-              <a:rPr lang="pt-BR" sz="2400" dirty="0" smtClean="0">
-                <a:solidFill>
-                  <a:srgbClr val="0000CC"/>
-                </a:solidFill>
-                <a:latin typeface="Tahoma" panose="020B0604030504040204" pitchFamily="34" charset="0"/>
-                <a:ea typeface="Tahoma" panose="020B0604030504040204" pitchFamily="34" charset="0"/>
-                <a:cs typeface="Tahoma" panose="020B0604030504040204" pitchFamily="34" charset="0"/>
-              </a:rPr>
-              <a:t>Documentar </a:t>
-            </a:r>
-            <a:r>
-              <a:rPr lang="pt-BR" sz="2400" dirty="0">
-                <a:solidFill>
-                  <a:srgbClr val="0000CC"/>
-                </a:solidFill>
-                <a:latin typeface="Tahoma" panose="020B0604030504040204" pitchFamily="34" charset="0"/>
-                <a:ea typeface="Tahoma" panose="020B0604030504040204" pitchFamily="34" charset="0"/>
-                <a:cs typeface="Tahoma" panose="020B0604030504040204" pitchFamily="34" charset="0"/>
-              </a:rPr>
-              <a:t>histórico dos pacientes na clínica</a:t>
-            </a:r>
-          </a:p>
-          <a:p>
-            <a:pPr marL="536575" lvl="2" indent="-174625">
-              <a:buSzPct val="80000"/>
-              <a:buFont typeface="Wingdings" pitchFamily="2" charset="2"/>
-              <a:buChar char="§"/>
             </a:pPr>
             <a:endParaRPr lang="pt-BR" sz="2400" dirty="0" smtClean="0">
               <a:solidFill>
@@ -7677,82 +8372,79 @@
             </a:endParaRPr>
           </a:p>
           <a:p>
-            <a:pPr marL="536575" lvl="2" indent="-174625">
-              <a:buSzPct val="80000"/>
-              <a:buFont typeface="Wingdings" pitchFamily="2" charset="2"/>
-              <a:buChar char="§"/>
+            <a:pPr marL="285750" lvl="0" indent="-285750">
+              <a:buFont typeface="Arial" panose="020B0604020202020204" pitchFamily="34" charset="0"/>
+              <a:buChar char="•"/>
             </a:pPr>
             <a:r>
-              <a:rPr lang="pt-BR" sz="2400" dirty="0" smtClean="0">
-                <a:latin typeface="Tahoma" panose="020B0604030504040204" pitchFamily="34" charset="0"/>
-                <a:ea typeface="Tahoma" panose="020B0604030504040204" pitchFamily="34" charset="0"/>
-                <a:cs typeface="Tahoma" panose="020B0604030504040204" pitchFamily="34" charset="0"/>
-              </a:rPr>
-              <a:t>Evolução futura</a:t>
-            </a:r>
-          </a:p>
-          <a:p>
-            <a:pPr marL="993775" lvl="3" indent="-174625">
-              <a:buSzPct val="80000"/>
-              <a:buFont typeface="Wingdings" pitchFamily="2" charset="2"/>
-              <a:buChar char="§"/>
+              <a:rPr lang="pt-BR" sz="2400" dirty="0"/>
+              <a:t>Requisitos do Sistema:</a:t>
+            </a:r>
+          </a:p>
+          <a:p>
+            <a:pPr marL="742950" lvl="1" indent="-285750">
+              <a:buFont typeface="Courier New" panose="02070309020205020404" pitchFamily="49" charset="0"/>
+              <a:buChar char="o"/>
             </a:pPr>
             <a:r>
-              <a:rPr lang="pt-BR" sz="2400" dirty="0" smtClean="0">
-                <a:solidFill>
-                  <a:srgbClr val="0000CC"/>
-                </a:solidFill>
-                <a:latin typeface="Tahoma" panose="020B0604030504040204" pitchFamily="34" charset="0"/>
-                <a:ea typeface="Tahoma" panose="020B0604030504040204" pitchFamily="34" charset="0"/>
-                <a:cs typeface="Tahoma" panose="020B0604030504040204" pitchFamily="34" charset="0"/>
-              </a:rPr>
-              <a:t> No </a:t>
-            </a:r>
-            <a:r>
-              <a:rPr lang="pt-BR" sz="2400" dirty="0">
-                <a:solidFill>
-                  <a:srgbClr val="0000CC"/>
-                </a:solidFill>
-                <a:latin typeface="Tahoma" panose="020B0604030504040204" pitchFamily="34" charset="0"/>
-                <a:ea typeface="Tahoma" panose="020B0604030504040204" pitchFamily="34" charset="0"/>
-                <a:cs typeface="Tahoma" panose="020B0604030504040204" pitchFamily="34" charset="0"/>
-              </a:rPr>
-              <a:t>futuro poderá ser acrescentado um sistema </a:t>
-            </a:r>
-            <a:r>
-              <a:rPr lang="pt-BR" sz="2400" dirty="0" smtClean="0">
-                <a:solidFill>
-                  <a:srgbClr val="0000CC"/>
-                </a:solidFill>
-                <a:latin typeface="Tahoma" panose="020B0604030504040204" pitchFamily="34" charset="0"/>
-                <a:ea typeface="Tahoma" panose="020B0604030504040204" pitchFamily="34" charset="0"/>
-                <a:cs typeface="Tahoma" panose="020B0604030504040204" pitchFamily="34" charset="0"/>
-              </a:rPr>
-              <a:t>de agendamento </a:t>
-            </a:r>
-            <a:r>
-              <a:rPr lang="pt-BR" sz="2400" dirty="0">
-                <a:solidFill>
-                  <a:srgbClr val="0000CC"/>
-                </a:solidFill>
-                <a:latin typeface="Tahoma" panose="020B0604030504040204" pitchFamily="34" charset="0"/>
-                <a:ea typeface="Tahoma" panose="020B0604030504040204" pitchFamily="34" charset="0"/>
-                <a:cs typeface="Tahoma" panose="020B0604030504040204" pitchFamily="34" charset="0"/>
-              </a:rPr>
-              <a:t>de exames online no website da clínica e o ajuste do website para dispositivos mobile</a:t>
-            </a:r>
-            <a:r>
-              <a:rPr lang="pt-BR" sz="2400" dirty="0" smtClean="0">
-                <a:solidFill>
-                  <a:srgbClr val="0000CC"/>
-                </a:solidFill>
-                <a:latin typeface="Tahoma" panose="020B0604030504040204" pitchFamily="34" charset="0"/>
-                <a:ea typeface="Tahoma" panose="020B0604030504040204" pitchFamily="34" charset="0"/>
-                <a:cs typeface="Tahoma" panose="020B0604030504040204" pitchFamily="34" charset="0"/>
-              </a:rPr>
+              <a:rPr lang="pt-BR" sz="2400" dirty="0"/>
+              <a:t>O Sistema deverá permitir ao paciente o acesso aos resultados dos exames de forma impressa através da atendente do laboratório e no site do laboratório através de um código que será gerado no ato do cadastro do paciente.</a:t>
+            </a:r>
+          </a:p>
+          <a:p>
+            <a:pPr marL="285750" lvl="0" indent="-285750">
+              <a:buFont typeface="Arial" panose="020B0604020202020204" pitchFamily="34" charset="0"/>
+              <a:buChar char="•"/>
+            </a:pPr>
+            <a:r>
+              <a:rPr lang="pt-BR" sz="2400" dirty="0"/>
+              <a:t>Requisitos de Suportabilidade/Ambiente:</a:t>
+            </a:r>
+          </a:p>
+          <a:p>
+            <a:pPr marL="742950" lvl="1" indent="-285750">
+              <a:buFont typeface="Courier New" panose="02070309020205020404" pitchFamily="49" charset="0"/>
+              <a:buChar char="o"/>
+            </a:pPr>
+            <a:r>
+              <a:rPr lang="pt-BR" sz="2400" dirty="0"/>
+              <a:t>O Sistema deverá permitir o acesso através do ambiente Intranet e Internet do laboratório.</a:t>
+            </a:r>
+          </a:p>
+          <a:p>
+            <a:pPr marL="742950" lvl="1" indent="-285750">
+              <a:buFont typeface="Courier New" panose="02070309020205020404" pitchFamily="49" charset="0"/>
+              <a:buChar char="o"/>
+            </a:pPr>
+            <a:r>
+              <a:rPr lang="pt-BR" sz="2400" dirty="0"/>
+              <a:t>Os resultados e status dos exames serão encaminhados também para um banco de dados do site do laboratório.</a:t>
+            </a:r>
+          </a:p>
+          <a:p>
+            <a:pPr marL="285750" lvl="0" indent="-285750">
+              <a:buFont typeface="Arial" panose="020B0604020202020204" pitchFamily="34" charset="0"/>
+              <a:buChar char="•"/>
+            </a:pPr>
+            <a:r>
+              <a:rPr lang="pt-BR" sz="2400" dirty="0"/>
+              <a:t>Requisitos de Usabilidade:</a:t>
+            </a:r>
+          </a:p>
+          <a:p>
+            <a:pPr marL="742950" lvl="1" indent="-285750">
+              <a:buFont typeface="Courier New" panose="02070309020205020404" pitchFamily="49" charset="0"/>
+              <a:buChar char="o"/>
+            </a:pPr>
+            <a:r>
+              <a:rPr lang="pt-BR" sz="2400" dirty="0"/>
+              <a:t>O Site do laboratório deverá ter uma interface bem clara e um bom direcionamento para o acesso do paciente</a:t>
+            </a:r>
+            <a:r>
+              <a:rPr lang="pt-BR" sz="2400" dirty="0" smtClean="0"/>
               <a:t>.</a:t>
             </a:r>
-            <a:endParaRPr lang="pt-BR" sz="2400" dirty="0">
+            <a:endParaRPr lang="pt-BR" sz="3200" dirty="0" smtClean="0">
               <a:solidFill>
                 <a:srgbClr val="0000CC"/>
               </a:solidFill>
@@ -7766,7 +8458,7 @@
     </p:spTree>
     <p:extLst>
       <p:ext uri="{BB962C8B-B14F-4D97-AF65-F5344CB8AC3E}">
-        <p14:creationId xmlns:p14="http://schemas.microsoft.com/office/powerpoint/2010/main" val="2745216667"/>
+        <p14:creationId xmlns:p14="http://schemas.microsoft.com/office/powerpoint/2010/main" val="550163520"/>
       </p:ext>
     </p:extLst>
   </p:cSld>
@@ -7802,209 +8494,7 @@
       </p:grpSpPr>
       <p:sp>
         <p:nvSpPr>
-          <p:cNvPr id="87042" name="Text Box 2"/>
-          <p:cNvSpPr txBox="1">
-            <a:spLocks noChangeArrowheads="1"/>
-          </p:cNvSpPr>
-          <p:nvPr/>
-        </p:nvSpPr>
-        <p:spPr bwMode="auto">
-          <a:xfrm>
-            <a:off x="152400" y="857232"/>
-            <a:ext cx="8812213" cy="3046988"/>
-          </a:xfrm>
-          <a:prstGeom prst="rect">
-            <a:avLst/>
-          </a:prstGeom>
-          <a:noFill/>
-          <a:ln w="9525">
-            <a:noFill/>
-            <a:miter lim="800000"/>
-            <a:headEnd/>
-            <a:tailEnd/>
-          </a:ln>
-        </p:spPr>
-        <p:txBody>
-          <a:bodyPr>
-            <a:spAutoFit/>
-          </a:bodyPr>
-          <a:lstStyle/>
-          <a:p>
-            <a:pPr algn="l">
-              <a:buFont typeface="Webdings" pitchFamily="18" charset="2"/>
-              <a:buNone/>
-            </a:pPr>
-            <a:endParaRPr lang="pt-BR" sz="2400" dirty="0">
-              <a:solidFill>
-                <a:srgbClr val="008000"/>
-              </a:solidFill>
-              <a:latin typeface="Tahoma" panose="020B0604030504040204" pitchFamily="34" charset="0"/>
-              <a:ea typeface="Tahoma" panose="020B0604030504040204" pitchFamily="34" charset="0"/>
-              <a:cs typeface="Tahoma" panose="020B0604030504040204" pitchFamily="34" charset="0"/>
-            </a:endParaRPr>
-          </a:p>
-          <a:p>
-            <a:pPr marL="536575" lvl="2" indent="-174625" algn="l">
-              <a:buSzPct val="80000"/>
-              <a:buFont typeface="Wingdings" pitchFamily="2" charset="2"/>
-              <a:buChar char="§"/>
-            </a:pPr>
-            <a:r>
-              <a:rPr lang="pt-BR" sz="2400" dirty="0">
-                <a:latin typeface="Tahoma" panose="020B0604030504040204" pitchFamily="34" charset="0"/>
-                <a:ea typeface="Tahoma" panose="020B0604030504040204" pitchFamily="34" charset="0"/>
-                <a:cs typeface="Tahoma" panose="020B0604030504040204" pitchFamily="34" charset="0"/>
-              </a:rPr>
-              <a:t>Tecnologias utilizadas</a:t>
-            </a:r>
-          </a:p>
-          <a:p>
-            <a:pPr marL="901700" lvl="2" indent="-279400" algn="l">
-              <a:buSzPct val="80000"/>
-              <a:buFont typeface="Wingdings" pitchFamily="2" charset="2"/>
-              <a:buChar char="§"/>
-            </a:pPr>
-            <a:endParaRPr lang="pt-BR" sz="2400" dirty="0" smtClean="0">
-              <a:solidFill>
-                <a:srgbClr val="0000CC"/>
-              </a:solidFill>
-              <a:latin typeface="Tahoma" panose="020B0604030504040204" pitchFamily="34" charset="0"/>
-              <a:ea typeface="Tahoma" panose="020B0604030504040204" pitchFamily="34" charset="0"/>
-              <a:cs typeface="Tahoma" panose="020B0604030504040204" pitchFamily="34" charset="0"/>
-            </a:endParaRPr>
-          </a:p>
-          <a:p>
-            <a:pPr marL="901700" lvl="2" indent="-279400" algn="l">
-              <a:buSzPct val="80000"/>
-              <a:buFont typeface="Wingdings" pitchFamily="2" charset="2"/>
-              <a:buChar char="§"/>
-            </a:pPr>
-            <a:r>
-              <a:rPr lang="pt-BR" sz="2400" dirty="0" smtClean="0">
-                <a:latin typeface="Tahoma" panose="020B0604030504040204" pitchFamily="34" charset="0"/>
-                <a:ea typeface="Tahoma" panose="020B0604030504040204" pitchFamily="34" charset="0"/>
-                <a:cs typeface="Tahoma" panose="020B0604030504040204" pitchFamily="34" charset="0"/>
-              </a:rPr>
-              <a:t>Plataforma: </a:t>
-            </a:r>
-            <a:r>
-              <a:rPr lang="pt-BR" sz="2400" dirty="0" smtClean="0">
-                <a:solidFill>
-                  <a:srgbClr val="0000CC"/>
-                </a:solidFill>
-                <a:latin typeface="Tahoma" panose="020B0604030504040204" pitchFamily="34" charset="0"/>
-                <a:ea typeface="Tahoma" panose="020B0604030504040204" pitchFamily="34" charset="0"/>
-                <a:cs typeface="Tahoma" panose="020B0604030504040204" pitchFamily="34" charset="0"/>
-              </a:rPr>
-              <a:t>Eclipse</a:t>
-            </a:r>
-          </a:p>
-          <a:p>
-            <a:pPr marL="901700" lvl="2" indent="-279400" algn="l">
-              <a:buSzPct val="80000"/>
-              <a:buFont typeface="Wingdings" pitchFamily="2" charset="2"/>
-              <a:buChar char="§"/>
-            </a:pPr>
-            <a:r>
-              <a:rPr lang="pt-BR" sz="2400" dirty="0" smtClean="0">
-                <a:latin typeface="Tahoma" panose="020B0604030504040204" pitchFamily="34" charset="0"/>
-                <a:ea typeface="Tahoma" panose="020B0604030504040204" pitchFamily="34" charset="0"/>
-                <a:cs typeface="Tahoma" panose="020B0604030504040204" pitchFamily="34" charset="0"/>
-              </a:rPr>
-              <a:t>Linguagens: </a:t>
-            </a:r>
-            <a:r>
-              <a:rPr lang="pt-BR" sz="2400" dirty="0" smtClean="0">
-                <a:solidFill>
-                  <a:srgbClr val="0000CC"/>
-                </a:solidFill>
-                <a:latin typeface="Tahoma" panose="020B0604030504040204" pitchFamily="34" charset="0"/>
-                <a:ea typeface="Tahoma" panose="020B0604030504040204" pitchFamily="34" charset="0"/>
-                <a:cs typeface="Tahoma" panose="020B0604030504040204" pitchFamily="34" charset="0"/>
-              </a:rPr>
-              <a:t>JAVA, HTML e CSS</a:t>
-            </a:r>
-          </a:p>
-          <a:p>
-            <a:pPr marL="901700" lvl="2" indent="-279400" algn="l">
-              <a:buSzPct val="80000"/>
-              <a:buFont typeface="Wingdings" pitchFamily="2" charset="2"/>
-              <a:buChar char="§"/>
-            </a:pPr>
-            <a:r>
-              <a:rPr lang="pt-BR" sz="2400" dirty="0" smtClean="0">
-                <a:latin typeface="Tahoma" panose="020B0604030504040204" pitchFamily="34" charset="0"/>
-                <a:ea typeface="Tahoma" panose="020B0604030504040204" pitchFamily="34" charset="0"/>
-                <a:cs typeface="Tahoma" panose="020B0604030504040204" pitchFamily="34" charset="0"/>
-              </a:rPr>
-              <a:t>Sistema operacional: </a:t>
-            </a:r>
-            <a:r>
-              <a:rPr lang="pt-BR" sz="2400" dirty="0" smtClean="0">
-                <a:solidFill>
-                  <a:srgbClr val="0000CC"/>
-                </a:solidFill>
-                <a:latin typeface="Tahoma" panose="020B0604030504040204" pitchFamily="34" charset="0"/>
-                <a:ea typeface="Tahoma" panose="020B0604030504040204" pitchFamily="34" charset="0"/>
-                <a:cs typeface="Tahoma" panose="020B0604030504040204" pitchFamily="34" charset="0"/>
-              </a:rPr>
-              <a:t>Windows</a:t>
-            </a:r>
-          </a:p>
-          <a:p>
-            <a:pPr marL="901700" lvl="2" indent="-279400" algn="l">
-              <a:buSzPct val="80000"/>
-              <a:buFont typeface="Wingdings" pitchFamily="2" charset="2"/>
-              <a:buChar char="§"/>
-            </a:pPr>
-            <a:r>
-              <a:rPr lang="pt-BR" sz="2400" dirty="0" smtClean="0">
-                <a:latin typeface="Tahoma" panose="020B0604030504040204" pitchFamily="34" charset="0"/>
-                <a:ea typeface="Tahoma" panose="020B0604030504040204" pitchFamily="34" charset="0"/>
-                <a:cs typeface="Tahoma" panose="020B0604030504040204" pitchFamily="34" charset="0"/>
-              </a:rPr>
-              <a:t>Banco de Dados: </a:t>
-            </a:r>
-            <a:r>
-              <a:rPr lang="pt-BR" sz="2400" dirty="0" smtClean="0">
-                <a:solidFill>
-                  <a:srgbClr val="0000CC"/>
-                </a:solidFill>
-                <a:latin typeface="Tahoma" panose="020B0604030504040204" pitchFamily="34" charset="0"/>
-                <a:ea typeface="Tahoma" panose="020B0604030504040204" pitchFamily="34" charset="0"/>
-                <a:cs typeface="Tahoma" panose="020B0604030504040204" pitchFamily="34" charset="0"/>
-              </a:rPr>
-              <a:t>MySQL</a:t>
-            </a:r>
-            <a:endParaRPr lang="pt-BR" sz="2400" dirty="0">
-              <a:solidFill>
-                <a:srgbClr val="0000CC"/>
-              </a:solidFill>
-              <a:latin typeface="Tahoma" panose="020B0604030504040204" pitchFamily="34" charset="0"/>
-              <a:ea typeface="Tahoma" panose="020B0604030504040204" pitchFamily="34" charset="0"/>
-              <a:cs typeface="Tahoma" panose="020B0604030504040204" pitchFamily="34" charset="0"/>
-            </a:endParaRPr>
-          </a:p>
-          <a:p>
-            <a:pPr marL="901700" lvl="2" indent="-279400" algn="l">
-              <a:buSzPct val="80000"/>
-              <a:buFont typeface="Wingdings" pitchFamily="2" charset="2"/>
-              <a:buChar char="§"/>
-            </a:pPr>
-            <a:endParaRPr lang="pt-BR" sz="2400" dirty="0">
-              <a:solidFill>
-                <a:srgbClr val="0000CC"/>
-              </a:solidFill>
-              <a:latin typeface="Tahoma" panose="020B0604030504040204" pitchFamily="34" charset="0"/>
-              <a:ea typeface="Tahoma" panose="020B0604030504040204" pitchFamily="34" charset="0"/>
-              <a:cs typeface="Tahoma" panose="020B0604030504040204" pitchFamily="34" charset="0"/>
-            </a:endParaRPr>
-          </a:p>
-        </p:txBody>
-      </p:sp>
-      <p:sp>
-        <p:nvSpPr>
-          <p:cNvPr id="8195" name="Rectangle 3"/>
+          <p:cNvPr id="7171" name="Rectangle 3"/>
           <p:cNvSpPr>
             <a:spLocks noGrp="1" noChangeArrowheads="1"/>
           </p:cNvSpPr>
@@ -8035,13 +8525,13 @@
           <a:lstStyle/>
           <a:p>
             <a:r>
-              <a:rPr lang="pt-BR" sz="3600" dirty="0" smtClean="0">
+              <a:rPr lang="pt-BR" sz="3600" dirty="0">
                 <a:solidFill>
                   <a:srgbClr val="0000CC"/>
                 </a:solidFill>
                 <a:latin typeface="Tahoma" pitchFamily="34" charset="0"/>
               </a:rPr>
-              <a:t>Detalhamento do Sistema</a:t>
+              <a:t>Escopo do produto</a:t>
             </a:r>
             <a:endParaRPr lang="pt-BR" sz="3600" dirty="0">
               <a:solidFill>
@@ -8052,7 +8542,122 @@
           </a:p>
         </p:txBody>
       </p:sp>
+      <p:sp>
+        <p:nvSpPr>
+          <p:cNvPr id="3" name="Retângulo 2"/>
+          <p:cNvSpPr/>
+          <p:nvPr/>
+        </p:nvSpPr>
+        <p:spPr>
+          <a:xfrm>
+            <a:off x="107504" y="836613"/>
+            <a:ext cx="9144000" cy="4893647"/>
+          </a:xfrm>
+          <a:prstGeom prst="rect">
+            <a:avLst/>
+          </a:prstGeom>
+        </p:spPr>
+        <p:txBody>
+          <a:bodyPr wrap="square">
+            <a:spAutoFit/>
+          </a:bodyPr>
+          <a:lstStyle/>
+          <a:p>
+            <a:pPr marL="79375" lvl="1" indent="-174625">
+              <a:buSzPct val="80000"/>
+            </a:pPr>
+            <a:r>
+              <a:rPr lang="pt-BR" sz="2400" b="1" dirty="0">
+                <a:latin typeface="Tahoma" panose="020B0604030504040204" pitchFamily="34" charset="0"/>
+                <a:ea typeface="Tahoma" panose="020B0604030504040204" pitchFamily="34" charset="0"/>
+                <a:cs typeface="Tahoma" panose="020B0604030504040204" pitchFamily="34" charset="0"/>
+              </a:rPr>
+              <a:t>Requisitos </a:t>
+            </a:r>
+            <a:r>
+              <a:rPr lang="pt-BR" sz="2400" b="1" dirty="0" smtClean="0">
+                <a:latin typeface="Tahoma" panose="020B0604030504040204" pitchFamily="34" charset="0"/>
+                <a:ea typeface="Tahoma" panose="020B0604030504040204" pitchFamily="34" charset="0"/>
+                <a:cs typeface="Tahoma" panose="020B0604030504040204" pitchFamily="34" charset="0"/>
+              </a:rPr>
+              <a:t>Não Funcionais</a:t>
+            </a:r>
+          </a:p>
+          <a:p>
+            <a:pPr marL="79375" lvl="1" indent="-174625">
+              <a:buSzPct val="80000"/>
+            </a:pPr>
+            <a:endParaRPr lang="pt-BR" sz="2800" b="1" dirty="0">
+              <a:latin typeface="Tahoma" panose="020B0604030504040204" pitchFamily="34" charset="0"/>
+              <a:ea typeface="Tahoma" panose="020B0604030504040204" pitchFamily="34" charset="0"/>
+              <a:cs typeface="Tahoma" panose="020B0604030504040204" pitchFamily="34" charset="0"/>
+            </a:endParaRPr>
+          </a:p>
+          <a:p>
+            <a:pPr marL="285750" lvl="0" indent="-285750">
+              <a:buFont typeface="Arial" panose="020B0604020202020204" pitchFamily="34" charset="0"/>
+              <a:buChar char="•"/>
+            </a:pPr>
+            <a:r>
+              <a:rPr lang="pt-BR" sz="2000" dirty="0"/>
+              <a:t>Requisitos de Confiabilidade:</a:t>
+            </a:r>
+          </a:p>
+          <a:p>
+            <a:pPr marL="742950" lvl="1" indent="-285750">
+              <a:buFont typeface="Courier New" panose="02070309020205020404" pitchFamily="49" charset="0"/>
+              <a:buChar char="o"/>
+            </a:pPr>
+            <a:r>
+              <a:rPr lang="pt-BR" sz="2000" dirty="0"/>
+              <a:t>O Sistema (site) deve estar disponível 24hs por dia para o acesso do paciente.</a:t>
+            </a:r>
+          </a:p>
+          <a:p>
+            <a:pPr marL="285750" lvl="0" indent="-285750">
+              <a:buFont typeface="Arial" panose="020B0604020202020204" pitchFamily="34" charset="0"/>
+              <a:buChar char="•"/>
+            </a:pPr>
+            <a:r>
+              <a:rPr lang="pt-BR" sz="2000" dirty="0"/>
+              <a:t>Requisitos de Segurança:</a:t>
+            </a:r>
+          </a:p>
+          <a:p>
+            <a:pPr marL="742950" lvl="1" indent="-285750">
+              <a:buFont typeface="Courier New" panose="02070309020205020404" pitchFamily="49" charset="0"/>
+              <a:buChar char="o"/>
+            </a:pPr>
+            <a:r>
+              <a:rPr lang="pt-BR" sz="2000" dirty="0"/>
+              <a:t>Todo o acesso tanto ao sistema interno do laboratório quanto ao acesso ao site, deve ser controlado através de autenticação de usuário e senha - no caso do sistema interno, o acesso ao mesmo está atrelado à um nível hierárquico de acesso às diversas funções.</a:t>
+            </a:r>
+          </a:p>
+          <a:p>
+            <a:r>
+              <a:rPr lang="pt-BR" sz="2000" dirty="0"/>
+              <a:t> </a:t>
+            </a:r>
+          </a:p>
+          <a:p>
+            <a:pPr marL="742950" lvl="1" indent="-285750">
+              <a:buFont typeface="Courier New" panose="02070309020205020404" pitchFamily="49" charset="0"/>
+              <a:buChar char="o"/>
+            </a:pPr>
+            <a:r>
+              <a:rPr lang="pt-BR" sz="2000" dirty="0"/>
+              <a:t>Já o paciente irá acessar a área de resultado do exame via código gerado na hora do exame, pelo website. Esse código terá uma complexidade de caracteres alta e o paciente além do código deverá preencher outro campo com algum dado pessoal para que seja seguro que ninguém além do próprio paciente, consiga verificar o resultado do seu exame.</a:t>
+            </a:r>
+            <a:endParaRPr lang="pt-BR" sz="2000" dirty="0"/>
+          </a:p>
+        </p:txBody>
+      </p:sp>
     </p:spTree>
+    <p:extLst>
+      <p:ext uri="{BB962C8B-B14F-4D97-AF65-F5344CB8AC3E}">
+        <p14:creationId xmlns:p14="http://schemas.microsoft.com/office/powerpoint/2010/main" val="2056138900"/>
+      </p:ext>
+    </p:extLst>
   </p:cSld>
   <p:clrMapOvr>
     <a:masterClrMapping/>
@@ -8123,7 +8728,7 @@
                 </a:solidFill>
                 <a:latin typeface="Tahoma" pitchFamily="34" charset="0"/>
               </a:rPr>
-              <a:t>Evidencias da existência do Sistema</a:t>
+              <a:t>Escopo do produto</a:t>
             </a:r>
             <a:endParaRPr lang="pt-BR" sz="3600" dirty="0">
               <a:solidFill>

</xml_diff>

<commit_message>
Atualização do slide de apresentação
</commit_message>
<xml_diff>
--- a/Arquivos do Anselmo preencidos - Semestre passado/GPS_2014_Modelo de Apresentação_PI.pptx
+++ b/Arquivos do Anselmo preencidos - Semestre passado/GPS_2014_Modelo de Apresentação_PI.pptx
@@ -5113,11 +5113,6 @@
               </a:rPr>
               <a:t>EAP/WBS</a:t>
             </a:r>
-            <a:endParaRPr lang="pt-BR" sz="2400" b="1" dirty="0" smtClean="0">
-              <a:latin typeface="Tahoma" panose="020B0604030504040204" pitchFamily="34" charset="0"/>
-              <a:ea typeface="Tahoma" panose="020B0604030504040204" pitchFamily="34" charset="0"/>
-              <a:cs typeface="Tahoma" panose="020B0604030504040204" pitchFamily="34" charset="0"/>
-            </a:endParaRPr>
           </a:p>
           <a:p>
             <a:pPr marL="79375" lvl="1" indent="-174625">
@@ -5317,11 +5312,6 @@
               </a:rPr>
               <a:t>EAP/WBS</a:t>
             </a:r>
-            <a:endParaRPr lang="pt-BR" sz="2400" b="1" dirty="0" smtClean="0">
-              <a:latin typeface="Tahoma" panose="020B0604030504040204" pitchFamily="34" charset="0"/>
-              <a:ea typeface="Tahoma" panose="020B0604030504040204" pitchFamily="34" charset="0"/>
-              <a:cs typeface="Tahoma" panose="020B0604030504040204" pitchFamily="34" charset="0"/>
-            </a:endParaRPr>
           </a:p>
           <a:p>
             <a:pPr marL="79375" lvl="1" indent="-174625">
@@ -5521,11 +5511,6 @@
               </a:rPr>
               <a:t>EAP/WBS</a:t>
             </a:r>
-            <a:endParaRPr lang="pt-BR" sz="2400" b="1" dirty="0" smtClean="0">
-              <a:latin typeface="Tahoma" panose="020B0604030504040204" pitchFamily="34" charset="0"/>
-              <a:ea typeface="Tahoma" panose="020B0604030504040204" pitchFamily="34" charset="0"/>
-              <a:cs typeface="Tahoma" panose="020B0604030504040204" pitchFamily="34" charset="0"/>
-            </a:endParaRPr>
           </a:p>
           <a:p>
             <a:pPr marL="79375" lvl="1" indent="-174625">
@@ -9029,15 +9014,7 @@
                 <a:ea typeface="Tahoma" panose="020B0604030504040204" pitchFamily="34" charset="0"/>
                 <a:cs typeface="Tahoma" panose="020B0604030504040204" pitchFamily="34" charset="0"/>
               </a:rPr>
-              <a:t>funcionalidades </a:t>
-            </a:r>
-            <a:r>
-              <a:rPr lang="pt-BR" dirty="0" smtClean="0">
-                <a:latin typeface="Tahoma" panose="020B0604030504040204" pitchFamily="34" charset="0"/>
-                <a:ea typeface="Tahoma" panose="020B0604030504040204" pitchFamily="34" charset="0"/>
-                <a:cs typeface="Tahoma" panose="020B0604030504040204" pitchFamily="34" charset="0"/>
-              </a:rPr>
-              <a:t>intuitivas; </a:t>
+              <a:t>funcionalidades intuitivas; </a:t>
             </a:r>
             <a:r>
               <a:rPr lang="pt-BR" dirty="0">
@@ -9427,15 +9404,7 @@
                 <a:ea typeface="Tahoma" panose="020B0604030504040204" pitchFamily="34" charset="0"/>
                 <a:cs typeface="Tahoma" panose="020B0604030504040204" pitchFamily="34" charset="0"/>
               </a:rPr>
-              <a:t>Gerente </a:t>
-            </a:r>
-            <a:r>
-              <a:rPr lang="pt-BR" dirty="0" smtClean="0">
-                <a:latin typeface="Tahoma" panose="020B0604030504040204" pitchFamily="34" charset="0"/>
-                <a:ea typeface="Tahoma" panose="020B0604030504040204" pitchFamily="34" charset="0"/>
-                <a:cs typeface="Tahoma" panose="020B0604030504040204" pitchFamily="34" charset="0"/>
-              </a:rPr>
-              <a:t>do </a:t>
+              <a:t>Gerente do </a:t>
             </a:r>
             <a:r>
               <a:rPr lang="pt-BR" dirty="0">
@@ -9647,7 +9616,7 @@
       </p:sp>
       <p:pic>
         <p:nvPicPr>
-          <p:cNvPr id="5" name="Imagem 4"/>
+          <p:cNvPr id="4" name="Imagem 3"/>
           <p:cNvPicPr>
             <a:picLocks noChangeAspect="1"/>
           </p:cNvPicPr>
@@ -9667,8 +9636,8 @@
         </p:blipFill>
         <p:spPr>
           <a:xfrm>
-            <a:off x="29370" y="1484784"/>
-            <a:ext cx="9079134" cy="3888432"/>
+            <a:off x="35496" y="906008"/>
+            <a:ext cx="9078692" cy="5259296"/>
           </a:xfrm>
           <a:prstGeom prst="rect">
             <a:avLst/>
@@ -9758,7 +9727,7 @@
       </p:sp>
       <p:pic>
         <p:nvPicPr>
-          <p:cNvPr id="2" name="Imagem 1"/>
+          <p:cNvPr id="4" name="Imagem 3"/>
           <p:cNvPicPr>
             <a:picLocks noChangeAspect="1"/>
           </p:cNvPicPr>
@@ -9778,8 +9747,8 @@
         </p:blipFill>
         <p:spPr>
           <a:xfrm>
-            <a:off x="-20447" y="1988840"/>
-            <a:ext cx="9164447" cy="2736304"/>
+            <a:off x="0" y="1340768"/>
+            <a:ext cx="9144000" cy="4247614"/>
           </a:xfrm>
           <a:prstGeom prst="rect">
             <a:avLst/>
@@ -9869,7 +9838,7 @@
       </p:sp>
       <p:pic>
         <p:nvPicPr>
-          <p:cNvPr id="3" name="Imagem 2"/>
+          <p:cNvPr id="2" name="Imagem 1"/>
           <p:cNvPicPr>
             <a:picLocks noChangeAspect="1"/>
           </p:cNvPicPr>
@@ -9889,8 +9858,8 @@
         </p:blipFill>
         <p:spPr>
           <a:xfrm>
-            <a:off x="37528" y="1628800"/>
-            <a:ext cx="9070976" cy="3456384"/>
+            <a:off x="-19544" y="1150822"/>
+            <a:ext cx="9144000" cy="4798458"/>
           </a:xfrm>
           <a:prstGeom prst="rect">
             <a:avLst/>
@@ -9980,7 +9949,7 @@
       </p:sp>
       <p:pic>
         <p:nvPicPr>
-          <p:cNvPr id="2" name="Imagem 1"/>
+          <p:cNvPr id="3" name="Imagem 2"/>
           <p:cNvPicPr>
             <a:picLocks noChangeAspect="1"/>
           </p:cNvPicPr>
@@ -10000,8 +9969,8 @@
         </p:blipFill>
         <p:spPr>
           <a:xfrm>
-            <a:off x="35496" y="1844824"/>
-            <a:ext cx="8991701" cy="2880320"/>
+            <a:off x="28668" y="1484685"/>
+            <a:ext cx="9115332" cy="3960539"/>
           </a:xfrm>
           <a:prstGeom prst="rect">
             <a:avLst/>
@@ -10136,11 +10105,6 @@
               </a:rPr>
               <a:t>EAP/WBS</a:t>
             </a:r>
-            <a:endParaRPr lang="pt-BR" sz="2400" b="1" dirty="0" smtClean="0">
-              <a:latin typeface="Tahoma" panose="020B0604030504040204" pitchFamily="34" charset="0"/>
-              <a:ea typeface="Tahoma" panose="020B0604030504040204" pitchFamily="34" charset="0"/>
-              <a:cs typeface="Tahoma" panose="020B0604030504040204" pitchFamily="34" charset="0"/>
-            </a:endParaRPr>
           </a:p>
           <a:p>
             <a:pPr marL="79375" lvl="1" indent="-174625">
@@ -10295,7 +10259,7 @@
       </p:sp>
       <p:pic>
         <p:nvPicPr>
-          <p:cNvPr id="3" name="Imagem 2"/>
+          <p:cNvPr id="2" name="Imagem 1"/>
           <p:cNvPicPr>
             <a:picLocks noChangeAspect="1"/>
           </p:cNvPicPr>
@@ -10315,14 +10279,125 @@
         </p:blipFill>
         <p:spPr>
           <a:xfrm>
-            <a:off x="54958" y="2492896"/>
-            <a:ext cx="9034083" cy="1584176"/>
+            <a:off x="-295" y="1412776"/>
+            <a:ext cx="9144295" cy="2448272"/>
           </a:xfrm>
           <a:prstGeom prst="rect">
             <a:avLst/>
           </a:prstGeom>
         </p:spPr>
       </p:pic>
+      <p:sp>
+        <p:nvSpPr>
+          <p:cNvPr id="5" name="Retângulo 4"/>
+          <p:cNvSpPr/>
+          <p:nvPr/>
+        </p:nvSpPr>
+        <p:spPr>
+          <a:xfrm>
+            <a:off x="-295" y="4293096"/>
+            <a:ext cx="9324528" cy="1477328"/>
+          </a:xfrm>
+          <a:prstGeom prst="rect">
+            <a:avLst/>
+          </a:prstGeom>
+        </p:spPr>
+        <p:txBody>
+          <a:bodyPr wrap="square">
+            <a:spAutoFit/>
+          </a:bodyPr>
+          <a:lstStyle/>
+          <a:p>
+            <a:pPr marL="742950" lvl="1" indent="-285750">
+              <a:buFont typeface="Arial" panose="020B0604020202020204" pitchFamily="34" charset="0"/>
+              <a:buChar char="•"/>
+            </a:pPr>
+            <a:r>
+              <a:rPr lang="pt-BR" b="1" dirty="0" smtClean="0">
+                <a:latin typeface="Tahoma" panose="020B0604030504040204" pitchFamily="34" charset="0"/>
+                <a:ea typeface="Tahoma" panose="020B0604030504040204" pitchFamily="34" charset="0"/>
+                <a:cs typeface="Tahoma" panose="020B0604030504040204" pitchFamily="34" charset="0"/>
+              </a:rPr>
+              <a:t>Duração total do projeto: </a:t>
+            </a:r>
+            <a:r>
+              <a:rPr lang="pt-BR" dirty="0" smtClean="0">
+                <a:latin typeface="Tahoma" panose="020B0604030504040204" pitchFamily="34" charset="0"/>
+                <a:ea typeface="Tahoma" panose="020B0604030504040204" pitchFamily="34" charset="0"/>
+                <a:cs typeface="Tahoma" panose="020B0604030504040204" pitchFamily="34" charset="0"/>
+              </a:rPr>
+              <a:t>319,88 dias</a:t>
+            </a:r>
+          </a:p>
+          <a:p>
+            <a:pPr marL="1200150" lvl="2" indent="-285750">
+              <a:buFont typeface="Arial" panose="020B0604020202020204" pitchFamily="34" charset="0"/>
+              <a:buChar char="•"/>
+            </a:pPr>
+            <a:r>
+              <a:rPr lang="pt-BR" b="1" dirty="0" smtClean="0">
+                <a:latin typeface="Tahoma" panose="020B0604030504040204" pitchFamily="34" charset="0"/>
+                <a:ea typeface="Tahoma" panose="020B0604030504040204" pitchFamily="34" charset="0"/>
+                <a:cs typeface="Tahoma" panose="020B0604030504040204" pitchFamily="34" charset="0"/>
+              </a:rPr>
+              <a:t>Data do termino do projeto: </a:t>
+            </a:r>
+            <a:r>
+              <a:rPr lang="pt-BR" dirty="0" smtClean="0">
+                <a:latin typeface="Tahoma" panose="020B0604030504040204" pitchFamily="34" charset="0"/>
+                <a:ea typeface="Tahoma" panose="020B0604030504040204" pitchFamily="34" charset="0"/>
+                <a:cs typeface="Tahoma" panose="020B0604030504040204" pitchFamily="34" charset="0"/>
+              </a:rPr>
+              <a:t>22/05/2015</a:t>
+            </a:r>
+          </a:p>
+          <a:p>
+            <a:pPr marL="1200150" lvl="2" indent="-285750">
+              <a:buFont typeface="Arial" panose="020B0604020202020204" pitchFamily="34" charset="0"/>
+              <a:buChar char="•"/>
+            </a:pPr>
+            <a:endParaRPr lang="pt-BR" b="1" dirty="0">
+              <a:latin typeface="Tahoma" panose="020B0604030504040204" pitchFamily="34" charset="0"/>
+              <a:ea typeface="Tahoma" panose="020B0604030504040204" pitchFamily="34" charset="0"/>
+              <a:cs typeface="Tahoma" panose="020B0604030504040204" pitchFamily="34" charset="0"/>
+            </a:endParaRPr>
+          </a:p>
+          <a:p>
+            <a:pPr marL="742950" lvl="1" indent="-285750">
+              <a:buFont typeface="Arial" panose="020B0604020202020204" pitchFamily="34" charset="0"/>
+              <a:buChar char="•"/>
+            </a:pPr>
+            <a:r>
+              <a:rPr lang="pt-BR" b="1" dirty="0" smtClean="0">
+                <a:latin typeface="Tahoma" panose="020B0604030504040204" pitchFamily="34" charset="0"/>
+                <a:ea typeface="Tahoma" panose="020B0604030504040204" pitchFamily="34" charset="0"/>
+                <a:cs typeface="Tahoma" panose="020B0604030504040204" pitchFamily="34" charset="0"/>
+              </a:rPr>
+              <a:t>Tempo para conclusão dos Entregáveis</a:t>
+            </a:r>
+            <a:r>
+              <a:rPr lang="pt-BR" b="1" dirty="0" smtClean="0">
+                <a:latin typeface="Tahoma" panose="020B0604030504040204" pitchFamily="34" charset="0"/>
+                <a:ea typeface="Tahoma" panose="020B0604030504040204" pitchFamily="34" charset="0"/>
+                <a:cs typeface="Tahoma" panose="020B0604030504040204" pitchFamily="34" charset="0"/>
+              </a:rPr>
+              <a:t>: </a:t>
+            </a:r>
+            <a:r>
+              <a:rPr lang="pt-BR" dirty="0" smtClean="0">
+                <a:latin typeface="Tahoma" panose="020B0604030504040204" pitchFamily="34" charset="0"/>
+                <a:ea typeface="Tahoma" panose="020B0604030504040204" pitchFamily="34" charset="0"/>
+                <a:cs typeface="Tahoma" panose="020B0604030504040204" pitchFamily="34" charset="0"/>
+              </a:rPr>
+              <a:t>30 dias (A partir de 04/05/2015)</a:t>
+            </a:r>
+          </a:p>
+          <a:p>
+            <a:pPr lvl="2"/>
+            <a:endParaRPr lang="pt-BR" b="1" dirty="0"/>
+          </a:p>
+        </p:txBody>
+      </p:sp>
     </p:spTree>
     <p:extLst>
       <p:ext uri="{BB962C8B-B14F-4D97-AF65-F5344CB8AC3E}">
@@ -10998,6 +11073,81 @@
           </a:graphicData>
         </a:graphic>
       </p:graphicFrame>
+      <p:sp>
+        <p:nvSpPr>
+          <p:cNvPr id="3" name="Retângulo 2"/>
+          <p:cNvSpPr/>
+          <p:nvPr/>
+        </p:nvSpPr>
+        <p:spPr>
+          <a:xfrm>
+            <a:off x="0" y="5805264"/>
+            <a:ext cx="8699902" cy="923330"/>
+          </a:xfrm>
+          <a:prstGeom prst="rect">
+            <a:avLst/>
+          </a:prstGeom>
+        </p:spPr>
+        <p:txBody>
+          <a:bodyPr wrap="square">
+            <a:spAutoFit/>
+          </a:bodyPr>
+          <a:lstStyle/>
+          <a:p>
+            <a:pPr marL="742950" lvl="1" indent="-285750">
+              <a:buFont typeface="Arial" panose="020B0604020202020204" pitchFamily="34" charset="0"/>
+              <a:buChar char="•"/>
+            </a:pPr>
+            <a:r>
+              <a:rPr lang="pt-BR" b="1" dirty="0">
+                <a:solidFill>
+                  <a:srgbClr val="FF0000"/>
+                </a:solidFill>
+                <a:latin typeface="Tahoma" panose="020B0604030504040204" pitchFamily="34" charset="0"/>
+                <a:ea typeface="Tahoma" panose="020B0604030504040204" pitchFamily="34" charset="0"/>
+                <a:cs typeface="Tahoma" panose="020B0604030504040204" pitchFamily="34" charset="0"/>
+              </a:rPr>
+              <a:t>Tempo para conclusão dos Entregáveis: 30 </a:t>
+            </a:r>
+            <a:r>
+              <a:rPr lang="pt-BR" b="1" dirty="0" smtClean="0">
+                <a:solidFill>
+                  <a:srgbClr val="FF0000"/>
+                </a:solidFill>
+                <a:latin typeface="Tahoma" panose="020B0604030504040204" pitchFamily="34" charset="0"/>
+                <a:ea typeface="Tahoma" panose="020B0604030504040204" pitchFamily="34" charset="0"/>
+                <a:cs typeface="Tahoma" panose="020B0604030504040204" pitchFamily="34" charset="0"/>
+              </a:rPr>
+              <a:t>dias </a:t>
+            </a:r>
+            <a:r>
+              <a:rPr lang="pt-BR" dirty="0">
+                <a:solidFill>
+                  <a:srgbClr val="FF0000"/>
+                </a:solidFill>
+                <a:latin typeface="Tahoma" panose="020B0604030504040204" pitchFamily="34" charset="0"/>
+                <a:ea typeface="Tahoma" panose="020B0604030504040204" pitchFamily="34" charset="0"/>
+                <a:cs typeface="Tahoma" panose="020B0604030504040204" pitchFamily="34" charset="0"/>
+              </a:rPr>
+              <a:t>(A partir de 04/05/2015)</a:t>
+            </a:r>
+          </a:p>
+          <a:p>
+            <a:pPr marL="742950" lvl="1" indent="-285750">
+              <a:buFont typeface="Arial" panose="020B0604020202020204" pitchFamily="34" charset="0"/>
+              <a:buChar char="•"/>
+            </a:pPr>
+            <a:endParaRPr lang="pt-BR" b="1" dirty="0">
+              <a:solidFill>
+                <a:srgbClr val="FF0000"/>
+              </a:solidFill>
+              <a:latin typeface="Tahoma" panose="020B0604030504040204" pitchFamily="34" charset="0"/>
+              <a:ea typeface="Tahoma" panose="020B0604030504040204" pitchFamily="34" charset="0"/>
+              <a:cs typeface="Tahoma" panose="020B0604030504040204" pitchFamily="34" charset="0"/>
+            </a:endParaRPr>
+          </a:p>
+        </p:txBody>
+      </p:sp>
     </p:spTree>
     <p:extLst>
       <p:ext uri="{BB962C8B-B14F-4D97-AF65-F5344CB8AC3E}">
@@ -11225,11 +11375,6 @@
               </a:rPr>
               <a:t>EAP/WBS</a:t>
             </a:r>
-            <a:endParaRPr lang="pt-BR" sz="2400" b="1" dirty="0" smtClean="0">
-              <a:latin typeface="Tahoma" panose="020B0604030504040204" pitchFamily="34" charset="0"/>
-              <a:ea typeface="Tahoma" panose="020B0604030504040204" pitchFamily="34" charset="0"/>
-              <a:cs typeface="Tahoma" panose="020B0604030504040204" pitchFamily="34" charset="0"/>
-            </a:endParaRPr>
           </a:p>
           <a:p>
             <a:pPr marL="79375" lvl="1" indent="-174625">
@@ -11429,11 +11574,6 @@
               </a:rPr>
               <a:t>EAP/WBS</a:t>
             </a:r>
-            <a:endParaRPr lang="pt-BR" sz="2400" b="1" dirty="0" smtClean="0">
-              <a:latin typeface="Tahoma" panose="020B0604030504040204" pitchFamily="34" charset="0"/>
-              <a:ea typeface="Tahoma" panose="020B0604030504040204" pitchFamily="34" charset="0"/>
-              <a:cs typeface="Tahoma" panose="020B0604030504040204" pitchFamily="34" charset="0"/>
-            </a:endParaRPr>
           </a:p>
           <a:p>
             <a:pPr marL="79375" lvl="1" indent="-174625">
@@ -11633,11 +11773,6 @@
               </a:rPr>
               <a:t>EAP/WBS</a:t>
             </a:r>
-            <a:endParaRPr lang="pt-BR" sz="2400" b="1" dirty="0" smtClean="0">
-              <a:latin typeface="Tahoma" panose="020B0604030504040204" pitchFamily="34" charset="0"/>
-              <a:ea typeface="Tahoma" panose="020B0604030504040204" pitchFamily="34" charset="0"/>
-              <a:cs typeface="Tahoma" panose="020B0604030504040204" pitchFamily="34" charset="0"/>
-            </a:endParaRPr>
           </a:p>
           <a:p>
             <a:pPr marL="79375" lvl="1" indent="-174625">
@@ -11837,11 +11972,6 @@
               </a:rPr>
               <a:t>EAP/WBS</a:t>
             </a:r>
-            <a:endParaRPr lang="pt-BR" sz="2400" b="1" dirty="0" smtClean="0">
-              <a:latin typeface="Tahoma" panose="020B0604030504040204" pitchFamily="34" charset="0"/>
-              <a:ea typeface="Tahoma" panose="020B0604030504040204" pitchFamily="34" charset="0"/>
-              <a:cs typeface="Tahoma" panose="020B0604030504040204" pitchFamily="34" charset="0"/>
-            </a:endParaRPr>
           </a:p>
           <a:p>
             <a:pPr marL="79375" lvl="1" indent="-174625">
@@ -12041,11 +12171,6 @@
               </a:rPr>
               <a:t>EAP/WBS</a:t>
             </a:r>
-            <a:endParaRPr lang="pt-BR" sz="2400" b="1" dirty="0" smtClean="0">
-              <a:latin typeface="Tahoma" panose="020B0604030504040204" pitchFamily="34" charset="0"/>
-              <a:ea typeface="Tahoma" panose="020B0604030504040204" pitchFamily="34" charset="0"/>
-              <a:cs typeface="Tahoma" panose="020B0604030504040204" pitchFamily="34" charset="0"/>
-            </a:endParaRPr>
           </a:p>
           <a:p>
             <a:pPr marL="79375" lvl="1" indent="-174625">
@@ -12245,11 +12370,6 @@
               </a:rPr>
               <a:t>EAP/WBS</a:t>
             </a:r>
-            <a:endParaRPr lang="pt-BR" sz="2400" b="1" dirty="0" smtClean="0">
-              <a:latin typeface="Tahoma" panose="020B0604030504040204" pitchFamily="34" charset="0"/>
-              <a:ea typeface="Tahoma" panose="020B0604030504040204" pitchFamily="34" charset="0"/>
-              <a:cs typeface="Tahoma" panose="020B0604030504040204" pitchFamily="34" charset="0"/>
-            </a:endParaRPr>
           </a:p>
           <a:p>
             <a:pPr marL="79375" lvl="1" indent="-174625">

</xml_diff>